<commit_message>
Modified model for Qin's paper, and miner modifications to fluocell
</commit_message>
<xml_diff>
--- a/app/model/result_0211_2017.pptx
+++ b/app/model/result_0211_2017.pptx
@@ -7,9 +7,13 @@
   <p:sldIdLst>
     <p:sldId id="258" r:id="rId2"/>
     <p:sldId id="260" r:id="rId3"/>
-    <p:sldId id="261" r:id="rId4"/>
-    <p:sldId id="259" r:id="rId5"/>
-    <p:sldId id="262" r:id="rId6"/>
+    <p:sldId id="264" r:id="rId4"/>
+    <p:sldId id="267" r:id="rId5"/>
+    <p:sldId id="265" r:id="rId6"/>
+    <p:sldId id="266" r:id="rId7"/>
+    <p:sldId id="259" r:id="rId8"/>
+    <p:sldId id="262" r:id="rId9"/>
+    <p:sldId id="268" r:id="rId10"/>
   </p:sldIdLst>
   <p:sldSz cx="12192000" cy="6858000"/>
   <p:notesSz cx="6858000" cy="9144000"/>
@@ -108,6 +112,11 @@
       </a:defRPr>
     </a:lvl9pPr>
   </p:defaultTextStyle>
+  <p:extLst>
+    <p:ext uri="{EFAFB233-063F-42B5-8137-9DF3F51BA10A}">
+      <p15:sldGuideLst xmlns:p15="http://schemas.microsoft.com/office/powerpoint/2012/main"/>
+    </p:ext>
+  </p:extLst>
 </p:presentation>
 </file>
 
@@ -242,7 +251,7 @@
           <a:p>
             <a:fld id="{13FF81DB-72FD-4E0B-96E8-AA8F3653C4D4}" type="datetimeFigureOut">
               <a:rPr lang="en-US" smtClean="0"/>
-              <a:t>2/11/2017</a:t>
+              <a:t>2/19/2017</a:t>
             </a:fld>
             <a:endParaRPr lang="en-US"/>
           </a:p>
@@ -412,7 +421,7 @@
           <a:p>
             <a:fld id="{13FF81DB-72FD-4E0B-96E8-AA8F3653C4D4}" type="datetimeFigureOut">
               <a:rPr lang="en-US" smtClean="0"/>
-              <a:t>2/11/2017</a:t>
+              <a:t>2/19/2017</a:t>
             </a:fld>
             <a:endParaRPr lang="en-US"/>
           </a:p>
@@ -592,7 +601,7 @@
           <a:p>
             <a:fld id="{13FF81DB-72FD-4E0B-96E8-AA8F3653C4D4}" type="datetimeFigureOut">
               <a:rPr lang="en-US" smtClean="0"/>
-              <a:t>2/11/2017</a:t>
+              <a:t>2/19/2017</a:t>
             </a:fld>
             <a:endParaRPr lang="en-US"/>
           </a:p>
@@ -762,7 +771,7 @@
           <a:p>
             <a:fld id="{13FF81DB-72FD-4E0B-96E8-AA8F3653C4D4}" type="datetimeFigureOut">
               <a:rPr lang="en-US" smtClean="0"/>
-              <a:t>2/11/2017</a:t>
+              <a:t>2/19/2017</a:t>
             </a:fld>
             <a:endParaRPr lang="en-US"/>
           </a:p>
@@ -1008,7 +1017,7 @@
           <a:p>
             <a:fld id="{13FF81DB-72FD-4E0B-96E8-AA8F3653C4D4}" type="datetimeFigureOut">
               <a:rPr lang="en-US" smtClean="0"/>
-              <a:t>2/11/2017</a:t>
+              <a:t>2/19/2017</a:t>
             </a:fld>
             <a:endParaRPr lang="en-US"/>
           </a:p>
@@ -1240,7 +1249,7 @@
           <a:p>
             <a:fld id="{13FF81DB-72FD-4E0B-96E8-AA8F3653C4D4}" type="datetimeFigureOut">
               <a:rPr lang="en-US" smtClean="0"/>
-              <a:t>2/11/2017</a:t>
+              <a:t>2/19/2017</a:t>
             </a:fld>
             <a:endParaRPr lang="en-US"/>
           </a:p>
@@ -1607,7 +1616,7 @@
           <a:p>
             <a:fld id="{13FF81DB-72FD-4E0B-96E8-AA8F3653C4D4}" type="datetimeFigureOut">
               <a:rPr lang="en-US" smtClean="0"/>
-              <a:t>2/11/2017</a:t>
+              <a:t>2/19/2017</a:t>
             </a:fld>
             <a:endParaRPr lang="en-US"/>
           </a:p>
@@ -1725,7 +1734,7 @@
           <a:p>
             <a:fld id="{13FF81DB-72FD-4E0B-96E8-AA8F3653C4D4}" type="datetimeFigureOut">
               <a:rPr lang="en-US" smtClean="0"/>
-              <a:t>2/11/2017</a:t>
+              <a:t>2/19/2017</a:t>
             </a:fld>
             <a:endParaRPr lang="en-US"/>
           </a:p>
@@ -1820,7 +1829,7 @@
           <a:p>
             <a:fld id="{13FF81DB-72FD-4E0B-96E8-AA8F3653C4D4}" type="datetimeFigureOut">
               <a:rPr lang="en-US" smtClean="0"/>
-              <a:t>2/11/2017</a:t>
+              <a:t>2/19/2017</a:t>
             </a:fld>
             <a:endParaRPr lang="en-US"/>
           </a:p>
@@ -2097,7 +2106,7 @@
           <a:p>
             <a:fld id="{13FF81DB-72FD-4E0B-96E8-AA8F3653C4D4}" type="datetimeFigureOut">
               <a:rPr lang="en-US" smtClean="0"/>
-              <a:t>2/11/2017</a:t>
+              <a:t>2/19/2017</a:t>
             </a:fld>
             <a:endParaRPr lang="en-US"/>
           </a:p>
@@ -2350,7 +2359,7 @@
           <a:p>
             <a:fld id="{13FF81DB-72FD-4E0B-96E8-AA8F3653C4D4}" type="datetimeFigureOut">
               <a:rPr lang="en-US" smtClean="0"/>
-              <a:t>2/11/2017</a:t>
+              <a:t>2/19/2017</a:t>
             </a:fld>
             <a:endParaRPr lang="en-US"/>
           </a:p>
@@ -2563,7 +2572,7 @@
           <a:p>
             <a:fld id="{13FF81DB-72FD-4E0B-96E8-AA8F3653C4D4}" type="datetimeFigureOut">
               <a:rPr lang="en-US" smtClean="0"/>
-              <a:t>2/11/2017</a:t>
+              <a:t>2/19/2017</a:t>
             </a:fld>
             <a:endParaRPr lang="en-US"/>
           </a:p>
@@ -3182,8 +3191,8 @@
             </p:nvSpPr>
             <p:spPr>
               <a:xfrm>
-                <a:off x="3405116" y="2240507"/>
-                <a:ext cx="627797" cy="369332"/>
+                <a:off x="3295934" y="2240507"/>
+                <a:ext cx="798394" cy="295466"/>
               </a:xfrm>
               <a:prstGeom prst="rect">
                 <a:avLst/>
@@ -3191,7 +3200,7 @@
               <a:noFill/>
             </p:spPr>
             <p:txBody>
-              <a:bodyPr wrap="square" rtlCol="0">
+              <a:bodyPr wrap="square" lIns="9144" tIns="9144" rIns="9144" bIns="9144" rtlCol="0">
                 <a:spAutoFit/>
               </a:bodyPr>
               <a:lstStyle/>
@@ -3199,7 +3208,7 @@
                 <a:pPr algn="ctr"/>
                 <a:r>
                   <a:rPr lang="en-US" b="1" dirty="0" smtClean="0"/>
-                  <a:t>K9M</a:t>
+                  <a:t>H3K9M</a:t>
                 </a:r>
                 <a:endParaRPr lang="en-US" b="1" dirty="0"/>
               </a:p>
@@ -3302,10 +3311,10 @@
           </p:nvGrpSpPr>
           <p:grpSpPr>
             <a:xfrm>
-              <a:off x="2892788" y="2123334"/>
-              <a:ext cx="818865" cy="655092"/>
-              <a:chOff x="3275463" y="2104030"/>
-              <a:chExt cx="818865" cy="655092"/>
+              <a:off x="2860240" y="2123334"/>
+              <a:ext cx="851413" cy="655092"/>
+              <a:chOff x="3242915" y="2104030"/>
+              <a:chExt cx="851413" cy="655092"/>
             </a:xfrm>
           </p:grpSpPr>
           <p:sp>
@@ -3358,8 +3367,8 @@
             </p:nvSpPr>
             <p:spPr>
               <a:xfrm>
-                <a:off x="3275464" y="2240507"/>
-                <a:ext cx="757450" cy="369332"/>
+                <a:off x="3242915" y="2240507"/>
+                <a:ext cx="851413" cy="295466"/>
               </a:xfrm>
               <a:prstGeom prst="rect">
                 <a:avLst/>
@@ -3367,7 +3376,7 @@
               <a:noFill/>
             </p:spPr>
             <p:txBody>
-              <a:bodyPr wrap="square" rtlCol="0">
+              <a:bodyPr wrap="square" lIns="9144" tIns="9144" rIns="9144" bIns="9144" rtlCol="0">
                 <a:spAutoFit/>
               </a:bodyPr>
               <a:lstStyle/>
@@ -3375,7 +3384,7 @@
                 <a:pPr algn="ctr"/>
                 <a:r>
                   <a:rPr lang="en-US" b="1" dirty="0" smtClean="0"/>
-                  <a:t>S10P</a:t>
+                  <a:t>H3S10P</a:t>
                 </a:r>
                 <a:endParaRPr lang="en-US" b="1" dirty="0"/>
               </a:p>
@@ -4028,15 +4037,7 @@
             </a:r>
             <a:r>
               <a:rPr lang="en-US" dirty="0" smtClean="0"/>
-              <a:t>('</a:t>
-            </a:r>
-            <a:r>
-              <a:rPr lang="en-US" dirty="0" err="1" smtClean="0"/>
-              <a:t>phospho_with_recruit</a:t>
-            </a:r>
-            <a:r>
-              <a:rPr lang="en-US" dirty="0" smtClean="0"/>
-              <a:t>');</a:t>
+              <a:t>(‘model1');</a:t>
             </a:r>
           </a:p>
           <a:p>
@@ -4154,23 +4155,23 @@
           </a:p>
           <a:p>
             <a:r>
-              <a:rPr lang="en-US" dirty="0" smtClean="0"/>
+              <a:rPr lang="en-US" b="1" dirty="0" smtClean="0"/>
               <a:t>y(:,i+1) = </a:t>
             </a:r>
             <a:r>
-              <a:rPr lang="en-US" dirty="0" err="1" smtClean="0"/>
+              <a:rPr lang="en-US" b="1" dirty="0" err="1" smtClean="0"/>
               <a:t>signal_matrix</a:t>
             </a:r>
             <a:r>
-              <a:rPr lang="en-US" dirty="0" smtClean="0"/>
+              <a:rPr lang="en-US" b="1" dirty="0" smtClean="0"/>
               <a:t>*y(:,</a:t>
             </a:r>
             <a:r>
-              <a:rPr lang="en-US" dirty="0" err="1" smtClean="0"/>
+              <a:rPr lang="en-US" b="1" dirty="0" err="1" smtClean="0"/>
               <a:t>i</a:t>
             </a:r>
             <a:r>
-              <a:rPr lang="en-US" dirty="0" smtClean="0"/>
+              <a:rPr lang="en-US" b="1" dirty="0" smtClean="0"/>
               <a:t>) +c</a:t>
             </a:r>
           </a:p>
@@ -4636,6 +4637,421 @@
 </file>
 
 <file path=ppt/slides/slide3.xml><?xml version="1.0" encoding="utf-8"?>
+<p:sld xmlns:a="http://schemas.openxmlformats.org/drawingml/2006/main" xmlns:r="http://schemas.openxmlformats.org/officeDocument/2006/relationships" xmlns:p="http://schemas.openxmlformats.org/presentationml/2006/main">
+  <p:cSld>
+    <p:spTree>
+      <p:nvGrpSpPr>
+        <p:cNvPr id="1" name=""/>
+        <p:cNvGrpSpPr/>
+        <p:nvPr/>
+      </p:nvGrpSpPr>
+      <p:grpSpPr>
+        <a:xfrm>
+          <a:off x="0" y="0"/>
+          <a:ext cx="0" cy="0"/>
+          <a:chOff x="0" y="0"/>
+          <a:chExt cx="0" cy="0"/>
+        </a:xfrm>
+      </p:grpSpPr>
+      <p:sp>
+        <p:nvSpPr>
+          <p:cNvPr id="2" name="TextBox 1"/>
+          <p:cNvSpPr txBox="1"/>
+          <p:nvPr/>
+        </p:nvSpPr>
+        <p:spPr>
+          <a:xfrm>
+            <a:off x="1738745" y="160020"/>
+            <a:ext cx="8799715" cy="461665"/>
+          </a:xfrm>
+          <a:prstGeom prst="rect">
+            <a:avLst/>
+          </a:prstGeom>
+          <a:noFill/>
+        </p:spPr>
+        <p:txBody>
+          <a:bodyPr wrap="square" rtlCol="0">
+            <a:spAutoFit/>
+          </a:bodyPr>
+          <a:lstStyle/>
+          <a:p>
+            <a:r>
+              <a:rPr lang="en-US" sz="2400" b="1" dirty="0" smtClean="0"/>
+              <a:t>Model Parameters</a:t>
+            </a:r>
+            <a:endParaRPr lang="en-US" sz="2400" b="1" dirty="0"/>
+          </a:p>
+        </p:txBody>
+      </p:sp>
+      <p:sp>
+        <p:nvSpPr>
+          <p:cNvPr id="3" name="TextBox 2"/>
+          <p:cNvSpPr txBox="1"/>
+          <p:nvPr/>
+        </p:nvSpPr>
+        <p:spPr>
+          <a:xfrm>
+            <a:off x="1146629" y="904740"/>
+            <a:ext cx="10710293" cy="5078313"/>
+          </a:xfrm>
+          <a:prstGeom prst="rect">
+            <a:avLst/>
+          </a:prstGeom>
+          <a:noFill/>
+        </p:spPr>
+        <p:txBody>
+          <a:bodyPr wrap="square" rtlCol="0">
+            <a:spAutoFit/>
+          </a:bodyPr>
+          <a:lstStyle/>
+          <a:p>
+            <a:r>
+              <a:rPr lang="en-US" b="1" dirty="0"/>
+              <a:t> case 'model4' % Decrease MT/KDMT to 6K</a:t>
+            </a:r>
+            <a:endParaRPr lang="en-US" dirty="0"/>
+          </a:p>
+          <a:p>
+            <a:r>
+              <a:rPr lang="en-US" b="1" dirty="0"/>
+              <a:t>        </a:t>
+            </a:r>
+            <a:r>
+              <a:rPr lang="en-US" b="1" dirty="0" err="1"/>
+              <a:t>data.num_histone</a:t>
+            </a:r>
+            <a:r>
+              <a:rPr lang="en-US" b="1" dirty="0"/>
+              <a:t> = 60000; % 60M histone</a:t>
+            </a:r>
+            <a:endParaRPr lang="en-US" dirty="0"/>
+          </a:p>
+          <a:p>
+            <a:r>
+              <a:rPr lang="en-US" b="1" dirty="0"/>
+              <a:t>        </a:t>
+            </a:r>
+            <a:r>
+              <a:rPr lang="en-US" b="1" dirty="0" err="1" smtClean="0"/>
+              <a:t>data.base_methyl</a:t>
+            </a:r>
+            <a:r>
+              <a:rPr lang="en-US" b="1" dirty="0" smtClean="0"/>
+              <a:t> </a:t>
+            </a:r>
+            <a:r>
+              <a:rPr lang="en-US" b="1" dirty="0"/>
+              <a:t>= </a:t>
+            </a:r>
+            <a:r>
+              <a:rPr lang="en-US" b="1" dirty="0" err="1" smtClean="0"/>
+              <a:t>data.num_histone</a:t>
+            </a:r>
+            <a:r>
+              <a:rPr lang="en-US" b="1" dirty="0" smtClean="0"/>
+              <a:t>*0.57; </a:t>
+            </a:r>
+            <a:endParaRPr lang="en-US" dirty="0"/>
+          </a:p>
+          <a:p>
+            <a:r>
+              <a:rPr lang="en-US" b="1" dirty="0"/>
+              <a:t>        </a:t>
+            </a:r>
+            <a:r>
+              <a:rPr lang="en-US" b="1" dirty="0" err="1"/>
+              <a:t>data.max_methyl</a:t>
+            </a:r>
+            <a:r>
+              <a:rPr lang="en-US" b="1" dirty="0"/>
+              <a:t> = 300; % max number of </a:t>
+            </a:r>
+            <a:r>
+              <a:rPr lang="en-US" b="1" dirty="0" err="1"/>
+              <a:t>methyltrasferase</a:t>
+            </a:r>
+            <a:r>
+              <a:rPr lang="en-US" b="1" dirty="0"/>
+              <a:t> and KDMS</a:t>
+            </a:r>
+            <a:endParaRPr lang="en-US" dirty="0"/>
+          </a:p>
+          <a:p>
+            <a:r>
+              <a:rPr lang="en-US" b="1" dirty="0"/>
+              <a:t>        </a:t>
+            </a:r>
+            <a:r>
+              <a:rPr lang="en-US" b="1" dirty="0" err="1"/>
+              <a:t>data.more_methyl</a:t>
+            </a:r>
+            <a:r>
+              <a:rPr lang="en-US" b="1" dirty="0"/>
+              <a:t> = 150; % more methyltransferase binds with h3k9 during mitosis</a:t>
+            </a:r>
+            <a:endParaRPr lang="en-US" dirty="0"/>
+          </a:p>
+          <a:p>
+            <a:r>
+              <a:rPr lang="en-US" b="1" dirty="0" smtClean="0"/>
+              <a:t>        </a:t>
+            </a:r>
+            <a:r>
+              <a:rPr lang="en-US" b="1" dirty="0" err="1" smtClean="0"/>
+              <a:t>data.max_mol</a:t>
+            </a:r>
+            <a:r>
+              <a:rPr lang="en-US" b="1" dirty="0" smtClean="0"/>
+              <a:t> </a:t>
+            </a:r>
+            <a:r>
+              <a:rPr lang="en-US" b="1" dirty="0"/>
+              <a:t>= </a:t>
+            </a:r>
+            <a:r>
+              <a:rPr lang="en-US" b="1" dirty="0" err="1"/>
+              <a:t>data.max_methyl</a:t>
+            </a:r>
+            <a:r>
+              <a:rPr lang="en-US" b="1" dirty="0"/>
+              <a:t>*7.5; % 2.25M aurora b kinase, max number of kinase and </a:t>
+            </a:r>
+            <a:r>
+              <a:rPr lang="en-US" b="1" dirty="0" smtClean="0"/>
+              <a:t>phosphatase</a:t>
+            </a:r>
+          </a:p>
+          <a:p>
+            <a:r>
+              <a:rPr lang="en-US" b="1" dirty="0"/>
+              <a:t> </a:t>
+            </a:r>
+            <a:r>
+              <a:rPr lang="en-US" b="1" dirty="0" smtClean="0"/>
+              <a:t>       </a:t>
+            </a:r>
+            <a:r>
+              <a:rPr lang="en-US" b="1" dirty="0" err="1" smtClean="0"/>
+              <a:t>data.more_phospho</a:t>
+            </a:r>
+            <a:r>
+              <a:rPr lang="en-US" b="1" dirty="0" smtClean="0"/>
+              <a:t> </a:t>
+            </a:r>
+            <a:r>
+              <a:rPr lang="en-US" b="1" dirty="0"/>
+              <a:t>= 300; % </a:t>
+            </a:r>
+            <a:r>
+              <a:rPr lang="en-US" b="1" dirty="0" smtClean="0"/>
+              <a:t>300K </a:t>
+            </a:r>
+            <a:r>
+              <a:rPr lang="en-US" b="1" dirty="0"/>
+              <a:t>more kinase binds to h3s10 during mitosis</a:t>
+            </a:r>
+            <a:endParaRPr lang="en-US" dirty="0"/>
+          </a:p>
+          <a:p>
+            <a:r>
+              <a:rPr lang="en-US" b="1" dirty="0"/>
+              <a:t> </a:t>
+            </a:r>
+            <a:r>
+              <a:rPr lang="en-US" b="1" dirty="0" smtClean="0"/>
+              <a:t>       </a:t>
+            </a:r>
+            <a:r>
+              <a:rPr lang="en-US" b="1" dirty="0" err="1" smtClean="0"/>
+              <a:t>data.max_time_phospho</a:t>
+            </a:r>
+            <a:r>
+              <a:rPr lang="en-US" b="1" dirty="0" smtClean="0"/>
+              <a:t> </a:t>
+            </a:r>
+            <a:r>
+              <a:rPr lang="en-US" b="1" dirty="0"/>
+              <a:t>= 30 * </a:t>
+            </a:r>
+            <a:r>
+              <a:rPr lang="en-US" b="1" dirty="0" err="1"/>
+              <a:t>data.num_histone</a:t>
+            </a:r>
+            <a:r>
+              <a:rPr lang="en-US" b="1" dirty="0"/>
+              <a:t>;  %</a:t>
+            </a:r>
+            <a:r>
+              <a:rPr lang="en-US" b="1" dirty="0" err="1"/>
+              <a:t>num_histone</a:t>
+            </a:r>
+            <a:r>
+              <a:rPr lang="en-US" b="1" dirty="0"/>
+              <a:t> for 30 min        </a:t>
+            </a:r>
+            <a:endParaRPr lang="en-US" b="1" dirty="0" smtClean="0"/>
+          </a:p>
+          <a:p>
+            <a:r>
+              <a:rPr lang="en-US" b="1" dirty="0"/>
+              <a:t> </a:t>
+            </a:r>
+            <a:r>
+              <a:rPr lang="en-US" b="1" dirty="0" smtClean="0"/>
+              <a:t>       % </a:t>
+            </a:r>
+            <a:r>
+              <a:rPr lang="en-US" b="1" dirty="0" err="1"/>
+              <a:t>Kinase:KDM</a:t>
+            </a:r>
+            <a:r>
+              <a:rPr lang="en-US" b="1" dirty="0"/>
+              <a:t> ratio = </a:t>
+            </a:r>
+            <a:r>
+              <a:rPr lang="en-US" b="1" dirty="0" smtClean="0"/>
+              <a:t>7.5:1</a:t>
+            </a:r>
+          </a:p>
+          <a:p>
+            <a:r>
+              <a:rPr lang="en-US" b="1" dirty="0" smtClean="0"/>
+              <a:t>        </a:t>
+            </a:r>
+            <a:r>
+              <a:rPr lang="en-US" b="1" dirty="0" err="1" smtClean="0"/>
+              <a:t>data.dt</a:t>
+            </a:r>
+            <a:r>
+              <a:rPr lang="en-US" b="1" dirty="0" smtClean="0"/>
+              <a:t>(1</a:t>
+            </a:r>
+            <a:r>
+              <a:rPr lang="en-US" b="1" dirty="0"/>
+              <a:t>) = 40; % min, time to exit mitosis; enter mitosis at 0 min</a:t>
+            </a:r>
+            <a:endParaRPr lang="en-US" dirty="0"/>
+          </a:p>
+          <a:p>
+            <a:r>
+              <a:rPr lang="fr-FR" b="1" dirty="0"/>
+              <a:t>        </a:t>
+            </a:r>
+            <a:r>
+              <a:rPr lang="fr-FR" b="1" dirty="0" err="1"/>
+              <a:t>data.dt</a:t>
+            </a:r>
+            <a:r>
+              <a:rPr lang="fr-FR" b="1" dirty="0"/>
+              <a:t>(2) = 300; % min, </a:t>
+            </a:r>
+            <a:r>
+              <a:rPr lang="fr-FR" b="1" dirty="0" err="1"/>
+              <a:t>cell</a:t>
+            </a:r>
+            <a:r>
+              <a:rPr lang="fr-FR" b="1" dirty="0"/>
+              <a:t> cycle duration</a:t>
+            </a:r>
+            <a:endParaRPr lang="fr-FR" dirty="0"/>
+          </a:p>
+          <a:p>
+            <a:r>
+              <a:rPr lang="en-US" b="1" dirty="0"/>
+              <a:t>        % </a:t>
+            </a:r>
+            <a:endParaRPr lang="en-US" dirty="0"/>
+          </a:p>
+          <a:p>
+            <a:r>
+              <a:rPr lang="en-US" b="1" dirty="0"/>
+              <a:t>        </a:t>
+            </a:r>
+            <a:r>
+              <a:rPr lang="en-US" b="1" dirty="0" err="1"/>
+              <a:t>data.a</a:t>
+            </a:r>
+            <a:r>
+              <a:rPr lang="en-US" b="1" dirty="0"/>
+              <a:t>(1) = 0.01; % phosphorylation repels methyltransferase</a:t>
+            </a:r>
+            <a:endParaRPr lang="en-US" dirty="0"/>
+          </a:p>
+          <a:p>
+            <a:r>
+              <a:rPr lang="en-US" b="1" dirty="0"/>
+              <a:t>        </a:t>
+            </a:r>
+            <a:r>
+              <a:rPr lang="en-US" b="1" dirty="0" err="1"/>
+              <a:t>data.a</a:t>
+            </a:r>
+            <a:r>
+              <a:rPr lang="en-US" b="1" dirty="0"/>
+              <a:t>(2) = 0.01;  % phosphorylation recruit demethylase</a:t>
+            </a:r>
+            <a:endParaRPr lang="en-US" dirty="0"/>
+          </a:p>
+          <a:p>
+            <a:r>
+              <a:rPr lang="en-US" b="1" dirty="0"/>
+              <a:t>        </a:t>
+            </a:r>
+            <a:r>
+              <a:rPr lang="en-US" b="1" dirty="0" err="1"/>
+              <a:t>data.b</a:t>
+            </a:r>
+            <a:r>
+              <a:rPr lang="en-US" b="1" dirty="0"/>
+              <a:t> = 1; % the strength of kinase; </a:t>
+            </a:r>
+            <a:r>
+              <a:rPr lang="en-US" b="1" dirty="0" smtClean="0"/>
+              <a:t>b = 1- the strength of inhibitor</a:t>
+            </a:r>
+            <a:endParaRPr lang="en-US" dirty="0"/>
+          </a:p>
+          <a:p>
+            <a:r>
+              <a:rPr lang="en-US" b="1" dirty="0"/>
+              <a:t> </a:t>
+            </a:r>
+            <a:endParaRPr lang="en-US" dirty="0"/>
+          </a:p>
+          <a:p>
+            <a:r>
+              <a:rPr lang="en-US" b="1" dirty="0"/>
+              <a:t>        </a:t>
+            </a:r>
+            <a:r>
+              <a:rPr lang="en-US" b="1" dirty="0" err="1"/>
+              <a:t>data.time_step</a:t>
+            </a:r>
+            <a:r>
+              <a:rPr lang="en-US" b="1" dirty="0"/>
+              <a:t> = 1/20; % min, 3s </a:t>
+            </a:r>
+            <a:endParaRPr lang="en-US" dirty="0"/>
+          </a:p>
+          <a:p>
+            <a:endParaRPr lang="en-US" dirty="0"/>
+          </a:p>
+        </p:txBody>
+      </p:sp>
+    </p:spTree>
+    <p:extLst>
+      <p:ext uri="{BB962C8B-B14F-4D97-AF65-F5344CB8AC3E}">
+        <p14:creationId xmlns:p14="http://schemas.microsoft.com/office/powerpoint/2010/main" val="3352706702"/>
+      </p:ext>
+    </p:extLst>
+  </p:cSld>
+  <p:clrMapOvr>
+    <a:masterClrMapping/>
+  </p:clrMapOvr>
+</p:sld>
+</file>
+
+<file path=ppt/slides/slide4.xml><?xml version="1.0" encoding="utf-8"?>
 <p:sld xmlns:a="http://schemas.openxmlformats.org/drawingml/2006/main" xmlns:r="http://schemas.openxmlformats.org/officeDocument/2006/relationships" xmlns:p="http://schemas.openxmlformats.org/presentationml/2006/main">
   <p:cSld>
     <p:spTree>
@@ -5004,14 +5420,14 @@
           <p:nvPr>
             <p:extLst>
               <p:ext uri="{D42A27DB-BD31-4B8C-83A1-F6EECF244321}">
-                <p14:modId xmlns:p14="http://schemas.microsoft.com/office/powerpoint/2010/main" val="212529716"/>
+                <p14:modId xmlns:p14="http://schemas.microsoft.com/office/powerpoint/2010/main" val="1539564109"/>
               </p:ext>
             </p:extLst>
           </p:nvPr>
         </p:nvGraphicFramePr>
         <p:xfrm>
           <a:off x="1055834" y="5013088"/>
-          <a:ext cx="10341764" cy="1651000"/>
+          <a:ext cx="10341764" cy="1381760"/>
         </p:xfrm>
         <a:graphic>
           <a:graphicData uri="http://schemas.openxmlformats.org/drawingml/2006/table">
@@ -5021,9 +5437,9 @@
               </a:tblPr>
               <a:tblGrid>
                 <a:gridCol w="1038373"/>
-                <a:gridCol w="3120704"/>
-                <a:gridCol w="3397542"/>
-                <a:gridCol w="2785145"/>
+                <a:gridCol w="2900946"/>
+                <a:gridCol w="2723745"/>
+                <a:gridCol w="3678700"/>
               </a:tblGrid>
               <a:tr h="370840">
                 <a:tc>
@@ -5087,7 +5503,7 @@
                     <a:p>
                       <a:r>
                         <a:rPr lang="en-US" dirty="0" smtClean="0"/>
-                        <a:t>Enter interphase (2/3)</a:t>
+                        <a:t>Enter interphase (2/0)</a:t>
                       </a:r>
                       <a:endParaRPr lang="en-US" dirty="0"/>
                     </a:p>
@@ -5138,12 +5554,8 @@
                         <a:t> &gt;= </a:t>
                       </a:r>
                       <a:r>
-                        <a:rPr lang="en-US" baseline="0" dirty="0" err="1" smtClean="0"/>
-                        <a:t>num_histone</a:t>
-                      </a:r>
-                      <a:r>
                         <a:rPr lang="en-US" baseline="0" dirty="0" smtClean="0"/>
-                        <a:t> *30 min</a:t>
+                        <a:t>threshold</a:t>
                       </a:r>
                       <a:endParaRPr lang="en-US" dirty="0" smtClean="0"/>
                     </a:p>
@@ -5161,7 +5573,7 @@
                       </a:r>
                       <a:r>
                         <a:rPr lang="en-US" baseline="0" dirty="0" smtClean="0"/>
-                        <a:t> increases the basal level</a:t>
+                        <a:t> increases to the basal level</a:t>
                       </a:r>
                       <a:endParaRPr lang="en-US" dirty="0"/>
                     </a:p>
@@ -5213,7 +5625,7 @@
                       </a:r>
                       <a:r>
                         <a:rPr lang="en-US" baseline="0" dirty="0" smtClean="0"/>
-                        <a:t> and MT decrease</a:t>
+                        <a:t> decrease</a:t>
                       </a:r>
                       <a:endParaRPr lang="en-US" dirty="0"/>
                     </a:p>
@@ -5251,8 +5663,8 @@
         </p:nvSpPr>
         <p:spPr>
           <a:xfrm>
-            <a:off x="3657600" y="160020"/>
-            <a:ext cx="6880860" cy="461665"/>
+            <a:off x="1738745" y="160020"/>
+            <a:ext cx="8799715" cy="461665"/>
           </a:xfrm>
           <a:prstGeom prst="rect">
             <a:avLst/>
@@ -5267,7 +5679,15 @@
           <a:p>
             <a:r>
               <a:rPr lang="en-US" sz="2400" b="1" dirty="0" smtClean="0"/>
-              <a:t>Three States between interphase and mitosis</a:t>
+              <a:t>Control of three </a:t>
+            </a:r>
+            <a:r>
+              <a:rPr lang="en-US" sz="2400" b="1" dirty="0"/>
+              <a:t>s</a:t>
+            </a:r>
+            <a:r>
+              <a:rPr lang="en-US" sz="2400" b="1" dirty="0" smtClean="0"/>
+              <a:t>tates between interphase and mitosis</a:t>
             </a:r>
             <a:endParaRPr lang="en-US" sz="2400" b="1" dirty="0"/>
           </a:p>
@@ -5276,7 +5696,7 @@
     </p:spTree>
     <p:extLst>
       <p:ext uri="{BB962C8B-B14F-4D97-AF65-F5344CB8AC3E}">
-        <p14:creationId xmlns:p14="http://schemas.microsoft.com/office/powerpoint/2010/main" val="2440439495"/>
+        <p14:creationId xmlns:p14="http://schemas.microsoft.com/office/powerpoint/2010/main" val="3982633013"/>
       </p:ext>
     </p:extLst>
   </p:cSld>
@@ -5286,7 +5706,1700 @@
 </p:sld>
 </file>
 
-<file path=ppt/slides/slide4.xml><?xml version="1.0" encoding="utf-8"?>
+<file path=ppt/slides/slide5.xml><?xml version="1.0" encoding="utf-8"?>
+<p:sld xmlns:a="http://schemas.openxmlformats.org/drawingml/2006/main" xmlns:r="http://schemas.openxmlformats.org/officeDocument/2006/relationships" xmlns:p="http://schemas.openxmlformats.org/presentationml/2006/main">
+  <p:cSld>
+    <p:spTree>
+      <p:nvGrpSpPr>
+        <p:cNvPr id="1" name=""/>
+        <p:cNvGrpSpPr/>
+        <p:nvPr/>
+      </p:nvGrpSpPr>
+      <p:grpSpPr>
+        <a:xfrm>
+          <a:off x="0" y="0"/>
+          <a:ext cx="0" cy="0"/>
+          <a:chOff x="0" y="0"/>
+          <a:chExt cx="0" cy="0"/>
+        </a:xfrm>
+      </p:grpSpPr>
+      <p:sp>
+        <p:nvSpPr>
+          <p:cNvPr id="2" name="TextBox 1"/>
+          <p:cNvSpPr txBox="1"/>
+          <p:nvPr/>
+        </p:nvSpPr>
+        <p:spPr>
+          <a:xfrm>
+            <a:off x="555464" y="184243"/>
+            <a:ext cx="8799715" cy="461665"/>
+          </a:xfrm>
+          <a:prstGeom prst="rect">
+            <a:avLst/>
+          </a:prstGeom>
+          <a:noFill/>
+        </p:spPr>
+        <p:txBody>
+          <a:bodyPr wrap="square" rtlCol="0">
+            <a:spAutoFit/>
+          </a:bodyPr>
+          <a:lstStyle/>
+          <a:p>
+            <a:r>
+              <a:rPr lang="en-US" sz="2400" b="1" dirty="0" smtClean="0"/>
+              <a:t>Model </a:t>
+            </a:r>
+            <a:r>
+              <a:rPr lang="en-US" sz="2400" b="1" dirty="0" smtClean="0"/>
+              <a:t>Parameters (slide 1)</a:t>
+            </a:r>
+            <a:endParaRPr lang="en-US" sz="2400" b="1" dirty="0"/>
+          </a:p>
+        </p:txBody>
+      </p:sp>
+      <p:graphicFrame>
+        <p:nvGraphicFramePr>
+          <p:cNvPr id="4" name="Table 3"/>
+          <p:cNvGraphicFramePr>
+            <a:graphicFrameLocks noGrp="1"/>
+          </p:cNvGraphicFramePr>
+          <p:nvPr>
+            <p:extLst>
+              <p:ext uri="{D42A27DB-BD31-4B8C-83A1-F6EECF244321}">
+                <p14:modId xmlns:p14="http://schemas.microsoft.com/office/powerpoint/2010/main" val="1683427000"/>
+              </p:ext>
+            </p:extLst>
+          </p:nvPr>
+        </p:nvGraphicFramePr>
+        <p:xfrm>
+          <a:off x="555464" y="714360"/>
+          <a:ext cx="11156124" cy="5567348"/>
+        </p:xfrm>
+        <a:graphic>
+          <a:graphicData uri="http://schemas.openxmlformats.org/drawingml/2006/table">
+            <a:tbl>
+              <a:tblPr firstRow="1" bandRow="1">
+                <a:tableStyleId>{5C22544A-7EE6-4342-B048-85BDC9FD1C3A}</a:tableStyleId>
+              </a:tblPr>
+              <a:tblGrid>
+                <a:gridCol w="3123952"/>
+                <a:gridCol w="1891447"/>
+                <a:gridCol w="2668754"/>
+                <a:gridCol w="3471971"/>
+              </a:tblGrid>
+              <a:tr h="538148">
+                <a:tc>
+                  <a:txBody>
+                    <a:bodyPr/>
+                    <a:lstStyle/>
+                    <a:p>
+                      <a:r>
+                        <a:rPr lang="en-US" dirty="0" smtClean="0"/>
+                        <a:t>Description (name)</a:t>
+                      </a:r>
+                      <a:endParaRPr lang="en-US" dirty="0"/>
+                    </a:p>
+                  </a:txBody>
+                  <a:tcPr/>
+                </a:tc>
+                <a:tc>
+                  <a:txBody>
+                    <a:bodyPr/>
+                    <a:lstStyle/>
+                    <a:p>
+                      <a:r>
+                        <a:rPr lang="en-US" dirty="0" smtClean="0"/>
+                        <a:t>Value </a:t>
+                      </a:r>
+                      <a:endParaRPr lang="en-US" dirty="0"/>
+                    </a:p>
+                  </a:txBody>
+                  <a:tcPr/>
+                </a:tc>
+                <a:tc>
+                  <a:txBody>
+                    <a:bodyPr/>
+                    <a:lstStyle/>
+                    <a:p>
+                      <a:r>
+                        <a:rPr lang="en-US" dirty="0" smtClean="0"/>
+                        <a:t>Reference</a:t>
+                      </a:r>
+                      <a:endParaRPr lang="en-US" dirty="0"/>
+                    </a:p>
+                  </a:txBody>
+                  <a:tcPr/>
+                </a:tc>
+                <a:tc>
+                  <a:txBody>
+                    <a:bodyPr/>
+                    <a:lstStyle/>
+                    <a:p>
+                      <a:r>
+                        <a:rPr lang="en-US" dirty="0" smtClean="0"/>
+                        <a:t>Justification</a:t>
+                      </a:r>
+                      <a:endParaRPr lang="en-US" dirty="0"/>
+                    </a:p>
+                  </a:txBody>
+                  <a:tcPr/>
+                </a:tc>
+              </a:tr>
+              <a:tr h="538148">
+                <a:tc>
+                  <a:txBody>
+                    <a:bodyPr/>
+                    <a:lstStyle/>
+                    <a:p>
+                      <a:r>
+                        <a:rPr lang="en-US" dirty="0" smtClean="0"/>
+                        <a:t>Total number of histones (</a:t>
+                      </a:r>
+                      <a:r>
+                        <a:rPr lang="en-US" dirty="0" err="1" smtClean="0"/>
+                        <a:t>num_histone</a:t>
+                      </a:r>
+                      <a:r>
+                        <a:rPr lang="en-US" dirty="0" smtClean="0"/>
+                        <a:t>)</a:t>
+                      </a:r>
+                      <a:endParaRPr lang="en-US" dirty="0"/>
+                    </a:p>
+                  </a:txBody>
+                  <a:tcPr/>
+                </a:tc>
+                <a:tc>
+                  <a:txBody>
+                    <a:bodyPr/>
+                    <a:lstStyle/>
+                    <a:p>
+                      <a:r>
+                        <a:rPr lang="en-US" dirty="0" smtClean="0"/>
+                        <a:t>60,000K</a:t>
+                      </a:r>
+                      <a:endParaRPr lang="en-US" dirty="0"/>
+                    </a:p>
+                  </a:txBody>
+                  <a:tcPr/>
+                </a:tc>
+                <a:tc>
+                  <a:txBody>
+                    <a:bodyPr/>
+                    <a:lstStyle/>
+                    <a:p>
+                      <a:r>
+                        <a:rPr lang="en-US" dirty="0" smtClean="0"/>
+                        <a:t>Alberts et</a:t>
+                      </a:r>
+                      <a:r>
+                        <a:rPr lang="en-US" baseline="0" dirty="0" smtClean="0"/>
+                        <a:t> al. 2002</a:t>
+                      </a:r>
+                      <a:endParaRPr lang="en-US" dirty="0"/>
+                    </a:p>
+                  </a:txBody>
+                  <a:tcPr/>
+                </a:tc>
+                <a:tc>
+                  <a:txBody>
+                    <a:bodyPr/>
+                    <a:lstStyle/>
+                    <a:p>
+                      <a:endParaRPr lang="en-US" dirty="0"/>
+                    </a:p>
+                  </a:txBody>
+                  <a:tcPr/>
+                </a:tc>
+              </a:tr>
+              <a:tr h="538148">
+                <a:tc>
+                  <a:txBody>
+                    <a:bodyPr/>
+                    <a:lstStyle/>
+                    <a:p>
+                      <a:r>
+                        <a:rPr lang="en-US" dirty="0" smtClean="0"/>
+                        <a:t>Basal level of methylated H3K9 at the</a:t>
+                      </a:r>
+                      <a:r>
+                        <a:rPr lang="en-US" baseline="0" dirty="0" smtClean="0"/>
+                        <a:t> interphase (</a:t>
+                      </a:r>
+                      <a:r>
+                        <a:rPr lang="en-US" baseline="0" dirty="0" err="1" smtClean="0"/>
+                        <a:t>base_methyl</a:t>
+                      </a:r>
+                      <a:r>
+                        <a:rPr lang="en-US" baseline="0" dirty="0" smtClean="0"/>
+                        <a:t>)</a:t>
+                      </a:r>
+                      <a:endParaRPr lang="en-US" dirty="0"/>
+                    </a:p>
+                  </a:txBody>
+                  <a:tcPr/>
+                </a:tc>
+                <a:tc>
+                  <a:txBody>
+                    <a:bodyPr/>
+                    <a:lstStyle/>
+                    <a:p>
+                      <a:r>
+                        <a:rPr lang="en-US" dirty="0" smtClean="0"/>
+                        <a:t>57% of all</a:t>
+                      </a:r>
+                      <a:r>
+                        <a:rPr lang="en-US" baseline="0" dirty="0" smtClean="0"/>
+                        <a:t> histones</a:t>
+                      </a:r>
+                      <a:endParaRPr lang="en-US" dirty="0"/>
+                    </a:p>
+                  </a:txBody>
+                  <a:tcPr/>
+                </a:tc>
+                <a:tc>
+                  <a:txBody>
+                    <a:bodyPr/>
+                    <a:lstStyle/>
+                    <a:p>
+                      <a:r>
+                        <a:rPr lang="en-US" dirty="0" smtClean="0"/>
+                        <a:t>Figs. 1c and 1d</a:t>
+                      </a:r>
+                      <a:endParaRPr lang="en-US" dirty="0"/>
+                    </a:p>
+                  </a:txBody>
+                  <a:tcPr/>
+                </a:tc>
+                <a:tc>
+                  <a:txBody>
+                    <a:bodyPr/>
+                    <a:lstStyle/>
+                    <a:p>
+                      <a:pPr marL="0" marR="0" lvl="0" indent="0" algn="l" defTabSz="914400" rtl="0" eaLnBrk="1" fontAlgn="auto" latinLnBrk="0" hangingPunct="1">
+                        <a:lnSpc>
+                          <a:spcPct val="100000"/>
+                        </a:lnSpc>
+                        <a:spcBef>
+                          <a:spcPts val="0"/>
+                        </a:spcBef>
+                        <a:spcAft>
+                          <a:spcPts val="0"/>
+                        </a:spcAft>
+                        <a:buClrTx/>
+                        <a:buSzTx/>
+                        <a:buFontTx/>
+                        <a:buNone/>
+                        <a:tabLst/>
+                        <a:defRPr/>
+                      </a:pPr>
+                      <a:r>
+                        <a:rPr lang="en-US" dirty="0" err="1" smtClean="0"/>
+                        <a:t>Sua</a:t>
+                      </a:r>
+                      <a:r>
+                        <a:rPr lang="en-US" dirty="0" smtClean="0"/>
+                        <a:t> -/- decrease 40%; TCP (inhibitor KDM) increases 30%</a:t>
+                      </a:r>
+                      <a:r>
+                        <a:rPr lang="en-US" dirty="0" smtClean="0">
+                          <a:sym typeface="Wingdings" panose="05000000000000000000" pitchFamily="2" charset="2"/>
+                        </a:rPr>
+                        <a:t>.</a:t>
+                      </a:r>
+                      <a:r>
+                        <a:rPr lang="en-US" baseline="0" dirty="0" smtClean="0">
+                          <a:sym typeface="Wingdings" panose="05000000000000000000" pitchFamily="2" charset="2"/>
+                        </a:rPr>
+                        <a:t> So</a:t>
+                      </a:r>
+                      <a:r>
+                        <a:rPr lang="en-US" dirty="0" smtClean="0">
+                          <a:sym typeface="Wingdings" panose="05000000000000000000" pitchFamily="2" charset="2"/>
+                        </a:rPr>
+                        <a:t> 4/7 = 0.57 = 57% </a:t>
+                      </a:r>
+                    </a:p>
+                  </a:txBody>
+                  <a:tcPr/>
+                </a:tc>
+              </a:tr>
+              <a:tr h="538148">
+                <a:tc>
+                  <a:txBody>
+                    <a:bodyPr/>
+                    <a:lstStyle/>
+                    <a:p>
+                      <a:r>
+                        <a:rPr lang="en-US" dirty="0" smtClean="0"/>
+                        <a:t>Total number of</a:t>
+                      </a:r>
+                      <a:r>
+                        <a:rPr lang="en-US" baseline="0" dirty="0" smtClean="0"/>
+                        <a:t> MTs/KDMs (</a:t>
+                      </a:r>
+                      <a:r>
+                        <a:rPr lang="en-US" baseline="0" dirty="0" err="1" smtClean="0"/>
+                        <a:t>max_methyl</a:t>
+                      </a:r>
+                      <a:r>
+                        <a:rPr lang="en-US" baseline="0" dirty="0" smtClean="0"/>
+                        <a:t>)</a:t>
+                      </a:r>
+                      <a:endParaRPr lang="en-US" dirty="0"/>
+                    </a:p>
+                  </a:txBody>
+                  <a:tcPr/>
+                </a:tc>
+                <a:tc>
+                  <a:txBody>
+                    <a:bodyPr/>
+                    <a:lstStyle/>
+                    <a:p>
+                      <a:r>
+                        <a:rPr lang="en-US" dirty="0" smtClean="0"/>
+                        <a:t>300K</a:t>
+                      </a:r>
+                      <a:endParaRPr lang="en-US" dirty="0"/>
+                    </a:p>
+                  </a:txBody>
+                  <a:tcPr/>
+                </a:tc>
+                <a:tc>
+                  <a:txBody>
+                    <a:bodyPr/>
+                    <a:lstStyle/>
+                    <a:p>
+                      <a:r>
+                        <a:rPr lang="en-US" sz="1800" kern="1200" dirty="0" err="1" smtClean="0">
+                          <a:solidFill>
+                            <a:schemeClr val="dk1"/>
+                          </a:solidFill>
+                          <a:effectLst/>
+                          <a:latin typeface="+mn-lt"/>
+                          <a:ea typeface="+mn-ea"/>
+                          <a:cs typeface="+mn-cs"/>
+                        </a:rPr>
+                        <a:t>Biggin</a:t>
+                      </a:r>
+                      <a:r>
+                        <a:rPr lang="en-US" sz="1800" kern="1200" dirty="0" smtClean="0">
+                          <a:solidFill>
+                            <a:schemeClr val="dk1"/>
+                          </a:solidFill>
+                          <a:effectLst/>
+                          <a:latin typeface="+mn-lt"/>
+                          <a:ea typeface="+mn-ea"/>
+                          <a:cs typeface="+mn-cs"/>
+                        </a:rPr>
+                        <a:t> MD 2011 Dev Cell</a:t>
+                      </a:r>
+                      <a:endParaRPr lang="en-US" dirty="0"/>
+                    </a:p>
+                  </a:txBody>
+                  <a:tcPr/>
+                </a:tc>
+                <a:tc>
+                  <a:txBody>
+                    <a:bodyPr/>
+                    <a:lstStyle/>
+                    <a:p>
+                      <a:r>
+                        <a:rPr lang="en-US" dirty="0" smtClean="0">
+                          <a:solidFill>
+                            <a:srgbClr val="FF0000"/>
+                          </a:solidFill>
+                        </a:rPr>
+                        <a:t>??? (Could</a:t>
+                      </a:r>
+                      <a:r>
+                        <a:rPr lang="en-US" baseline="0" dirty="0" smtClean="0">
+                          <a:solidFill>
+                            <a:srgbClr val="FF0000"/>
+                          </a:solidFill>
+                        </a:rPr>
+                        <a:t> Peter input?)</a:t>
+                      </a:r>
+                      <a:endParaRPr lang="en-US" dirty="0">
+                        <a:solidFill>
+                          <a:srgbClr val="FF0000"/>
+                        </a:solidFill>
+                      </a:endParaRPr>
+                    </a:p>
+                  </a:txBody>
+                  <a:tcPr/>
+                </a:tc>
+              </a:tr>
+              <a:tr h="538148">
+                <a:tc>
+                  <a:txBody>
+                    <a:bodyPr/>
+                    <a:lstStyle/>
+                    <a:p>
+                      <a:r>
+                        <a:rPr lang="en-US" dirty="0" smtClean="0"/>
+                        <a:t>Increase of MTs</a:t>
+                      </a:r>
+                      <a:r>
+                        <a:rPr lang="en-US" baseline="0" dirty="0" smtClean="0"/>
+                        <a:t> at the entrance of mitosis (</a:t>
+                      </a:r>
+                      <a:r>
+                        <a:rPr lang="en-US" baseline="0" dirty="0" err="1" smtClean="0"/>
+                        <a:t>more_methyl</a:t>
+                      </a:r>
+                      <a:r>
+                        <a:rPr lang="en-US" baseline="0" dirty="0" smtClean="0"/>
+                        <a:t>)</a:t>
+                      </a:r>
+                      <a:endParaRPr lang="en-US" dirty="0"/>
+                    </a:p>
+                  </a:txBody>
+                  <a:tcPr/>
+                </a:tc>
+                <a:tc>
+                  <a:txBody>
+                    <a:bodyPr/>
+                    <a:lstStyle/>
+                    <a:p>
+                      <a:r>
+                        <a:rPr lang="en-US" dirty="0" smtClean="0"/>
+                        <a:t>150K </a:t>
+                      </a:r>
+                      <a:endParaRPr lang="en-US" dirty="0"/>
+                    </a:p>
+                  </a:txBody>
+                  <a:tcPr/>
+                </a:tc>
+                <a:tc>
+                  <a:txBody>
+                    <a:bodyPr/>
+                    <a:lstStyle/>
+                    <a:p>
+                      <a:r>
+                        <a:rPr lang="en-US" dirty="0" smtClean="0">
+                          <a:solidFill>
+                            <a:srgbClr val="FF0000"/>
+                          </a:solidFill>
+                        </a:rPr>
+                        <a:t>???</a:t>
+                      </a:r>
+                      <a:endParaRPr lang="en-US" dirty="0">
+                        <a:solidFill>
+                          <a:srgbClr val="FF0000"/>
+                        </a:solidFill>
+                      </a:endParaRPr>
+                    </a:p>
+                  </a:txBody>
+                  <a:tcPr/>
+                </a:tc>
+                <a:tc>
+                  <a:txBody>
+                    <a:bodyPr/>
+                    <a:lstStyle/>
+                    <a:p>
+                      <a:r>
+                        <a:rPr lang="en-US" dirty="0" smtClean="0"/>
+                        <a:t> 50% of </a:t>
+                      </a:r>
+                      <a:r>
+                        <a:rPr lang="en-US" dirty="0" err="1" smtClean="0"/>
+                        <a:t>max_methyl</a:t>
+                      </a:r>
+                      <a:endParaRPr lang="en-US" dirty="0"/>
+                    </a:p>
+                  </a:txBody>
+                  <a:tcPr/>
+                </a:tc>
+              </a:tr>
+              <a:tr h="538148">
+                <a:tc>
+                  <a:txBody>
+                    <a:bodyPr/>
+                    <a:lstStyle/>
+                    <a:p>
+                      <a:r>
+                        <a:rPr lang="en-US" dirty="0" smtClean="0"/>
+                        <a:t>Total number of</a:t>
+                      </a:r>
+                      <a:r>
+                        <a:rPr lang="en-US" baseline="0" dirty="0" smtClean="0"/>
+                        <a:t> serine kinases and PTPs (</a:t>
+                      </a:r>
+                      <a:r>
+                        <a:rPr lang="en-US" baseline="0" dirty="0" err="1" smtClean="0"/>
+                        <a:t>max_mol</a:t>
+                      </a:r>
+                      <a:r>
+                        <a:rPr lang="en-US" baseline="0" dirty="0" smtClean="0"/>
+                        <a:t>)</a:t>
+                      </a:r>
+                      <a:endParaRPr lang="en-US" dirty="0"/>
+                    </a:p>
+                  </a:txBody>
+                  <a:tcPr/>
+                </a:tc>
+                <a:tc>
+                  <a:txBody>
+                    <a:bodyPr/>
+                    <a:lstStyle/>
+                    <a:p>
+                      <a:r>
+                        <a:rPr lang="en-US" dirty="0" smtClean="0"/>
+                        <a:t>2,250K</a:t>
+                      </a:r>
+                      <a:endParaRPr lang="en-US" dirty="0"/>
+                    </a:p>
+                  </a:txBody>
+                  <a:tcPr/>
+                </a:tc>
+                <a:tc>
+                  <a:txBody>
+                    <a:bodyPr/>
+                    <a:lstStyle/>
+                    <a:p>
+                      <a:r>
+                        <a:rPr lang="en-US" dirty="0" smtClean="0"/>
+                        <a:t>http://preotineatlas.org</a:t>
+                      </a:r>
+                      <a:endParaRPr lang="en-US" dirty="0"/>
+                    </a:p>
+                  </a:txBody>
+                  <a:tcPr/>
+                </a:tc>
+                <a:tc>
+                  <a:txBody>
+                    <a:bodyPr/>
+                    <a:lstStyle/>
+                    <a:p>
+                      <a:r>
+                        <a:rPr lang="en-US" dirty="0" err="1" smtClean="0"/>
+                        <a:t>Yijias</a:t>
+                      </a:r>
+                      <a:r>
+                        <a:rPr lang="en-US" dirty="0" smtClean="0"/>
+                        <a:t> statistics: </a:t>
+                      </a:r>
+                      <a:r>
+                        <a:rPr lang="en-US" dirty="0" err="1" smtClean="0"/>
+                        <a:t>Aurkb</a:t>
+                      </a:r>
+                      <a:r>
+                        <a:rPr lang="en-US" dirty="0" smtClean="0"/>
+                        <a:t> (~60) and KDM4C (~8), so </a:t>
+                      </a:r>
+                      <a:r>
+                        <a:rPr lang="en-US" dirty="0" err="1" smtClean="0"/>
+                        <a:t>kinase:KDM</a:t>
+                      </a:r>
+                      <a:r>
+                        <a:rPr lang="en-US" dirty="0" smtClean="0"/>
+                        <a:t> = 7.5:1</a:t>
+                      </a:r>
+                      <a:endParaRPr lang="en-US" dirty="0"/>
+                    </a:p>
+                  </a:txBody>
+                  <a:tcPr/>
+                </a:tc>
+              </a:tr>
+              <a:tr h="538148">
+                <a:tc>
+                  <a:txBody>
+                    <a:bodyPr/>
+                    <a:lstStyle/>
+                    <a:p>
+                      <a:r>
+                        <a:rPr lang="en-US" dirty="0" smtClean="0"/>
+                        <a:t>Increase</a:t>
+                      </a:r>
+                      <a:r>
+                        <a:rPr lang="en-US" baseline="0" dirty="0" smtClean="0"/>
+                        <a:t> of kinases at the entrance of mitosis (</a:t>
+                      </a:r>
+                      <a:r>
+                        <a:rPr lang="en-US" baseline="0" dirty="0" err="1" smtClean="0"/>
+                        <a:t>more_phosphor</a:t>
+                      </a:r>
+                      <a:r>
+                        <a:rPr lang="en-US" baseline="0" dirty="0" smtClean="0"/>
+                        <a:t>) </a:t>
+                      </a:r>
+                      <a:endParaRPr lang="en-US" dirty="0"/>
+                    </a:p>
+                  </a:txBody>
+                  <a:tcPr/>
+                </a:tc>
+                <a:tc>
+                  <a:txBody>
+                    <a:bodyPr/>
+                    <a:lstStyle/>
+                    <a:p>
+                      <a:r>
+                        <a:rPr lang="en-US" dirty="0" smtClean="0"/>
+                        <a:t>300K</a:t>
+                      </a:r>
+                      <a:endParaRPr lang="en-US" dirty="0"/>
+                    </a:p>
+                  </a:txBody>
+                  <a:tcPr/>
+                </a:tc>
+                <a:tc>
+                  <a:txBody>
+                    <a:bodyPr/>
+                    <a:lstStyle/>
+                    <a:p>
+                      <a:r>
+                        <a:rPr lang="en-US" dirty="0" smtClean="0">
+                          <a:solidFill>
+                            <a:srgbClr val="FF0000"/>
+                          </a:solidFill>
+                        </a:rPr>
+                        <a:t>???</a:t>
+                      </a:r>
+                      <a:endParaRPr lang="en-US" dirty="0">
+                        <a:solidFill>
+                          <a:srgbClr val="FF0000"/>
+                        </a:solidFill>
+                      </a:endParaRPr>
+                    </a:p>
+                  </a:txBody>
+                  <a:tcPr/>
+                </a:tc>
+                <a:tc>
+                  <a:txBody>
+                    <a:bodyPr/>
+                    <a:lstStyle/>
+                    <a:p>
+                      <a:r>
+                        <a:rPr lang="en-US" dirty="0" smtClean="0"/>
+                        <a:t>13% of </a:t>
+                      </a:r>
+                      <a:r>
+                        <a:rPr lang="en-US" dirty="0" err="1" smtClean="0"/>
+                        <a:t>max_mol</a:t>
+                      </a:r>
+                      <a:endParaRPr lang="en-US" dirty="0"/>
+                    </a:p>
+                  </a:txBody>
+                  <a:tcPr/>
+                </a:tc>
+              </a:tr>
+              <a:tr h="538148">
+                <a:tc>
+                  <a:txBody>
+                    <a:bodyPr/>
+                    <a:lstStyle/>
+                    <a:p>
+                      <a:r>
+                        <a:rPr lang="en-US" dirty="0" smtClean="0"/>
+                        <a:t>Threshold to exist</a:t>
+                      </a:r>
+                      <a:r>
+                        <a:rPr lang="en-US" baseline="0" dirty="0" smtClean="0"/>
+                        <a:t> mitosis</a:t>
+                      </a:r>
+                      <a:endParaRPr lang="en-US" dirty="0"/>
+                    </a:p>
+                  </a:txBody>
+                  <a:tcPr/>
+                </a:tc>
+                <a:tc>
+                  <a:txBody>
+                    <a:bodyPr/>
+                    <a:lstStyle/>
+                    <a:p>
+                      <a:r>
+                        <a:rPr lang="en-US" dirty="0" smtClean="0"/>
+                        <a:t>30 min</a:t>
+                      </a:r>
+                      <a:r>
+                        <a:rPr lang="en-US" baseline="0" dirty="0" smtClean="0"/>
+                        <a:t> </a:t>
+                      </a:r>
+                      <a:r>
+                        <a:rPr lang="en-US" dirty="0" smtClean="0"/>
+                        <a:t>*</a:t>
+                      </a:r>
+                      <a:r>
+                        <a:rPr lang="en-US" dirty="0" err="1" smtClean="0"/>
+                        <a:t>num_histone</a:t>
+                      </a:r>
+                      <a:endParaRPr lang="en-US" dirty="0"/>
+                    </a:p>
+                  </a:txBody>
+                  <a:tcPr/>
+                </a:tc>
+                <a:tc>
+                  <a:txBody>
+                    <a:bodyPr/>
+                    <a:lstStyle/>
+                    <a:p>
+                      <a:r>
+                        <a:rPr lang="en-US" dirty="0" smtClean="0">
+                          <a:solidFill>
+                            <a:srgbClr val="FF0000"/>
+                          </a:solidFill>
+                        </a:rPr>
+                        <a:t>???</a:t>
+                      </a:r>
+                      <a:r>
+                        <a:rPr lang="en-US" dirty="0" smtClean="0"/>
+                        <a:t> [CDK1</a:t>
+                      </a:r>
+                      <a:r>
+                        <a:rPr lang="en-US" baseline="0" dirty="0" smtClean="0"/>
+                        <a:t> is the master regulator]</a:t>
+                      </a:r>
+                      <a:endParaRPr lang="en-US" dirty="0"/>
+                    </a:p>
+                  </a:txBody>
+                  <a:tcPr/>
+                </a:tc>
+                <a:tc>
+                  <a:txBody>
+                    <a:bodyPr/>
+                    <a:lstStyle/>
+                    <a:p>
+                      <a:r>
+                        <a:rPr lang="en-US" dirty="0" smtClean="0">
+                          <a:solidFill>
+                            <a:srgbClr val="FF0000"/>
+                          </a:solidFill>
+                        </a:rPr>
+                        <a:t>Could</a:t>
+                      </a:r>
+                      <a:r>
+                        <a:rPr lang="en-US" baseline="0" dirty="0" smtClean="0">
+                          <a:solidFill>
+                            <a:srgbClr val="FF0000"/>
+                          </a:solidFill>
+                        </a:rPr>
+                        <a:t> Peter input?)</a:t>
+                      </a:r>
+                      <a:endParaRPr lang="en-US" dirty="0"/>
+                    </a:p>
+                  </a:txBody>
+                  <a:tcPr/>
+                </a:tc>
+              </a:tr>
+            </a:tbl>
+          </a:graphicData>
+        </a:graphic>
+      </p:graphicFrame>
+    </p:spTree>
+    <p:extLst>
+      <p:ext uri="{BB962C8B-B14F-4D97-AF65-F5344CB8AC3E}">
+        <p14:creationId xmlns:p14="http://schemas.microsoft.com/office/powerpoint/2010/main" val="2721886318"/>
+      </p:ext>
+    </p:extLst>
+  </p:cSld>
+  <p:clrMapOvr>
+    <a:masterClrMapping/>
+  </p:clrMapOvr>
+</p:sld>
+</file>
+
+<file path=ppt/slides/slide6.xml><?xml version="1.0" encoding="utf-8"?>
+<p:sld xmlns:a="http://schemas.openxmlformats.org/drawingml/2006/main" xmlns:r="http://schemas.openxmlformats.org/officeDocument/2006/relationships" xmlns:p="http://schemas.openxmlformats.org/presentationml/2006/main">
+  <p:cSld>
+    <p:spTree>
+      <p:nvGrpSpPr>
+        <p:cNvPr id="1" name=""/>
+        <p:cNvGrpSpPr/>
+        <p:nvPr/>
+      </p:nvGrpSpPr>
+      <p:grpSpPr>
+        <a:xfrm>
+          <a:off x="0" y="0"/>
+          <a:ext cx="0" cy="0"/>
+          <a:chOff x="0" y="0"/>
+          <a:chExt cx="0" cy="0"/>
+        </a:xfrm>
+      </p:grpSpPr>
+      <p:sp>
+        <p:nvSpPr>
+          <p:cNvPr id="2" name="TextBox 1"/>
+          <p:cNvSpPr txBox="1"/>
+          <p:nvPr/>
+        </p:nvSpPr>
+        <p:spPr>
+          <a:xfrm>
+            <a:off x="772093" y="160020"/>
+            <a:ext cx="8799715" cy="461665"/>
+          </a:xfrm>
+          <a:prstGeom prst="rect">
+            <a:avLst/>
+          </a:prstGeom>
+          <a:noFill/>
+        </p:spPr>
+        <p:txBody>
+          <a:bodyPr wrap="square" rtlCol="0">
+            <a:spAutoFit/>
+          </a:bodyPr>
+          <a:lstStyle/>
+          <a:p>
+            <a:r>
+              <a:rPr lang="en-US" sz="2400" b="1" dirty="0" smtClean="0"/>
+              <a:t>Model </a:t>
+            </a:r>
+            <a:r>
+              <a:rPr lang="en-US" sz="2400" b="1" dirty="0" smtClean="0"/>
+              <a:t>Parameters (slide 2)</a:t>
+            </a:r>
+            <a:endParaRPr lang="en-US" sz="2400" b="1" dirty="0"/>
+          </a:p>
+        </p:txBody>
+      </p:sp>
+      <p:graphicFrame>
+        <p:nvGraphicFramePr>
+          <p:cNvPr id="4" name="Table 3"/>
+          <p:cNvGraphicFramePr>
+            <a:graphicFrameLocks noGrp="1"/>
+          </p:cNvGraphicFramePr>
+          <p:nvPr>
+            <p:extLst>
+              <p:ext uri="{D42A27DB-BD31-4B8C-83A1-F6EECF244321}">
+                <p14:modId xmlns:p14="http://schemas.microsoft.com/office/powerpoint/2010/main" val="1170178110"/>
+              </p:ext>
+            </p:extLst>
+          </p:nvPr>
+        </p:nvGraphicFramePr>
+        <p:xfrm>
+          <a:off x="882468" y="702249"/>
+          <a:ext cx="10429447" cy="5525380"/>
+        </p:xfrm>
+        <a:graphic>
+          <a:graphicData uri="http://schemas.openxmlformats.org/drawingml/2006/table">
+            <a:tbl>
+              <a:tblPr firstRow="1" bandRow="1">
+                <a:tableStyleId>{5C22544A-7EE6-4342-B048-85BDC9FD1C3A}</a:tableStyleId>
+              </a:tblPr>
+              <a:tblGrid>
+                <a:gridCol w="3622920"/>
+                <a:gridCol w="1065791"/>
+                <a:gridCol w="2494919"/>
+                <a:gridCol w="3245817"/>
+              </a:tblGrid>
+              <a:tr h="538148">
+                <a:tc>
+                  <a:txBody>
+                    <a:bodyPr/>
+                    <a:lstStyle/>
+                    <a:p>
+                      <a:r>
+                        <a:rPr lang="en-US" dirty="0" smtClean="0"/>
+                        <a:t>Description (name)</a:t>
+                      </a:r>
+                      <a:endParaRPr lang="en-US" dirty="0"/>
+                    </a:p>
+                  </a:txBody>
+                  <a:tcPr/>
+                </a:tc>
+                <a:tc>
+                  <a:txBody>
+                    <a:bodyPr/>
+                    <a:lstStyle/>
+                    <a:p>
+                      <a:r>
+                        <a:rPr lang="en-US" dirty="0" smtClean="0"/>
+                        <a:t>Value </a:t>
+                      </a:r>
+                      <a:endParaRPr lang="en-US" dirty="0"/>
+                    </a:p>
+                  </a:txBody>
+                  <a:tcPr/>
+                </a:tc>
+                <a:tc>
+                  <a:txBody>
+                    <a:bodyPr/>
+                    <a:lstStyle/>
+                    <a:p>
+                      <a:r>
+                        <a:rPr lang="en-US" dirty="0" smtClean="0"/>
+                        <a:t>Reference</a:t>
+                      </a:r>
+                      <a:endParaRPr lang="en-US" dirty="0"/>
+                    </a:p>
+                  </a:txBody>
+                  <a:tcPr/>
+                </a:tc>
+                <a:tc>
+                  <a:txBody>
+                    <a:bodyPr/>
+                    <a:lstStyle/>
+                    <a:p>
+                      <a:r>
+                        <a:rPr lang="en-US" dirty="0" smtClean="0"/>
+                        <a:t>Justification</a:t>
+                      </a:r>
+                      <a:endParaRPr lang="en-US" dirty="0"/>
+                    </a:p>
+                  </a:txBody>
+                  <a:tcPr/>
+                </a:tc>
+              </a:tr>
+              <a:tr h="538148">
+                <a:tc>
+                  <a:txBody>
+                    <a:bodyPr/>
+                    <a:lstStyle/>
+                    <a:p>
+                      <a:r>
+                        <a:rPr lang="en-US" dirty="0" smtClean="0"/>
+                        <a:t>Basal</a:t>
+                      </a:r>
+                      <a:r>
+                        <a:rPr lang="en-US" baseline="0" dirty="0" smtClean="0"/>
+                        <a:t> level of </a:t>
+                      </a:r>
+                      <a:r>
+                        <a:rPr lang="en-US" dirty="0" smtClean="0"/>
+                        <a:t>H3S10P</a:t>
+                      </a:r>
+                      <a:r>
+                        <a:rPr lang="en-US" baseline="0" dirty="0" smtClean="0"/>
+                        <a:t> at interphase</a:t>
+                      </a:r>
+                      <a:endParaRPr lang="en-US" dirty="0"/>
+                    </a:p>
+                  </a:txBody>
+                  <a:tcPr/>
+                </a:tc>
+                <a:tc>
+                  <a:txBody>
+                    <a:bodyPr/>
+                    <a:lstStyle/>
+                    <a:p>
+                      <a:r>
+                        <a:rPr lang="en-US" dirty="0" smtClean="0"/>
+                        <a:t>0</a:t>
+                      </a:r>
+                      <a:endParaRPr lang="en-US" dirty="0"/>
+                    </a:p>
+                  </a:txBody>
+                  <a:tcPr/>
+                </a:tc>
+                <a:tc>
+                  <a:txBody>
+                    <a:bodyPr/>
+                    <a:lstStyle/>
+                    <a:p>
+                      <a:endParaRPr lang="en-US" dirty="0"/>
+                    </a:p>
+                  </a:txBody>
+                  <a:tcPr/>
+                </a:tc>
+                <a:tc>
+                  <a:txBody>
+                    <a:bodyPr/>
+                    <a:lstStyle/>
+                    <a:p>
+                      <a:r>
+                        <a:rPr lang="en-US" dirty="0" smtClean="0"/>
+                        <a:t>OK</a:t>
+                      </a:r>
+                      <a:endParaRPr lang="en-US" dirty="0"/>
+                    </a:p>
+                  </a:txBody>
+                  <a:tcPr/>
+                </a:tc>
+              </a:tr>
+              <a:tr h="538148">
+                <a:tc>
+                  <a:txBody>
+                    <a:bodyPr/>
+                    <a:lstStyle/>
+                    <a:p>
+                      <a:r>
+                        <a:rPr lang="en-US" dirty="0" smtClean="0"/>
+                        <a:t>Basal</a:t>
+                      </a:r>
+                      <a:r>
+                        <a:rPr lang="en-US" baseline="0" dirty="0" smtClean="0"/>
+                        <a:t> level of </a:t>
+                      </a:r>
+                      <a:r>
+                        <a:rPr lang="en-US" dirty="0" smtClean="0"/>
+                        <a:t>Serine </a:t>
+                      </a:r>
+                      <a:r>
+                        <a:rPr lang="en-US" dirty="0" smtClean="0"/>
+                        <a:t>kinase</a:t>
+                      </a:r>
+                      <a:endParaRPr lang="en-US" dirty="0"/>
+                    </a:p>
+                  </a:txBody>
+                  <a:tcPr/>
+                </a:tc>
+                <a:tc>
+                  <a:txBody>
+                    <a:bodyPr/>
+                    <a:lstStyle/>
+                    <a:p>
+                      <a:r>
+                        <a:rPr lang="en-US" dirty="0" smtClean="0"/>
+                        <a:t>500K</a:t>
+                      </a:r>
+                      <a:endParaRPr lang="en-US" dirty="0"/>
+                    </a:p>
+                  </a:txBody>
+                  <a:tcPr/>
+                </a:tc>
+                <a:tc>
+                  <a:txBody>
+                    <a:bodyPr/>
+                    <a:lstStyle/>
+                    <a:p>
+                      <a:r>
+                        <a:rPr lang="en-US" dirty="0" smtClean="0">
+                          <a:solidFill>
+                            <a:srgbClr val="FF0000"/>
+                          </a:solidFill>
+                        </a:rPr>
+                        <a:t>???</a:t>
+                      </a:r>
+                      <a:endParaRPr lang="en-US" dirty="0">
+                        <a:solidFill>
+                          <a:srgbClr val="FF0000"/>
+                        </a:solidFill>
+                      </a:endParaRPr>
+                    </a:p>
+                  </a:txBody>
+                  <a:tcPr/>
+                </a:tc>
+                <a:tc>
+                  <a:txBody>
+                    <a:bodyPr/>
+                    <a:lstStyle/>
+                    <a:p>
+                      <a:endParaRPr lang="en-US" dirty="0"/>
+                    </a:p>
+                  </a:txBody>
+                  <a:tcPr/>
+                </a:tc>
+              </a:tr>
+              <a:tr h="538148">
+                <a:tc>
+                  <a:txBody>
+                    <a:bodyPr/>
+                    <a:lstStyle/>
+                    <a:p>
+                      <a:r>
+                        <a:rPr lang="en-US" dirty="0" smtClean="0"/>
+                        <a:t>Basal level of PTP</a:t>
+                      </a:r>
+                      <a:endParaRPr lang="en-US" dirty="0"/>
+                    </a:p>
+                  </a:txBody>
+                  <a:tcPr/>
+                </a:tc>
+                <a:tc>
+                  <a:txBody>
+                    <a:bodyPr/>
+                    <a:lstStyle/>
+                    <a:p>
+                      <a:r>
+                        <a:rPr lang="en-US" dirty="0" smtClean="0"/>
+                        <a:t>500K</a:t>
+                      </a:r>
+                      <a:endParaRPr lang="en-US" dirty="0"/>
+                    </a:p>
+                  </a:txBody>
+                  <a:tcPr/>
+                </a:tc>
+                <a:tc>
+                  <a:txBody>
+                    <a:bodyPr/>
+                    <a:lstStyle/>
+                    <a:p>
+                      <a:endParaRPr lang="en-US" dirty="0">
+                        <a:solidFill>
+                          <a:srgbClr val="FF0000"/>
+                        </a:solidFill>
+                      </a:endParaRPr>
+                    </a:p>
+                  </a:txBody>
+                  <a:tcPr/>
+                </a:tc>
+                <a:tc>
+                  <a:txBody>
+                    <a:bodyPr/>
+                    <a:lstStyle/>
+                    <a:p>
+                      <a:r>
+                        <a:rPr lang="en-US" dirty="0" smtClean="0"/>
+                        <a:t>OK</a:t>
+                      </a:r>
+                      <a:endParaRPr lang="en-US" dirty="0"/>
+                    </a:p>
+                  </a:txBody>
+                  <a:tcPr/>
+                </a:tc>
+              </a:tr>
+              <a:tr h="538148">
+                <a:tc>
+                  <a:txBody>
+                    <a:bodyPr/>
+                    <a:lstStyle/>
+                    <a:p>
+                      <a:r>
+                        <a:rPr lang="en-US" dirty="0" smtClean="0"/>
+                        <a:t>Basal level of MTs</a:t>
+                      </a:r>
+                      <a:endParaRPr lang="en-US" dirty="0"/>
+                    </a:p>
+                  </a:txBody>
+                  <a:tcPr/>
+                </a:tc>
+                <a:tc>
+                  <a:txBody>
+                    <a:bodyPr/>
+                    <a:lstStyle/>
+                    <a:p>
+                      <a:r>
+                        <a:rPr lang="en-US" dirty="0" smtClean="0"/>
+                        <a:t>100K</a:t>
+                      </a:r>
+                      <a:endParaRPr lang="en-US" dirty="0"/>
+                    </a:p>
+                  </a:txBody>
+                  <a:tcPr/>
+                </a:tc>
+                <a:tc>
+                  <a:txBody>
+                    <a:bodyPr/>
+                    <a:lstStyle/>
+                    <a:p>
+                      <a:r>
+                        <a:rPr lang="en-US" dirty="0" smtClean="0">
+                          <a:solidFill>
+                            <a:srgbClr val="FF0000"/>
+                          </a:solidFill>
+                        </a:rPr>
+                        <a:t>???</a:t>
+                      </a:r>
+                      <a:endParaRPr lang="en-US" dirty="0">
+                        <a:solidFill>
+                          <a:srgbClr val="FF0000"/>
+                        </a:solidFill>
+                      </a:endParaRPr>
+                    </a:p>
+                  </a:txBody>
+                  <a:tcPr/>
+                </a:tc>
+                <a:tc>
+                  <a:txBody>
+                    <a:bodyPr/>
+                    <a:lstStyle/>
+                    <a:p>
+                      <a:endParaRPr lang="en-US"/>
+                    </a:p>
+                  </a:txBody>
+                  <a:tcPr/>
+                </a:tc>
+              </a:tr>
+              <a:tr h="269074">
+                <a:tc>
+                  <a:txBody>
+                    <a:bodyPr/>
+                    <a:lstStyle/>
+                    <a:p>
+                      <a:r>
+                        <a:rPr lang="en-US" dirty="0" smtClean="0"/>
+                        <a:t>Basal level of KDMs</a:t>
+                      </a:r>
+                      <a:endParaRPr lang="en-US" dirty="0"/>
+                    </a:p>
+                  </a:txBody>
+                  <a:tcPr/>
+                </a:tc>
+                <a:tc>
+                  <a:txBody>
+                    <a:bodyPr/>
+                    <a:lstStyle/>
+                    <a:p>
+                      <a:r>
+                        <a:rPr lang="en-US" dirty="0" smtClean="0"/>
+                        <a:t>100K</a:t>
+                      </a:r>
+                      <a:endParaRPr lang="en-US" dirty="0"/>
+                    </a:p>
+                  </a:txBody>
+                  <a:tcPr/>
+                </a:tc>
+                <a:tc>
+                  <a:txBody>
+                    <a:bodyPr/>
+                    <a:lstStyle/>
+                    <a:p>
+                      <a:endParaRPr lang="en-US" dirty="0">
+                        <a:solidFill>
+                          <a:srgbClr val="FF0000"/>
+                        </a:solidFill>
+                      </a:endParaRPr>
+                    </a:p>
+                  </a:txBody>
+                  <a:tcPr/>
+                </a:tc>
+                <a:tc>
+                  <a:txBody>
+                    <a:bodyPr/>
+                    <a:lstStyle/>
+                    <a:p>
+                      <a:r>
+                        <a:rPr lang="en-US" dirty="0" smtClean="0"/>
+                        <a:t>OK</a:t>
+                      </a:r>
+                      <a:endParaRPr lang="en-US" dirty="0"/>
+                    </a:p>
+                  </a:txBody>
+                  <a:tcPr/>
+                </a:tc>
+              </a:tr>
+              <a:tr h="320040">
+                <a:tc>
+                  <a:txBody>
+                    <a:bodyPr/>
+                    <a:lstStyle/>
+                    <a:p>
+                      <a:r>
+                        <a:rPr lang="en-US" dirty="0" smtClean="0"/>
+                        <a:t>S10P</a:t>
+                      </a:r>
+                      <a:r>
+                        <a:rPr lang="en-US" baseline="0" dirty="0" smtClean="0"/>
+                        <a:t> repels MTs (a(1))</a:t>
+                      </a:r>
+                      <a:endParaRPr lang="en-US" dirty="0"/>
+                    </a:p>
+                  </a:txBody>
+                  <a:tcPr/>
+                </a:tc>
+                <a:tc>
+                  <a:txBody>
+                    <a:bodyPr/>
+                    <a:lstStyle/>
+                    <a:p>
+                      <a:r>
+                        <a:rPr lang="en-US" dirty="0" smtClean="0"/>
+                        <a:t>0.01</a:t>
+                      </a:r>
+                      <a:endParaRPr lang="en-US" dirty="0"/>
+                    </a:p>
+                  </a:txBody>
+                  <a:tcPr/>
+                </a:tc>
+                <a:tc>
+                  <a:txBody>
+                    <a:bodyPr/>
+                    <a:lstStyle/>
+                    <a:p>
+                      <a:r>
+                        <a:rPr lang="en-US" sz="1800" kern="1200" dirty="0" smtClean="0">
+                          <a:solidFill>
+                            <a:srgbClr val="FF0000"/>
+                          </a:solidFill>
+                          <a:effectLst/>
+                          <a:latin typeface="+mn-lt"/>
+                          <a:ea typeface="+mn-ea"/>
+                          <a:cs typeface="+mn-cs"/>
+                        </a:rPr>
+                        <a:t>???</a:t>
+                      </a:r>
+                      <a:endParaRPr lang="en-US" dirty="0">
+                        <a:solidFill>
+                          <a:srgbClr val="FF0000"/>
+                        </a:solidFill>
+                      </a:endParaRPr>
+                    </a:p>
+                  </a:txBody>
+                  <a:tcPr/>
+                </a:tc>
+                <a:tc>
+                  <a:txBody>
+                    <a:bodyPr/>
+                    <a:lstStyle/>
+                    <a:p>
+                      <a:endParaRPr lang="en-US" dirty="0"/>
+                    </a:p>
+                  </a:txBody>
+                  <a:tcPr/>
+                </a:tc>
+              </a:tr>
+              <a:tr h="182880">
+                <a:tc>
+                  <a:txBody>
+                    <a:bodyPr/>
+                    <a:lstStyle/>
+                    <a:p>
+                      <a:r>
+                        <a:rPr lang="en-US" dirty="0" smtClean="0"/>
+                        <a:t>S10P recruits</a:t>
+                      </a:r>
+                      <a:r>
+                        <a:rPr lang="en-US" baseline="0" dirty="0" smtClean="0"/>
+                        <a:t> KDMs (a(2))</a:t>
+                      </a:r>
+                      <a:endParaRPr lang="en-US" dirty="0"/>
+                    </a:p>
+                  </a:txBody>
+                  <a:tcPr/>
+                </a:tc>
+                <a:tc>
+                  <a:txBody>
+                    <a:bodyPr/>
+                    <a:lstStyle/>
+                    <a:p>
+                      <a:r>
+                        <a:rPr lang="en-US" dirty="0" smtClean="0"/>
+                        <a:t>0.01</a:t>
+                      </a:r>
+                      <a:endParaRPr lang="en-US" dirty="0"/>
+                    </a:p>
+                  </a:txBody>
+                  <a:tcPr/>
+                </a:tc>
+                <a:tc>
+                  <a:txBody>
+                    <a:bodyPr/>
+                    <a:lstStyle/>
+                    <a:p>
+                      <a:r>
+                        <a:rPr lang="en-US" dirty="0" smtClean="0">
+                          <a:solidFill>
+                            <a:srgbClr val="FF0000"/>
+                          </a:solidFill>
+                        </a:rPr>
+                        <a:t>???</a:t>
+                      </a:r>
+                      <a:endParaRPr lang="en-US" dirty="0">
+                        <a:solidFill>
+                          <a:srgbClr val="FF0000"/>
+                        </a:solidFill>
+                      </a:endParaRPr>
+                    </a:p>
+                  </a:txBody>
+                  <a:tcPr/>
+                </a:tc>
+                <a:tc>
+                  <a:txBody>
+                    <a:bodyPr/>
+                    <a:lstStyle/>
+                    <a:p>
+                      <a:endParaRPr lang="en-US"/>
+                    </a:p>
+                  </a:txBody>
+                  <a:tcPr/>
+                </a:tc>
+              </a:tr>
+              <a:tr h="182880">
+                <a:tc>
+                  <a:txBody>
+                    <a:bodyPr/>
+                    <a:lstStyle/>
+                    <a:p>
+                      <a:r>
+                        <a:rPr lang="en-US" dirty="0" smtClean="0"/>
+                        <a:t>Strength</a:t>
+                      </a:r>
+                      <a:r>
+                        <a:rPr lang="en-US" baseline="0" dirty="0" smtClean="0"/>
+                        <a:t> of kinase</a:t>
+                      </a:r>
+                      <a:endParaRPr lang="en-US" dirty="0"/>
+                    </a:p>
+                  </a:txBody>
+                  <a:tcPr/>
+                </a:tc>
+                <a:tc>
+                  <a:txBody>
+                    <a:bodyPr/>
+                    <a:lstStyle/>
+                    <a:p>
+                      <a:r>
+                        <a:rPr lang="en-US" dirty="0" smtClean="0"/>
+                        <a:t>1</a:t>
+                      </a:r>
+                      <a:r>
+                        <a:rPr lang="en-US" baseline="0" dirty="0" smtClean="0"/>
+                        <a:t> or less</a:t>
+                      </a:r>
+                      <a:endParaRPr lang="en-US" dirty="0"/>
+                    </a:p>
+                  </a:txBody>
+                  <a:tcPr/>
+                </a:tc>
+                <a:tc>
+                  <a:txBody>
+                    <a:bodyPr/>
+                    <a:lstStyle/>
+                    <a:p>
+                      <a:endParaRPr lang="en-US" dirty="0">
+                        <a:solidFill>
+                          <a:srgbClr val="FF0000"/>
+                        </a:solidFill>
+                      </a:endParaRPr>
+                    </a:p>
+                  </a:txBody>
+                  <a:tcPr/>
+                </a:tc>
+                <a:tc>
+                  <a:txBody>
+                    <a:bodyPr/>
+                    <a:lstStyle/>
+                    <a:p>
+                      <a:r>
+                        <a:rPr lang="en-US" dirty="0" smtClean="0"/>
+                        <a:t>1</a:t>
+                      </a:r>
+                      <a:r>
+                        <a:rPr lang="en-US" baseline="0" dirty="0" smtClean="0"/>
+                        <a:t> or 1- strength of inhibitor</a:t>
+                      </a:r>
+                    </a:p>
+                  </a:txBody>
+                  <a:tcPr/>
+                </a:tc>
+              </a:tr>
+              <a:tr h="121920">
+                <a:tc>
+                  <a:txBody>
+                    <a:bodyPr/>
+                    <a:lstStyle/>
+                    <a:p>
+                      <a:r>
+                        <a:rPr lang="en-US" dirty="0" smtClean="0"/>
+                        <a:t>Time needed for</a:t>
+                      </a:r>
+                      <a:r>
+                        <a:rPr lang="en-US" baseline="0" dirty="0" smtClean="0"/>
+                        <a:t> reaction and recruiting</a:t>
+                      </a:r>
+                      <a:endParaRPr lang="en-US" dirty="0"/>
+                    </a:p>
+                  </a:txBody>
+                  <a:tcPr/>
+                </a:tc>
+                <a:tc>
+                  <a:txBody>
+                    <a:bodyPr/>
+                    <a:lstStyle/>
+                    <a:p>
+                      <a:r>
+                        <a:rPr lang="en-US" dirty="0" smtClean="0"/>
+                        <a:t>3s</a:t>
+                      </a:r>
+                      <a:endParaRPr lang="en-US" dirty="0"/>
+                    </a:p>
+                  </a:txBody>
+                  <a:tcPr/>
+                </a:tc>
+                <a:tc>
+                  <a:txBody>
+                    <a:bodyPr/>
+                    <a:lstStyle/>
+                    <a:p>
+                      <a:r>
+                        <a:rPr lang="en-US" dirty="0" smtClean="0">
+                          <a:solidFill>
+                            <a:srgbClr val="FF0000"/>
+                          </a:solidFill>
+                        </a:rPr>
+                        <a:t>???</a:t>
+                      </a:r>
+                      <a:endParaRPr lang="en-US" dirty="0">
+                        <a:solidFill>
+                          <a:srgbClr val="FF0000"/>
+                        </a:solidFill>
+                      </a:endParaRPr>
+                    </a:p>
+                  </a:txBody>
+                  <a:tcPr/>
+                </a:tc>
+                <a:tc>
+                  <a:txBody>
+                    <a:bodyPr/>
+                    <a:lstStyle/>
+                    <a:p>
+                      <a:r>
+                        <a:rPr lang="en-US" baseline="0" dirty="0" smtClean="0">
+                          <a:solidFill>
+                            <a:srgbClr val="FF0000"/>
+                          </a:solidFill>
+                        </a:rPr>
+                        <a:t>Could Qin check?</a:t>
+                      </a:r>
+                      <a:endParaRPr lang="en-US" baseline="0" dirty="0" smtClean="0">
+                        <a:solidFill>
+                          <a:srgbClr val="FF0000"/>
+                        </a:solidFill>
+                      </a:endParaRPr>
+                    </a:p>
+                  </a:txBody>
+                  <a:tcPr/>
+                </a:tc>
+              </a:tr>
+              <a:tr h="243840">
+                <a:tc>
+                  <a:txBody>
+                    <a:bodyPr/>
+                    <a:lstStyle/>
+                    <a:p>
+                      <a:r>
+                        <a:rPr lang="en-US" dirty="0" smtClean="0"/>
+                        <a:t>Earliest time to exist mitosis (</a:t>
+                      </a:r>
+                      <a:r>
+                        <a:rPr lang="en-US" dirty="0" err="1" smtClean="0"/>
+                        <a:t>dt</a:t>
+                      </a:r>
+                      <a:r>
+                        <a:rPr lang="en-US" dirty="0" smtClean="0"/>
+                        <a:t>(1))</a:t>
+                      </a:r>
+                      <a:endParaRPr lang="en-US" dirty="0"/>
+                    </a:p>
+                  </a:txBody>
+                  <a:tcPr/>
+                </a:tc>
+                <a:tc>
+                  <a:txBody>
+                    <a:bodyPr/>
+                    <a:lstStyle/>
+                    <a:p>
+                      <a:r>
+                        <a:rPr lang="en-US" dirty="0" smtClean="0"/>
+                        <a:t>40</a:t>
+                      </a:r>
+                      <a:r>
+                        <a:rPr lang="en-US" baseline="0" dirty="0" smtClean="0"/>
+                        <a:t> min</a:t>
+                      </a:r>
+                      <a:endParaRPr lang="en-US" dirty="0"/>
+                    </a:p>
+                  </a:txBody>
+                  <a:tcPr/>
+                </a:tc>
+                <a:tc>
+                  <a:txBody>
+                    <a:bodyPr/>
+                    <a:lstStyle/>
+                    <a:p>
+                      <a:r>
+                        <a:rPr lang="en-US" dirty="0" smtClean="0">
+                          <a:solidFill>
+                            <a:srgbClr val="FF0000"/>
+                          </a:solidFill>
+                        </a:rPr>
+                        <a:t>???</a:t>
+                      </a:r>
+                      <a:endParaRPr lang="en-US" dirty="0">
+                        <a:solidFill>
+                          <a:srgbClr val="FF0000"/>
+                        </a:solidFill>
+                      </a:endParaRPr>
+                    </a:p>
+                  </a:txBody>
+                  <a:tcPr/>
+                </a:tc>
+                <a:tc>
+                  <a:txBody>
+                    <a:bodyPr/>
+                    <a:lstStyle/>
+                    <a:p>
+                      <a:endParaRPr lang="en-US" baseline="0" dirty="0" smtClean="0"/>
+                    </a:p>
+                  </a:txBody>
+                  <a:tcPr/>
+                </a:tc>
+              </a:tr>
+              <a:tr h="121920">
+                <a:tc>
+                  <a:txBody>
+                    <a:bodyPr/>
+                    <a:lstStyle/>
+                    <a:p>
+                      <a:r>
+                        <a:rPr lang="en-US" dirty="0" smtClean="0"/>
+                        <a:t>Duration of a cell cycle (</a:t>
+                      </a:r>
+                      <a:r>
+                        <a:rPr lang="en-US" dirty="0" err="1" smtClean="0"/>
+                        <a:t>dt</a:t>
+                      </a:r>
+                      <a:r>
+                        <a:rPr lang="en-US" dirty="0" smtClean="0"/>
+                        <a:t>(2)) </a:t>
+                      </a:r>
+                      <a:endParaRPr lang="en-US" dirty="0"/>
+                    </a:p>
+                  </a:txBody>
+                  <a:tcPr/>
+                </a:tc>
+                <a:tc>
+                  <a:txBody>
+                    <a:bodyPr/>
+                    <a:lstStyle/>
+                    <a:p>
+                      <a:r>
+                        <a:rPr lang="en-US" dirty="0" smtClean="0"/>
+                        <a:t>300 min</a:t>
+                      </a:r>
+                      <a:endParaRPr lang="en-US" dirty="0"/>
+                    </a:p>
+                  </a:txBody>
+                  <a:tcPr/>
+                </a:tc>
+                <a:tc>
+                  <a:txBody>
+                    <a:bodyPr/>
+                    <a:lstStyle/>
+                    <a:p>
+                      <a:r>
+                        <a:rPr lang="en-US" dirty="0" smtClean="0">
+                          <a:solidFill>
+                            <a:srgbClr val="FF0000"/>
+                          </a:solidFill>
+                        </a:rPr>
+                        <a:t>???</a:t>
+                      </a:r>
+                      <a:endParaRPr lang="en-US" dirty="0">
+                        <a:solidFill>
+                          <a:srgbClr val="FF0000"/>
+                        </a:solidFill>
+                      </a:endParaRPr>
+                    </a:p>
+                  </a:txBody>
+                  <a:tcPr/>
+                </a:tc>
+                <a:tc>
+                  <a:txBody>
+                    <a:bodyPr/>
+                    <a:lstStyle/>
+                    <a:p>
+                      <a:endParaRPr lang="en-US" baseline="0" dirty="0" smtClean="0"/>
+                    </a:p>
+                  </a:txBody>
+                  <a:tcPr/>
+                </a:tc>
+              </a:tr>
+            </a:tbl>
+          </a:graphicData>
+        </a:graphic>
+      </p:graphicFrame>
+    </p:spTree>
+    <p:extLst>
+      <p:ext uri="{BB962C8B-B14F-4D97-AF65-F5344CB8AC3E}">
+        <p14:creationId xmlns:p14="http://schemas.microsoft.com/office/powerpoint/2010/main" val="289164213"/>
+      </p:ext>
+    </p:extLst>
+  </p:cSld>
+  <p:clrMapOvr>
+    <a:masterClrMapping/>
+  </p:clrMapOvr>
+</p:sld>
+</file>
+
+<file path=ppt/slides/slide7.xml><?xml version="1.0" encoding="utf-8"?>
 <p:sld xmlns:a="http://schemas.openxmlformats.org/drawingml/2006/main" xmlns:r="http://schemas.openxmlformats.org/officeDocument/2006/relationships" xmlns:p="http://schemas.openxmlformats.org/presentationml/2006/main">
   <p:cSld>
     <p:spTree>
@@ -5327,11 +7440,7 @@
           <a:p>
             <a:r>
               <a:rPr lang="en-US" sz="2400" b="1" dirty="0" smtClean="0"/>
-              <a:t>S10P repelling MT is crucial for fast demethylation at mitotic entrance, while </a:t>
-            </a:r>
-            <a:r>
-              <a:rPr lang="en-US" sz="2400" b="1" dirty="0" smtClean="0"/>
-              <a:t>S10P recruiting KDM plays an assisting role</a:t>
+              <a:t>S10P repelling MT is crucial for fast demethylation at mitotic entrance, while S10P recruiting KDM plays an assisting role</a:t>
             </a:r>
             <a:endParaRPr lang="en-US" sz="2400" b="1" dirty="0"/>
           </a:p>
@@ -6389,7 +8498,7 @@
 </p:sld>
 </file>
 
-<file path=ppt/slides/slide5.xml><?xml version="1.0" encoding="utf-8"?>
+<file path=ppt/slides/slide8.xml><?xml version="1.0" encoding="utf-8"?>
 <p:sld xmlns:a="http://schemas.openxmlformats.org/drawingml/2006/main" xmlns:r="http://schemas.openxmlformats.org/officeDocument/2006/relationships" xmlns:p="http://schemas.openxmlformats.org/presentationml/2006/main">
   <p:cSld>
     <p:spTree>
@@ -6439,7 +8548,7 @@
         <p:spPr>
           <a:xfrm>
             <a:off x="461319" y="313209"/>
-            <a:ext cx="6936822" cy="461665"/>
+            <a:ext cx="6936822" cy="830997"/>
           </a:xfrm>
           <a:prstGeom prst="rect">
             <a:avLst/>
@@ -6454,7 +8563,15 @@
           <a:p>
             <a:r>
               <a:rPr lang="en-US" sz="2400" b="1" dirty="0" smtClean="0"/>
-              <a:t>Model2: MT did not increase at entrance of Mitosis</a:t>
+              <a:t>Model2: MT did not increase </a:t>
+            </a:r>
+            <a:r>
+              <a:rPr lang="en-US" sz="2400" b="1" smtClean="0"/>
+              <a:t>at the entrance </a:t>
+            </a:r>
+            <a:r>
+              <a:rPr lang="en-US" sz="2400" b="1" dirty="0" smtClean="0"/>
+              <a:t>of Mitosis</a:t>
             </a:r>
             <a:endParaRPr lang="en-US" sz="2400" b="1" dirty="0"/>
           </a:p>
@@ -6501,6 +8618,121 @@
     <p:extLst>
       <p:ext uri="{BB962C8B-B14F-4D97-AF65-F5344CB8AC3E}">
         <p14:creationId xmlns:p14="http://schemas.microsoft.com/office/powerpoint/2010/main" val="3742112732"/>
+      </p:ext>
+    </p:extLst>
+  </p:cSld>
+  <p:clrMapOvr>
+    <a:masterClrMapping/>
+  </p:clrMapOvr>
+</p:sld>
+</file>
+
+<file path=ppt/slides/slide9.xml><?xml version="1.0" encoding="utf-8"?>
+<p:sld xmlns:a="http://schemas.openxmlformats.org/drawingml/2006/main" xmlns:r="http://schemas.openxmlformats.org/officeDocument/2006/relationships" xmlns:p="http://schemas.openxmlformats.org/presentationml/2006/main">
+  <p:cSld>
+    <p:spTree>
+      <p:nvGrpSpPr>
+        <p:cNvPr id="1" name=""/>
+        <p:cNvGrpSpPr/>
+        <p:nvPr/>
+      </p:nvGrpSpPr>
+      <p:grpSpPr>
+        <a:xfrm>
+          <a:off x="0" y="0"/>
+          <a:ext cx="0" cy="0"/>
+          <a:chOff x="0" y="0"/>
+          <a:chExt cx="0" cy="0"/>
+        </a:xfrm>
+      </p:grpSpPr>
+      <p:pic>
+        <p:nvPicPr>
+          <p:cNvPr id="3" name="Picture 2"/>
+          <p:cNvPicPr>
+            <a:picLocks noChangeAspect="1"/>
+          </p:cNvPicPr>
+          <p:nvPr/>
+        </p:nvPicPr>
+        <p:blipFill>
+          <a:blip r:embed="rId2"/>
+          <a:stretch>
+            <a:fillRect/>
+          </a:stretch>
+        </p:blipFill>
+        <p:spPr>
+          <a:xfrm>
+            <a:off x="767665" y="777532"/>
+            <a:ext cx="8182555" cy="2863778"/>
+          </a:xfrm>
+          <a:prstGeom prst="rect">
+            <a:avLst/>
+          </a:prstGeom>
+        </p:spPr>
+      </p:pic>
+      <p:sp>
+        <p:nvSpPr>
+          <p:cNvPr id="4" name="TextBox 3"/>
+          <p:cNvSpPr txBox="1"/>
+          <p:nvPr/>
+        </p:nvSpPr>
+        <p:spPr>
+          <a:xfrm>
+            <a:off x="1017346" y="230114"/>
+            <a:ext cx="6104074" cy="369332"/>
+          </a:xfrm>
+          <a:prstGeom prst="rect">
+            <a:avLst/>
+          </a:prstGeom>
+          <a:noFill/>
+        </p:spPr>
+        <p:txBody>
+          <a:bodyPr wrap="square" rtlCol="0">
+            <a:spAutoFit/>
+          </a:bodyPr>
+          <a:lstStyle/>
+          <a:p>
+            <a:r>
+              <a:rPr lang="en-US" dirty="0"/>
+              <a:t>&gt;&gt; </a:t>
+            </a:r>
+            <a:r>
+              <a:rPr lang="en-US" dirty="0" err="1"/>
+              <a:t>test_pm_model</a:t>
+            </a:r>
+            <a:r>
+              <a:rPr lang="en-US" dirty="0"/>
+              <a:t>('model4');</a:t>
+            </a:r>
+          </a:p>
+        </p:txBody>
+      </p:sp>
+      <p:pic>
+        <p:nvPicPr>
+          <p:cNvPr id="5" name="Picture 4"/>
+          <p:cNvPicPr>
+            <a:picLocks noChangeAspect="1"/>
+          </p:cNvPicPr>
+          <p:nvPr/>
+        </p:nvPicPr>
+        <p:blipFill>
+          <a:blip r:embed="rId3"/>
+          <a:stretch>
+            <a:fillRect/>
+          </a:stretch>
+        </p:blipFill>
+        <p:spPr>
+          <a:xfrm>
+            <a:off x="767665" y="3641310"/>
+            <a:ext cx="7801050" cy="2712014"/>
+          </a:xfrm>
+          <a:prstGeom prst="rect">
+            <a:avLst/>
+          </a:prstGeom>
+        </p:spPr>
+      </p:pic>
+    </p:spTree>
+    <p:extLst>
+      <p:ext uri="{BB962C8B-B14F-4D97-AF65-F5344CB8AC3E}">
+        <p14:creationId xmlns:p14="http://schemas.microsoft.com/office/powerpoint/2010/main" val="678477960"/>
       </p:ext>
     </p:extLst>
   </p:cSld>

</xml_diff>

<commit_message>
Minor bugfix for Qunaty
</commit_message>
<xml_diff>
--- a/app/model/result_0211_2017.pptx
+++ b/app/model/result_0211_2017.pptx
@@ -251,7 +251,7 @@
           <a:p>
             <a:fld id="{13FF81DB-72FD-4E0B-96E8-AA8F3653C4D4}" type="datetimeFigureOut">
               <a:rPr lang="en-US" smtClean="0"/>
-              <a:t>2/19/2017</a:t>
+              <a:t>2/21/2017</a:t>
             </a:fld>
             <a:endParaRPr lang="en-US"/>
           </a:p>
@@ -421,7 +421,7 @@
           <a:p>
             <a:fld id="{13FF81DB-72FD-4E0B-96E8-AA8F3653C4D4}" type="datetimeFigureOut">
               <a:rPr lang="en-US" smtClean="0"/>
-              <a:t>2/19/2017</a:t>
+              <a:t>2/21/2017</a:t>
             </a:fld>
             <a:endParaRPr lang="en-US"/>
           </a:p>
@@ -601,7 +601,7 @@
           <a:p>
             <a:fld id="{13FF81DB-72FD-4E0B-96E8-AA8F3653C4D4}" type="datetimeFigureOut">
               <a:rPr lang="en-US" smtClean="0"/>
-              <a:t>2/19/2017</a:t>
+              <a:t>2/21/2017</a:t>
             </a:fld>
             <a:endParaRPr lang="en-US"/>
           </a:p>
@@ -771,7 +771,7 @@
           <a:p>
             <a:fld id="{13FF81DB-72FD-4E0B-96E8-AA8F3653C4D4}" type="datetimeFigureOut">
               <a:rPr lang="en-US" smtClean="0"/>
-              <a:t>2/19/2017</a:t>
+              <a:t>2/21/2017</a:t>
             </a:fld>
             <a:endParaRPr lang="en-US"/>
           </a:p>
@@ -1017,7 +1017,7 @@
           <a:p>
             <a:fld id="{13FF81DB-72FD-4E0B-96E8-AA8F3653C4D4}" type="datetimeFigureOut">
               <a:rPr lang="en-US" smtClean="0"/>
-              <a:t>2/19/2017</a:t>
+              <a:t>2/21/2017</a:t>
             </a:fld>
             <a:endParaRPr lang="en-US"/>
           </a:p>
@@ -1249,7 +1249,7 @@
           <a:p>
             <a:fld id="{13FF81DB-72FD-4E0B-96E8-AA8F3653C4D4}" type="datetimeFigureOut">
               <a:rPr lang="en-US" smtClean="0"/>
-              <a:t>2/19/2017</a:t>
+              <a:t>2/21/2017</a:t>
             </a:fld>
             <a:endParaRPr lang="en-US"/>
           </a:p>
@@ -1616,7 +1616,7 @@
           <a:p>
             <a:fld id="{13FF81DB-72FD-4E0B-96E8-AA8F3653C4D4}" type="datetimeFigureOut">
               <a:rPr lang="en-US" smtClean="0"/>
-              <a:t>2/19/2017</a:t>
+              <a:t>2/21/2017</a:t>
             </a:fld>
             <a:endParaRPr lang="en-US"/>
           </a:p>
@@ -1734,7 +1734,7 @@
           <a:p>
             <a:fld id="{13FF81DB-72FD-4E0B-96E8-AA8F3653C4D4}" type="datetimeFigureOut">
               <a:rPr lang="en-US" smtClean="0"/>
-              <a:t>2/19/2017</a:t>
+              <a:t>2/21/2017</a:t>
             </a:fld>
             <a:endParaRPr lang="en-US"/>
           </a:p>
@@ -1829,7 +1829,7 @@
           <a:p>
             <a:fld id="{13FF81DB-72FD-4E0B-96E8-AA8F3653C4D4}" type="datetimeFigureOut">
               <a:rPr lang="en-US" smtClean="0"/>
-              <a:t>2/19/2017</a:t>
+              <a:t>2/21/2017</a:t>
             </a:fld>
             <a:endParaRPr lang="en-US"/>
           </a:p>
@@ -2106,7 +2106,7 @@
           <a:p>
             <a:fld id="{13FF81DB-72FD-4E0B-96E8-AA8F3653C4D4}" type="datetimeFigureOut">
               <a:rPr lang="en-US" smtClean="0"/>
-              <a:t>2/19/2017</a:t>
+              <a:t>2/21/2017</a:t>
             </a:fld>
             <a:endParaRPr lang="en-US"/>
           </a:p>
@@ -2359,7 +2359,7 @@
           <a:p>
             <a:fld id="{13FF81DB-72FD-4E0B-96E8-AA8F3653C4D4}" type="datetimeFigureOut">
               <a:rPr lang="en-US" smtClean="0"/>
-              <a:t>2/19/2017</a:t>
+              <a:t>2/21/2017</a:t>
             </a:fld>
             <a:endParaRPr lang="en-US"/>
           </a:p>
@@ -2572,7 +2572,7 @@
           <a:p>
             <a:fld id="{13FF81DB-72FD-4E0B-96E8-AA8F3653C4D4}" type="datetimeFigureOut">
               <a:rPr lang="en-US" smtClean="0"/>
-              <a:t>2/19/2017</a:t>
+              <a:t>2/21/2017</a:t>
             </a:fld>
             <a:endParaRPr lang="en-US"/>
           </a:p>
@@ -5551,11 +5551,7 @@
                       </a:r>
                       <a:r>
                         <a:rPr lang="en-US" baseline="0" dirty="0" smtClean="0"/>
-                        <a:t> &gt;= </a:t>
-                      </a:r>
-                      <a:r>
-                        <a:rPr lang="en-US" baseline="0" dirty="0" smtClean="0"/>
-                        <a:t>threshold</a:t>
+                        <a:t> &gt;= threshold</a:t>
                       </a:r>
                       <a:endParaRPr lang="en-US" dirty="0" smtClean="0"/>
                     </a:p>
@@ -5747,11 +5743,7 @@
           <a:p>
             <a:r>
               <a:rPr lang="en-US" sz="2400" b="1" dirty="0" smtClean="0"/>
-              <a:t>Model </a:t>
-            </a:r>
-            <a:r>
-              <a:rPr lang="en-US" sz="2400" b="1" dirty="0" smtClean="0"/>
-              <a:t>Parameters (slide 1)</a:t>
+              <a:t>Model Parameters (slide 1)</a:t>
             </a:r>
             <a:endParaRPr lang="en-US" sz="2400" b="1" dirty="0"/>
           </a:p>
@@ -5766,7 +5758,7 @@
           <p:nvPr>
             <p:extLst>
               <p:ext uri="{D42A27DB-BD31-4B8C-83A1-F6EECF244321}">
-                <p14:modId xmlns:p14="http://schemas.microsoft.com/office/powerpoint/2010/main" val="1683427000"/>
+                <p14:modId xmlns:p14="http://schemas.microsoft.com/office/powerpoint/2010/main" val="2178273632"/>
               </p:ext>
             </p:extLst>
           </p:nvPr>
@@ -5783,9 +5775,9 @@
               </a:tblPr>
               <a:tblGrid>
                 <a:gridCol w="3123952"/>
-                <a:gridCol w="1891447"/>
-                <a:gridCol w="2668754"/>
-                <a:gridCol w="3471971"/>
+                <a:gridCol w="1679984"/>
+                <a:gridCol w="2724150"/>
+                <a:gridCol w="3628038"/>
               </a:tblGrid>
               <a:tr h="538148">
                 <a:tc>
@@ -6117,7 +6109,15 @@
                             <a:srgbClr val="FF0000"/>
                           </a:solidFill>
                         </a:rPr>
-                        <a:t> Peter input?)</a:t>
+                        <a:t> Peter input</a:t>
+                      </a:r>
+                      <a:r>
+                        <a:rPr lang="en-US" baseline="0" dirty="0" smtClean="0">
+                          <a:solidFill>
+                            <a:srgbClr val="FF0000"/>
+                          </a:solidFill>
+                        </a:rPr>
+                        <a:t>?) 1K-300K</a:t>
                       </a:r>
                       <a:endParaRPr lang="en-US" dirty="0">
                         <a:solidFill>
@@ -6259,7 +6259,11 @@
                     <a:p>
                       <a:r>
                         <a:rPr lang="en-US" dirty="0" smtClean="0"/>
-                        <a:t>http://preotineatlas.org</a:t>
+                        <a:t>http://</a:t>
+                      </a:r>
+                      <a:r>
+                        <a:rPr lang="en-US" dirty="0" smtClean="0"/>
+                        <a:t>proteineatlas.org</a:t>
                       </a:r>
                       <a:endParaRPr lang="en-US" dirty="0"/>
                     </a:p>
@@ -6272,12 +6276,16 @@
                     <a:lstStyle/>
                     <a:p>
                       <a:r>
+                        <a:rPr lang="en-US" dirty="0" smtClean="0"/>
+                        <a:t>Stats </a:t>
+                      </a:r>
+                      <a:r>
                         <a:rPr lang="en-US" dirty="0" err="1" smtClean="0"/>
-                        <a:t>Yijias</a:t>
+                        <a:t>Yijia</a:t>
                       </a:r>
                       <a:r>
                         <a:rPr lang="en-US" dirty="0" smtClean="0"/>
-                        <a:t> statistics: </a:t>
+                        <a:t>: </a:t>
                       </a:r>
                       <a:r>
                         <a:rPr lang="en-US" dirty="0" err="1" smtClean="0"/>
@@ -6465,7 +6473,7 @@
                             <a:srgbClr val="FF0000"/>
                           </a:solidFill>
                         </a:rPr>
-                        <a:t>Could</a:t>
+                        <a:t>(Could</a:t>
                       </a:r>
                       <a:r>
                         <a:rPr lang="en-US" baseline="0" dirty="0" smtClean="0">
@@ -6473,7 +6481,15 @@
                             <a:srgbClr val="FF0000"/>
                           </a:solidFill>
                         </a:rPr>
-                        <a:t> Peter input?)</a:t>
+                        <a:t> </a:t>
+                      </a:r>
+                      <a:r>
+                        <a:rPr lang="en-US" baseline="0" dirty="0" smtClean="0">
+                          <a:solidFill>
+                            <a:srgbClr val="FF0000"/>
+                          </a:solidFill>
+                        </a:rPr>
+                        <a:t>Peter input?)</a:t>
                       </a:r>
                       <a:endParaRPr lang="en-US" dirty="0"/>
                     </a:p>
@@ -6539,11 +6555,7 @@
           <a:p>
             <a:r>
               <a:rPr lang="en-US" sz="2400" b="1" dirty="0" smtClean="0"/>
-              <a:t>Model </a:t>
-            </a:r>
-            <a:r>
-              <a:rPr lang="en-US" sz="2400" b="1" dirty="0" smtClean="0"/>
-              <a:t>Parameters (slide 2)</a:t>
+              <a:t>Model Parameters (slide 2)</a:t>
             </a:r>
             <a:endParaRPr lang="en-US" sz="2400" b="1" dirty="0"/>
           </a:p>
@@ -6719,11 +6731,7 @@
                       </a:r>
                       <a:r>
                         <a:rPr lang="en-US" dirty="0" smtClean="0"/>
-                        <a:t>Serine </a:t>
-                      </a:r>
-                      <a:r>
-                        <a:rPr lang="en-US" dirty="0" smtClean="0"/>
-                        <a:t>kinase</a:t>
+                        <a:t>Serine kinase</a:t>
                       </a:r>
                       <a:endParaRPr lang="en-US" dirty="0"/>
                     </a:p>
@@ -7228,11 +7236,6 @@
                         </a:rPr>
                         <a:t>Could Qin check?</a:t>
                       </a:r>
-                      <a:endParaRPr lang="en-US" baseline="0" dirty="0" smtClean="0">
-                        <a:solidFill>
-                          <a:srgbClr val="FF0000"/>
-                        </a:solidFill>
-                      </a:endParaRPr>
                     </a:p>
                   </a:txBody>
                   <a:tcPr/>

</xml_diff>

<commit_message>
Updated the model and results based on literature.
</commit_message>
<xml_diff>
--- a/app/model/result_0211_2017.pptx
+++ b/app/model/result_0211_2017.pptx
@@ -11,9 +11,9 @@
     <p:sldId id="267" r:id="rId5"/>
     <p:sldId id="265" r:id="rId6"/>
     <p:sldId id="266" r:id="rId7"/>
-    <p:sldId id="259" r:id="rId8"/>
-    <p:sldId id="262" r:id="rId9"/>
-    <p:sldId id="268" r:id="rId10"/>
+    <p:sldId id="269" r:id="rId8"/>
+    <p:sldId id="259" r:id="rId9"/>
+    <p:sldId id="262" r:id="rId10"/>
   </p:sldIdLst>
   <p:sldSz cx="12192000" cy="6858000"/>
   <p:notesSz cx="6858000" cy="9144000"/>
@@ -251,7 +251,7 @@
           <a:p>
             <a:fld id="{13FF81DB-72FD-4E0B-96E8-AA8F3653C4D4}" type="datetimeFigureOut">
               <a:rPr lang="en-US" smtClean="0"/>
-              <a:t>2/21/2017</a:t>
+              <a:t>3/1/2017</a:t>
             </a:fld>
             <a:endParaRPr lang="en-US"/>
           </a:p>
@@ -421,7 +421,7 @@
           <a:p>
             <a:fld id="{13FF81DB-72FD-4E0B-96E8-AA8F3653C4D4}" type="datetimeFigureOut">
               <a:rPr lang="en-US" smtClean="0"/>
-              <a:t>2/21/2017</a:t>
+              <a:t>3/1/2017</a:t>
             </a:fld>
             <a:endParaRPr lang="en-US"/>
           </a:p>
@@ -601,7 +601,7 @@
           <a:p>
             <a:fld id="{13FF81DB-72FD-4E0B-96E8-AA8F3653C4D4}" type="datetimeFigureOut">
               <a:rPr lang="en-US" smtClean="0"/>
-              <a:t>2/21/2017</a:t>
+              <a:t>3/1/2017</a:t>
             </a:fld>
             <a:endParaRPr lang="en-US"/>
           </a:p>
@@ -771,7 +771,7 @@
           <a:p>
             <a:fld id="{13FF81DB-72FD-4E0B-96E8-AA8F3653C4D4}" type="datetimeFigureOut">
               <a:rPr lang="en-US" smtClean="0"/>
-              <a:t>2/21/2017</a:t>
+              <a:t>3/1/2017</a:t>
             </a:fld>
             <a:endParaRPr lang="en-US"/>
           </a:p>
@@ -1017,7 +1017,7 @@
           <a:p>
             <a:fld id="{13FF81DB-72FD-4E0B-96E8-AA8F3653C4D4}" type="datetimeFigureOut">
               <a:rPr lang="en-US" smtClean="0"/>
-              <a:t>2/21/2017</a:t>
+              <a:t>3/1/2017</a:t>
             </a:fld>
             <a:endParaRPr lang="en-US"/>
           </a:p>
@@ -1249,7 +1249,7 @@
           <a:p>
             <a:fld id="{13FF81DB-72FD-4E0B-96E8-AA8F3653C4D4}" type="datetimeFigureOut">
               <a:rPr lang="en-US" smtClean="0"/>
-              <a:t>2/21/2017</a:t>
+              <a:t>3/1/2017</a:t>
             </a:fld>
             <a:endParaRPr lang="en-US"/>
           </a:p>
@@ -1616,7 +1616,7 @@
           <a:p>
             <a:fld id="{13FF81DB-72FD-4E0B-96E8-AA8F3653C4D4}" type="datetimeFigureOut">
               <a:rPr lang="en-US" smtClean="0"/>
-              <a:t>2/21/2017</a:t>
+              <a:t>3/1/2017</a:t>
             </a:fld>
             <a:endParaRPr lang="en-US"/>
           </a:p>
@@ -1734,7 +1734,7 @@
           <a:p>
             <a:fld id="{13FF81DB-72FD-4E0B-96E8-AA8F3653C4D4}" type="datetimeFigureOut">
               <a:rPr lang="en-US" smtClean="0"/>
-              <a:t>2/21/2017</a:t>
+              <a:t>3/1/2017</a:t>
             </a:fld>
             <a:endParaRPr lang="en-US"/>
           </a:p>
@@ -1829,7 +1829,7 @@
           <a:p>
             <a:fld id="{13FF81DB-72FD-4E0B-96E8-AA8F3653C4D4}" type="datetimeFigureOut">
               <a:rPr lang="en-US" smtClean="0"/>
-              <a:t>2/21/2017</a:t>
+              <a:t>3/1/2017</a:t>
             </a:fld>
             <a:endParaRPr lang="en-US"/>
           </a:p>
@@ -2106,7 +2106,7 @@
           <a:p>
             <a:fld id="{13FF81DB-72FD-4E0B-96E8-AA8F3653C4D4}" type="datetimeFigureOut">
               <a:rPr lang="en-US" smtClean="0"/>
-              <a:t>2/21/2017</a:t>
+              <a:t>3/1/2017</a:t>
             </a:fld>
             <a:endParaRPr lang="en-US"/>
           </a:p>
@@ -2359,7 +2359,7 @@
           <a:p>
             <a:fld id="{13FF81DB-72FD-4E0B-96E8-AA8F3653C4D4}" type="datetimeFigureOut">
               <a:rPr lang="en-US" smtClean="0"/>
-              <a:t>2/21/2017</a:t>
+              <a:t>3/1/2017</a:t>
             </a:fld>
             <a:endParaRPr lang="en-US"/>
           </a:p>
@@ -2572,7 +2572,7 @@
           <a:p>
             <a:fld id="{13FF81DB-72FD-4E0B-96E8-AA8F3653C4D4}" type="datetimeFigureOut">
               <a:rPr lang="en-US" smtClean="0"/>
-              <a:t>2/21/2017</a:t>
+              <a:t>3/1/2017</a:t>
             </a:fld>
             <a:endParaRPr lang="en-US"/>
           </a:p>
@@ -2977,54 +2977,6 @@
           <a:chExt cx="0" cy="0"/>
         </a:xfrm>
       </p:grpSpPr>
-      <p:pic>
-        <p:nvPicPr>
-          <p:cNvPr id="8" name="Picture 7"/>
-          <p:cNvPicPr>
-            <a:picLocks noChangeAspect="1"/>
-          </p:cNvPicPr>
-          <p:nvPr/>
-        </p:nvPicPr>
-        <p:blipFill>
-          <a:blip r:embed="rId2"/>
-          <a:stretch>
-            <a:fillRect/>
-          </a:stretch>
-        </p:blipFill>
-        <p:spPr>
-          <a:xfrm>
-            <a:off x="637717" y="3215462"/>
-            <a:ext cx="5151432" cy="3465000"/>
-          </a:xfrm>
-          <a:prstGeom prst="rect">
-            <a:avLst/>
-          </a:prstGeom>
-        </p:spPr>
-      </p:pic>
-      <p:pic>
-        <p:nvPicPr>
-          <p:cNvPr id="9" name="Picture 8"/>
-          <p:cNvPicPr>
-            <a:picLocks noChangeAspect="1"/>
-          </p:cNvPicPr>
-          <p:nvPr/>
-        </p:nvPicPr>
-        <p:blipFill>
-          <a:blip r:embed="rId3"/>
-          <a:stretch>
-            <a:fillRect/>
-          </a:stretch>
-        </p:blipFill>
-        <p:spPr>
-          <a:xfrm>
-            <a:off x="5580895" y="3215462"/>
-            <a:ext cx="5159701" cy="3465000"/>
-          </a:xfrm>
-          <a:prstGeom prst="rect">
-            <a:avLst/>
-          </a:prstGeom>
-        </p:spPr>
-      </p:pic>
       <p:grpSp>
         <p:nvGrpSpPr>
           <p:cNvPr id="36" name="Group 35"/>
@@ -3969,12 +3921,64 @@
             </a:r>
             <a:r>
               <a:rPr lang="en-US" b="1" dirty="0" smtClean="0"/>
-              <a:t>('model1');</a:t>
+              <a:t>(</a:t>
+            </a:r>
+            <a:r>
+              <a:rPr lang="en-US" b="1" dirty="0" smtClean="0"/>
+              <a:t>'model4');</a:t>
             </a:r>
             <a:endParaRPr lang="en-US" b="1" dirty="0"/>
           </a:p>
         </p:txBody>
       </p:sp>
+      <p:pic>
+        <p:nvPicPr>
+          <p:cNvPr id="5" name="Picture 4"/>
+          <p:cNvPicPr>
+            <a:picLocks noChangeAspect="1"/>
+          </p:cNvPicPr>
+          <p:nvPr/>
+        </p:nvPicPr>
+        <p:blipFill>
+          <a:blip r:embed="rId2"/>
+          <a:stretch>
+            <a:fillRect/>
+          </a:stretch>
+        </p:blipFill>
+        <p:spPr>
+          <a:xfrm>
+            <a:off x="219741" y="3230721"/>
+            <a:ext cx="5146294" cy="3292606"/>
+          </a:xfrm>
+          <a:prstGeom prst="rect">
+            <a:avLst/>
+          </a:prstGeom>
+        </p:spPr>
+      </p:pic>
+      <p:pic>
+        <p:nvPicPr>
+          <p:cNvPr id="6" name="Picture 5"/>
+          <p:cNvPicPr>
+            <a:picLocks noChangeAspect="1"/>
+          </p:cNvPicPr>
+          <p:nvPr/>
+        </p:nvPicPr>
+        <p:blipFill>
+          <a:blip r:embed="rId3"/>
+          <a:stretch>
+            <a:fillRect/>
+          </a:stretch>
+        </p:blipFill>
+        <p:spPr>
+          <a:xfrm>
+            <a:off x="5319641" y="3230721"/>
+            <a:ext cx="5387360" cy="3471303"/>
+          </a:xfrm>
+          <a:prstGeom prst="rect">
+            <a:avLst/>
+          </a:prstGeom>
+        </p:spPr>
+      </p:pic>
     </p:spTree>
     <p:extLst>
       <p:ext uri="{BB962C8B-B14F-4D97-AF65-F5344CB8AC3E}">
@@ -4064,29 +4068,6 @@
           </a:p>
         </p:txBody>
       </p:sp>
-      <p:pic>
-        <p:nvPicPr>
-          <p:cNvPr id="3" name="Picture 2"/>
-          <p:cNvPicPr>
-            <a:picLocks noChangeAspect="1"/>
-          </p:cNvPicPr>
-          <p:nvPr/>
-        </p:nvPicPr>
-        <p:blipFill rotWithShape="1">
-          <a:blip r:embed="rId2"/>
-          <a:srcRect l="10248" t="5482" r="7109" b="9418"/>
-          <a:stretch/>
-        </p:blipFill>
-        <p:spPr>
-          <a:xfrm>
-            <a:off x="8567739" y="1252538"/>
-            <a:ext cx="2571750" cy="2028825"/>
-          </a:xfrm>
-          <a:prstGeom prst="rect">
-            <a:avLst/>
-          </a:prstGeom>
-        </p:spPr>
-      </p:pic>
       <p:sp>
         <p:nvSpPr>
           <p:cNvPr id="4" name="TextBox 3"/>
@@ -4095,7 +4076,7 @@
         </p:nvSpPr>
         <p:spPr>
           <a:xfrm>
-            <a:off x="8472054" y="752518"/>
+            <a:off x="8547412" y="987688"/>
             <a:ext cx="2507673" cy="369332"/>
           </a:xfrm>
           <a:prstGeom prst="rect">
@@ -4111,10 +4092,18 @@
           <a:p>
             <a:pPr algn="ctr"/>
             <a:r>
-              <a:rPr lang="en-US" dirty="0" smtClean="0"/>
-              <a:t>Signal Matrix</a:t>
-            </a:r>
-            <a:endParaRPr lang="en-US" dirty="0"/>
+              <a:rPr lang="en-US" b="1" dirty="0" smtClean="0"/>
+              <a:t>Signal Matrix (</a:t>
+            </a:r>
+            <a:r>
+              <a:rPr lang="en-US" b="1" dirty="0" err="1" smtClean="0"/>
+              <a:t>mol</a:t>
+            </a:r>
+            <a:r>
+              <a:rPr lang="en-US" b="1" dirty="0" smtClean="0"/>
+              <a:t>/min)</a:t>
+            </a:r>
+            <a:endParaRPr lang="en-US" b="1" dirty="0"/>
           </a:p>
         </p:txBody>
       </p:sp>
@@ -4159,12 +4148,36 @@
               <a:t>y(:,i+1) = </a:t>
             </a:r>
             <a:r>
+              <a:rPr lang="en-US" b="1" dirty="0" smtClean="0"/>
+              <a:t>y(:,</a:t>
+            </a:r>
+            <a:r>
+              <a:rPr lang="en-US" b="1" dirty="0" err="1" smtClean="0"/>
+              <a:t>i</a:t>
+            </a:r>
+            <a:r>
+              <a:rPr lang="en-US" b="1" dirty="0" smtClean="0"/>
+              <a:t>)+</a:t>
+            </a:r>
+            <a:r>
+              <a:rPr lang="en-US" b="1" dirty="0" err="1" smtClean="0"/>
+              <a:t>dt</a:t>
+            </a:r>
+            <a:r>
+              <a:rPr lang="en-US" b="1" dirty="0" smtClean="0"/>
+              <a:t>*</a:t>
+            </a:r>
+            <a:r>
               <a:rPr lang="en-US" b="1" dirty="0" err="1" smtClean="0"/>
               <a:t>signal_matrix</a:t>
             </a:r>
             <a:r>
               <a:rPr lang="en-US" b="1" dirty="0" smtClean="0"/>
-              <a:t>*y(:,</a:t>
+              <a:t>*y</a:t>
+            </a:r>
+            <a:r>
+              <a:rPr lang="en-US" b="1" dirty="0" smtClean="0"/>
+              <a:t>(:,</a:t>
             </a:r>
             <a:r>
               <a:rPr lang="en-US" b="1" dirty="0" err="1" smtClean="0"/>
@@ -4342,7 +4355,7 @@
         </p:nvSpPr>
         <p:spPr>
           <a:xfrm>
-            <a:off x="7700963" y="1276350"/>
+            <a:off x="7793107" y="1276350"/>
             <a:ext cx="852487" cy="1996700"/>
           </a:xfrm>
           <a:prstGeom prst="rect">
@@ -4623,6 +4636,29 @@
           </a:p>
         </p:txBody>
       </p:sp>
+      <p:pic>
+        <p:nvPicPr>
+          <p:cNvPr id="6" name="Picture 5"/>
+          <p:cNvPicPr>
+            <a:picLocks noChangeAspect="1"/>
+          </p:cNvPicPr>
+          <p:nvPr/>
+        </p:nvPicPr>
+        <p:blipFill rotWithShape="1">
+          <a:blip r:embed="rId2"/>
+          <a:srcRect l="10929" t="6052" r="8125" b="9606"/>
+          <a:stretch/>
+        </p:blipFill>
+        <p:spPr>
+          <a:xfrm>
+            <a:off x="8654341" y="1357020"/>
+            <a:ext cx="2457451" cy="1916030"/>
+          </a:xfrm>
+          <a:prstGeom prst="rect">
+            <a:avLst/>
+          </a:prstGeom>
+        </p:spPr>
+      </p:pic>
     </p:spTree>
     <p:extLst>
       <p:ext uri="{BB962C8B-B14F-4D97-AF65-F5344CB8AC3E}">
@@ -4661,7 +4697,7 @@
         </p:nvSpPr>
         <p:spPr>
           <a:xfrm>
-            <a:off x="1738745" y="160020"/>
+            <a:off x="1249647" y="174196"/>
             <a:ext cx="8799715" cy="461665"/>
           </a:xfrm>
           <a:prstGeom prst="rect">
@@ -4692,7 +4728,7 @@
         <p:spPr>
           <a:xfrm>
             <a:off x="1146629" y="904740"/>
-            <a:ext cx="10710293" cy="5078313"/>
+            <a:ext cx="10710293" cy="5355312"/>
           </a:xfrm>
           <a:prstGeom prst="rect">
             <a:avLst/>
@@ -4707,7 +4743,7 @@
           <a:p>
             <a:r>
               <a:rPr lang="en-US" b="1" dirty="0"/>
-              <a:t> case 'model4' % Decrease MT/KDMT to 6K</a:t>
+              <a:t> case 'model4' % Follow the references, 3/2/2017</a:t>
             </a:r>
             <a:endParaRPr lang="en-US" dirty="0"/>
           </a:p>
@@ -4732,23 +4768,19 @@
               <a:t>        </a:t>
             </a:r>
             <a:r>
-              <a:rPr lang="en-US" b="1" dirty="0" err="1" smtClean="0"/>
+              <a:rPr lang="en-US" b="1" dirty="0" err="1"/>
               <a:t>data.base_methyl</a:t>
             </a:r>
             <a:r>
-              <a:rPr lang="en-US" b="1" dirty="0" smtClean="0"/>
-              <a:t> </a:t>
-            </a:r>
-            <a:r>
               <a:rPr lang="en-US" b="1" dirty="0"/>
-              <a:t>= </a:t>
-            </a:r>
-            <a:r>
-              <a:rPr lang="en-US" b="1" dirty="0" err="1" smtClean="0"/>
+              <a:t> = </a:t>
+            </a:r>
+            <a:r>
+              <a:rPr lang="en-US" b="1" dirty="0" err="1"/>
               <a:t>data.num_histone</a:t>
             </a:r>
             <a:r>
-              <a:rPr lang="en-US" b="1" dirty="0" smtClean="0"/>
+              <a:rPr lang="en-US" b="1" dirty="0"/>
               <a:t>*0.57; </a:t>
             </a:r>
             <a:endParaRPr lang="en-US" dirty="0"/>
@@ -4760,11 +4792,11 @@
             </a:r>
             <a:r>
               <a:rPr lang="en-US" b="1" dirty="0" err="1"/>
-              <a:t>data.max_methyl</a:t>
+              <a:t>data.max_methyl_enzyme</a:t>
             </a:r>
             <a:r>
               <a:rPr lang="en-US" b="1" dirty="0"/>
-              <a:t> = 300; % max number of </a:t>
+              <a:t> = 1200; % max number of </a:t>
             </a:r>
             <a:r>
               <a:rPr lang="en-US" b="1" dirty="0" err="1"/>
@@ -4787,91 +4819,79 @@
             </a:r>
             <a:r>
               <a:rPr lang="en-US" b="1" dirty="0"/>
-              <a:t> = 150; % more methyltransferase binds with h3k9 during mitosis</a:t>
+              <a:t> = 600; % more methyltransferase binds with h3k9 during mitosis</a:t>
             </a:r>
             <a:endParaRPr lang="en-US" dirty="0"/>
           </a:p>
           <a:p>
             <a:r>
-              <a:rPr lang="en-US" b="1" dirty="0" smtClean="0"/>
+              <a:rPr lang="en-US" b="1" dirty="0"/>
+              <a:t>        % </a:t>
+            </a:r>
+            <a:r>
+              <a:rPr lang="en-US" b="1" dirty="0" err="1"/>
+              <a:t>Kinase:KDM</a:t>
+            </a:r>
+            <a:r>
+              <a:rPr lang="en-US" b="1" dirty="0"/>
+              <a:t> ratio = 5.9:1 </a:t>
+            </a:r>
+            <a:endParaRPr lang="en-US" dirty="0"/>
+          </a:p>
+          <a:p>
+            <a:r>
+              <a:rPr lang="en-US" b="1" dirty="0"/>
               <a:t>        </a:t>
             </a:r>
             <a:r>
-              <a:rPr lang="en-US" b="1" dirty="0" err="1" smtClean="0"/>
-              <a:t>data.max_mol</a:t>
-            </a:r>
-            <a:r>
-              <a:rPr lang="en-US" b="1" dirty="0" smtClean="0"/>
-              <a:t> </a:t>
+              <a:rPr lang="en-US" b="1" dirty="0" err="1"/>
+              <a:t>data.max_phosphor_enzyme</a:t>
             </a:r>
             <a:r>
               <a:rPr lang="en-US" b="1" dirty="0"/>
-              <a:t>= </a:t>
+              <a:t> = </a:t>
             </a:r>
             <a:r>
               <a:rPr lang="en-US" b="1" dirty="0" err="1"/>
-              <a:t>data.max_methyl</a:t>
+              <a:t>data.max_methyl_enzyme</a:t>
             </a:r>
             <a:r>
               <a:rPr lang="en-US" b="1" dirty="0"/>
-              <a:t>*7.5; % 2.25M aurora b kinase, max number of kinase and </a:t>
-            </a:r>
-            <a:r>
-              <a:rPr lang="en-US" b="1" dirty="0" smtClean="0"/>
-              <a:t>phosphatase</a:t>
-            </a:r>
+              <a:t>*5.9; % 7.1M aurora b kinase, max number of kinase and </a:t>
+            </a:r>
+            <a:r>
+              <a:rPr lang="en-US" b="1" dirty="0" err="1"/>
+              <a:t>phosphotase</a:t>
+            </a:r>
+            <a:endParaRPr lang="en-US" dirty="0"/>
           </a:p>
           <a:p>
             <a:r>
               <a:rPr lang="en-US" b="1" dirty="0"/>
-              <a:t> </a:t>
-            </a:r>
-            <a:r>
-              <a:rPr lang="en-US" b="1" dirty="0" smtClean="0"/>
-              <a:t>       </a:t>
-            </a:r>
-            <a:r>
-              <a:rPr lang="en-US" b="1" dirty="0" err="1" smtClean="0"/>
+              <a:t>        </a:t>
+            </a:r>
+            <a:r>
+              <a:rPr lang="en-US" b="1" dirty="0" err="1"/>
               <a:t>data.more_phospho</a:t>
             </a:r>
             <a:r>
-              <a:rPr lang="en-US" b="1" dirty="0" smtClean="0"/>
-              <a:t> </a:t>
-            </a:r>
-            <a:r>
               <a:rPr lang="en-US" b="1" dirty="0"/>
-              <a:t>= 300; % </a:t>
-            </a:r>
-            <a:r>
-              <a:rPr lang="en-US" b="1" dirty="0" smtClean="0"/>
-              <a:t>300K </a:t>
-            </a:r>
+              <a:t> = 1000; % 1000K more kinase binds to h3s10 during mitosis</a:t>
+            </a:r>
+            <a:endParaRPr lang="en-US" dirty="0"/>
+          </a:p>
+          <a:p>
             <a:r>
               <a:rPr lang="en-US" b="1" dirty="0"/>
-              <a:t>more kinase binds to h3s10 during mitosis</a:t>
-            </a:r>
-            <a:endParaRPr lang="en-US" dirty="0"/>
-          </a:p>
-          <a:p>
+              <a:t>        </a:t>
+            </a:r>
+            <a:r>
+              <a:rPr lang="en-US" b="1" dirty="0" err="1"/>
+              <a:t>data.max_time_phospho</a:t>
+            </a:r>
             <a:r>
               <a:rPr lang="en-US" b="1" dirty="0"/>
-              <a:t> </a:t>
-            </a:r>
-            <a:r>
-              <a:rPr lang="en-US" b="1" dirty="0" smtClean="0"/>
-              <a:t>       </a:t>
-            </a:r>
-            <a:r>
-              <a:rPr lang="en-US" b="1" dirty="0" err="1" smtClean="0"/>
-              <a:t>data.max_time_phospho</a:t>
-            </a:r>
-            <a:r>
-              <a:rPr lang="en-US" b="1" dirty="0" smtClean="0"/>
-              <a:t> </a:t>
-            </a:r>
-            <a:r>
-              <a:rPr lang="en-US" b="1" dirty="0"/>
-              <a:t>= 30 * </a:t>
+              <a:t> = 30 * </a:t>
             </a:r>
             <a:r>
               <a:rPr lang="en-US" b="1" dirty="0" err="1"/>
@@ -4887,48 +4907,22 @@
             </a:r>
             <a:r>
               <a:rPr lang="en-US" b="1" dirty="0"/>
-              <a:t> for 30 min        </a:t>
-            </a:r>
-            <a:endParaRPr lang="en-US" b="1" dirty="0" smtClean="0"/>
+              <a:t> for 30 min</a:t>
+            </a:r>
+            <a:endParaRPr lang="en-US" dirty="0"/>
           </a:p>
           <a:p>
             <a:r>
               <a:rPr lang="en-US" b="1" dirty="0"/>
-              <a:t> </a:t>
-            </a:r>
-            <a:r>
-              <a:rPr lang="en-US" b="1" dirty="0" smtClean="0"/>
-              <a:t>       % </a:t>
+              <a:t>        </a:t>
             </a:r>
             <a:r>
               <a:rPr lang="en-US" b="1" dirty="0" err="1"/>
-              <a:t>Kinase:KDM</a:t>
+              <a:t>data.dt</a:t>
             </a:r>
             <a:r>
               <a:rPr lang="en-US" b="1" dirty="0"/>
-              <a:t> ratio = </a:t>
-            </a:r>
-            <a:r>
-              <a:rPr lang="en-US" b="1" dirty="0" smtClean="0"/>
-              <a:t>7.5:1</a:t>
-            </a:r>
-          </a:p>
-          <a:p>
-            <a:r>
-              <a:rPr lang="en-US" b="1" dirty="0" smtClean="0"/>
-              <a:t>        </a:t>
-            </a:r>
-            <a:r>
-              <a:rPr lang="en-US" b="1" dirty="0" err="1" smtClean="0"/>
-              <a:t>data.dt</a:t>
-            </a:r>
-            <a:r>
-              <a:rPr lang="en-US" b="1" dirty="0" smtClean="0"/>
-              <a:t>(1</a:t>
-            </a:r>
-            <a:r>
-              <a:rPr lang="en-US" b="1" dirty="0"/>
-              <a:t>) = 40; % min, time to exit mitosis; enter mitosis at 0 min</a:t>
+              <a:t>(1) = 40; % min, time to exit mitosis; enter mitosis at 0 min</a:t>
             </a:r>
             <a:endParaRPr lang="en-US" dirty="0"/>
           </a:p>
@@ -4973,7 +4967,7 @@
             </a:r>
             <a:r>
               <a:rPr lang="en-US" b="1" dirty="0"/>
-              <a:t>(1) = 0.01; % phosphorylation repels methyltransferase</a:t>
+              <a:t>(1) = 0.03; % phosphorylation repels methyltransferase</a:t>
             </a:r>
             <a:endParaRPr lang="en-US" dirty="0"/>
           </a:p>
@@ -4988,7 +4982,7 @@
             </a:r>
             <a:r>
               <a:rPr lang="en-US" b="1" dirty="0"/>
-              <a:t>(2) = 0.01;  % phosphorylation recruit demethylase</a:t>
+              <a:t>(2) = 0.03;  % phosphorylation recruit demethylase</a:t>
             </a:r>
             <a:endParaRPr lang="en-US" dirty="0"/>
           </a:p>
@@ -5005,16 +4999,12 @@
               <a:rPr lang="en-US" b="1" dirty="0"/>
               <a:t> = 1; % the strength of kinase; </a:t>
             </a:r>
-            <a:r>
-              <a:rPr lang="en-US" b="1" dirty="0" smtClean="0"/>
-              <a:t>b = 1- the strength of inhibitor</a:t>
-            </a:r>
             <a:endParaRPr lang="en-US" dirty="0"/>
           </a:p>
           <a:p>
             <a:r>
               <a:rPr lang="en-US" b="1" dirty="0"/>
-              <a:t> </a:t>
+              <a:t>        %</a:t>
             </a:r>
             <a:endParaRPr lang="en-US" dirty="0"/>
           </a:p>
@@ -5029,7 +5019,7 @@
             </a:r>
             <a:r>
               <a:rPr lang="en-US" b="1" dirty="0"/>
-              <a:t> = 1/20; % min, 3s </a:t>
+              <a:t> = 1/60; % min</a:t>
             </a:r>
             <a:endParaRPr lang="en-US" dirty="0"/>
           </a:p>
@@ -5758,14 +5748,14 @@
           <p:nvPr>
             <p:extLst>
               <p:ext uri="{D42A27DB-BD31-4B8C-83A1-F6EECF244321}">
-                <p14:modId xmlns:p14="http://schemas.microsoft.com/office/powerpoint/2010/main" val="2178273632"/>
+                <p14:modId xmlns:p14="http://schemas.microsoft.com/office/powerpoint/2010/main" val="2524578294"/>
               </p:ext>
             </p:extLst>
           </p:nvPr>
         </p:nvGraphicFramePr>
         <p:xfrm>
           <a:off x="555464" y="714360"/>
-          <a:ext cx="11156124" cy="5567348"/>
+          <a:ext cx="11156124" cy="6938948"/>
         </p:xfrm>
         <a:graphic>
           <a:graphicData uri="http://schemas.openxmlformats.org/drawingml/2006/table">
@@ -5885,7 +5875,11 @@
                       </a:r>
                       <a:r>
                         <a:rPr lang="en-US" baseline="0" dirty="0" smtClean="0"/>
-                        <a:t> al. 2002</a:t>
+                        <a:t> al. </a:t>
+                      </a:r>
+                      <a:r>
+                        <a:rPr lang="en-US" baseline="0" dirty="0" smtClean="0"/>
+                        <a:t>2002 Molecular Biology …</a:t>
                       </a:r>
                       <a:endParaRPr lang="en-US" dirty="0"/>
                     </a:p>
@@ -5897,6 +5891,14 @@
                     <a:bodyPr/>
                     <a:lstStyle/>
                     <a:p>
+                      <a:r>
+                        <a:rPr lang="en-US" dirty="0" smtClean="0"/>
+                        <a:t>About 60 M molecule of</a:t>
+                      </a:r>
+                      <a:r>
+                        <a:rPr lang="en-US" baseline="0" dirty="0" smtClean="0"/>
+                        <a:t> each type per human cell. </a:t>
+                      </a:r>
                       <a:endParaRPr lang="en-US" dirty="0"/>
                     </a:p>
                   </a:txBody>
@@ -6031,7 +6033,7 @@
                       </a:r>
                       <a:r>
                         <a:rPr lang="en-US" baseline="0" dirty="0" err="1" smtClean="0"/>
-                        <a:t>max_methyl</a:t>
+                        <a:t>max_methyl_enzyme</a:t>
                       </a:r>
                       <a:r>
                         <a:rPr lang="en-US" baseline="0" dirty="0" smtClean="0"/>
@@ -6048,10 +6050,19 @@
                     <a:lstStyle/>
                     <a:p>
                       <a:r>
-                        <a:rPr lang="en-US" dirty="0" smtClean="0"/>
-                        <a:t>300K</a:t>
-                      </a:r>
-                      <a:endParaRPr lang="en-US" dirty="0"/>
+                        <a:rPr lang="en-US" dirty="0" smtClean="0">
+                          <a:solidFill>
+                            <a:srgbClr val="FF0000"/>
+                          </a:solidFill>
+                          <a:sym typeface="Wingdings" panose="05000000000000000000" pitchFamily="2" charset="2"/>
+                        </a:rPr>
+                        <a:t>1,200K</a:t>
+                      </a:r>
+                      <a:endParaRPr lang="en-US" dirty="0">
+                        <a:solidFill>
+                          <a:srgbClr val="FF0000"/>
+                        </a:solidFill>
+                      </a:endParaRPr>
                     </a:p>
                   </a:txBody>
                   <a:tcPr/>
@@ -6083,9 +6094,43 @@
                           <a:ea typeface="+mn-ea"/>
                           <a:cs typeface="+mn-cs"/>
                         </a:rPr>
-                        <a:t> MD 2011 Dev Cell</a:t>
-                      </a:r>
-                      <a:endParaRPr lang="en-US" dirty="0"/>
+                        <a:t> MD 2011 Dev </a:t>
+                      </a:r>
+                      <a:r>
+                        <a:rPr lang="en-US" sz="1800" kern="1200" dirty="0" smtClean="0">
+                          <a:solidFill>
+                            <a:schemeClr val="dk1"/>
+                          </a:solidFill>
+                          <a:effectLst/>
+                          <a:latin typeface="+mn-lt"/>
+                          <a:ea typeface="+mn-ea"/>
+                          <a:cs typeface="+mn-cs"/>
+                        </a:rPr>
+                        <a:t>Cell</a:t>
+                      </a:r>
+                    </a:p>
+                    <a:p>
+                      <a:pPr marL="0" marR="0" lvl="0" indent="0" algn="l" defTabSz="914400" rtl="0" eaLnBrk="1" fontAlgn="auto" latinLnBrk="0" hangingPunct="1">
+                        <a:lnSpc>
+                          <a:spcPct val="100000"/>
+                        </a:lnSpc>
+                        <a:spcBef>
+                          <a:spcPts val="0"/>
+                        </a:spcBef>
+                        <a:spcAft>
+                          <a:spcPts val="0"/>
+                        </a:spcAft>
+                        <a:buClrTx/>
+                        <a:buSzTx/>
+                        <a:buFontTx/>
+                        <a:buNone/>
+                        <a:tabLst/>
+                        <a:defRPr/>
+                      </a:pPr>
+                      <a:r>
+                        <a:rPr lang="en-US" dirty="0" smtClean="0"/>
+                        <a:t>http://proteineatlas.org</a:t>
+                      </a:r>
                     </a:p>
                   </a:txBody>
                   <a:tcPr/>
@@ -6101,7 +6146,7 @@
                             <a:srgbClr val="FF0000"/>
                           </a:solidFill>
                         </a:rPr>
-                        <a:t>??? (Could</a:t>
+                        <a:t>Estimated</a:t>
                       </a:r>
                       <a:r>
                         <a:rPr lang="en-US" baseline="0" dirty="0" smtClean="0">
@@ -6109,7 +6154,15 @@
                             <a:srgbClr val="FF0000"/>
                           </a:solidFill>
                         </a:rPr>
-                        <a:t> Peter input</a:t>
+                        <a:t> based on </a:t>
+                      </a:r>
+                      <a:r>
+                        <a:rPr lang="en-US" baseline="0" dirty="0" err="1" smtClean="0">
+                          <a:solidFill>
+                            <a:srgbClr val="FF0000"/>
+                          </a:solidFill>
+                        </a:rPr>
+                        <a:t>RNAseq</a:t>
                       </a:r>
                       <a:r>
                         <a:rPr lang="en-US" baseline="0" dirty="0" smtClean="0">
@@ -6117,7 +6170,31 @@
                             <a:srgbClr val="FF0000"/>
                           </a:solidFill>
                         </a:rPr>
-                        <a:t>?) 1K-300K</a:t>
+                        <a:t> copy number from HeLa cells. </a:t>
+                      </a:r>
+                      <a:r>
+                        <a:rPr lang="en-US" dirty="0" smtClean="0">
+                          <a:solidFill>
+                            <a:srgbClr val="FF0000"/>
+                          </a:solidFill>
+                        </a:rPr>
+                        <a:t>KDM4C (TPM) relative to H3F3A and</a:t>
+                      </a:r>
+                      <a:r>
+                        <a:rPr lang="en-US" baseline="0" dirty="0" smtClean="0">
+                          <a:solidFill>
+                            <a:srgbClr val="FF0000"/>
+                          </a:solidFill>
+                        </a:rPr>
+                        <a:t> </a:t>
+                      </a:r>
+                      <a:r>
+                        <a:rPr lang="en-US" dirty="0" smtClean="0">
+                          <a:solidFill>
+                            <a:srgbClr val="FF0000"/>
+                          </a:solidFill>
+                        </a:rPr>
+                        <a:t>H3F3B, KDM4D was negligible.</a:t>
                       </a:r>
                       <a:endParaRPr lang="en-US" dirty="0">
                         <a:solidFill>
@@ -6162,26 +6239,13 @@
                     <a:lstStyle/>
                     <a:p>
                       <a:r>
-                        <a:rPr lang="en-US" dirty="0" smtClean="0"/>
-                        <a:t>150K </a:t>
-                      </a:r>
-                      <a:endParaRPr lang="en-US" dirty="0"/>
-                    </a:p>
-                  </a:txBody>
-                  <a:tcPr/>
-                </a:tc>
-                <a:tc>
-                  <a:txBody>
-                    <a:bodyPr/>
-                    <a:lstStyle/>
-                    <a:p>
-                      <a:r>
                         <a:rPr lang="en-US" dirty="0" smtClean="0">
                           <a:solidFill>
                             <a:srgbClr val="FF0000"/>
                           </a:solidFill>
+                          <a:sym typeface="Wingdings" panose="05000000000000000000" pitchFamily="2" charset="2"/>
                         </a:rPr>
-                        <a:t>???</a:t>
+                        <a:t>600K</a:t>
                       </a:r>
                       <a:endParaRPr lang="en-US" dirty="0">
                         <a:solidFill>
@@ -6198,12 +6262,78 @@
                     <a:lstStyle/>
                     <a:p>
                       <a:r>
+                        <a:rPr lang="en-US" dirty="0" err="1" smtClean="0">
+                          <a:solidFill>
+                            <a:schemeClr val="tx1"/>
+                          </a:solidFill>
+                        </a:rPr>
+                        <a:t>Aagaard</a:t>
+                      </a:r>
+                      <a:r>
+                        <a:rPr lang="en-US" baseline="0" dirty="0" smtClean="0">
+                          <a:solidFill>
+                            <a:schemeClr val="tx1"/>
+                          </a:solidFill>
+                        </a:rPr>
+                        <a:t> L </a:t>
+                      </a:r>
+                      <a:r>
+                        <a:rPr lang="en-US" baseline="0" dirty="0" err="1" smtClean="0">
+                          <a:solidFill>
+                            <a:schemeClr val="tx1"/>
+                          </a:solidFill>
+                        </a:rPr>
+                        <a:t>wt</a:t>
+                      </a:r>
+                      <a:r>
+                        <a:rPr lang="en-US" baseline="0" dirty="0" smtClean="0">
+                          <a:solidFill>
+                            <a:schemeClr val="tx1"/>
+                          </a:solidFill>
+                        </a:rPr>
+                        <a:t> al. 2000 JCS</a:t>
+                      </a:r>
+                      <a:endParaRPr lang="en-US" dirty="0">
+                        <a:solidFill>
+                          <a:schemeClr val="tx1"/>
+                        </a:solidFill>
+                      </a:endParaRPr>
+                    </a:p>
+                  </a:txBody>
+                  <a:tcPr/>
+                </a:tc>
+                <a:tc>
+                  <a:txBody>
+                    <a:bodyPr/>
+                    <a:lstStyle/>
+                    <a:p>
+                      <a:r>
                         <a:rPr lang="en-US" dirty="0" smtClean="0"/>
                         <a:t> 50% of </a:t>
                       </a:r>
                       <a:r>
                         <a:rPr lang="en-US" dirty="0" err="1" smtClean="0"/>
                         <a:t>max_methyl</a:t>
+                      </a:r>
+                      <a:r>
+                        <a:rPr lang="en-US" dirty="0" smtClean="0"/>
+                        <a:t>, SUV39H1 increases </a:t>
+                      </a:r>
+                      <a:r>
+                        <a:rPr lang="en-US" dirty="0" err="1" smtClean="0"/>
+                        <a:t>collocalization</a:t>
+                      </a:r>
+                      <a:r>
+                        <a:rPr lang="en-US" baseline="0" dirty="0" smtClean="0"/>
+                        <a:t> with chromosome and </a:t>
+                      </a:r>
+                      <a:r>
+                        <a:rPr lang="en-US" baseline="0" dirty="0" err="1" smtClean="0"/>
+                        <a:t>centromers</a:t>
+                      </a:r>
+                      <a:r>
+                        <a:rPr lang="en-US" baseline="0" dirty="0" smtClean="0"/>
+                        <a:t> at the prometaphase</a:t>
                       </a:r>
                       <a:endParaRPr lang="en-US" dirty="0"/>
                     </a:p>
@@ -6227,7 +6357,7 @@
                       </a:r>
                       <a:r>
                         <a:rPr lang="en-US" baseline="0" dirty="0" err="1" smtClean="0"/>
-                        <a:t>max_mol</a:t>
+                        <a:t>max_phosphor_enzyme</a:t>
                       </a:r>
                       <a:r>
                         <a:rPr lang="en-US" baseline="0" dirty="0" smtClean="0"/>
@@ -6244,124 +6374,13 @@
                     <a:lstStyle/>
                     <a:p>
                       <a:r>
-                        <a:rPr lang="en-US" dirty="0" smtClean="0"/>
-                        <a:t>2,250K</a:t>
-                      </a:r>
-                      <a:endParaRPr lang="en-US" dirty="0"/>
-                    </a:p>
-                  </a:txBody>
-                  <a:tcPr/>
-                </a:tc>
-                <a:tc>
-                  <a:txBody>
-                    <a:bodyPr/>
-                    <a:lstStyle/>
-                    <a:p>
-                      <a:r>
-                        <a:rPr lang="en-US" dirty="0" smtClean="0"/>
-                        <a:t>http://</a:t>
-                      </a:r>
-                      <a:r>
-                        <a:rPr lang="en-US" dirty="0" smtClean="0"/>
-                        <a:t>proteineatlas.org</a:t>
-                      </a:r>
-                      <a:endParaRPr lang="en-US" dirty="0"/>
-                    </a:p>
-                  </a:txBody>
-                  <a:tcPr/>
-                </a:tc>
-                <a:tc>
-                  <a:txBody>
-                    <a:bodyPr/>
-                    <a:lstStyle/>
-                    <a:p>
-                      <a:r>
-                        <a:rPr lang="en-US" dirty="0" smtClean="0"/>
-                        <a:t>Stats </a:t>
-                      </a:r>
-                      <a:r>
-                        <a:rPr lang="en-US" dirty="0" err="1" smtClean="0"/>
-                        <a:t>Yijia</a:t>
-                      </a:r>
-                      <a:r>
-                        <a:rPr lang="en-US" dirty="0" smtClean="0"/>
-                        <a:t>: </a:t>
-                      </a:r>
-                      <a:r>
-                        <a:rPr lang="en-US" dirty="0" err="1" smtClean="0"/>
-                        <a:t>Aurkb</a:t>
-                      </a:r>
-                      <a:r>
-                        <a:rPr lang="en-US" dirty="0" smtClean="0"/>
-                        <a:t> (~60) and KDM4C (~8), so </a:t>
-                      </a:r>
-                      <a:r>
-                        <a:rPr lang="en-US" dirty="0" err="1" smtClean="0"/>
-                        <a:t>kinase:KDM</a:t>
-                      </a:r>
-                      <a:r>
-                        <a:rPr lang="en-US" dirty="0" smtClean="0"/>
-                        <a:t> = 7.5:1</a:t>
-                      </a:r>
-                      <a:endParaRPr lang="en-US" dirty="0"/>
-                    </a:p>
-                  </a:txBody>
-                  <a:tcPr/>
-                </a:tc>
-              </a:tr>
-              <a:tr h="538148">
-                <a:tc>
-                  <a:txBody>
-                    <a:bodyPr/>
-                    <a:lstStyle/>
-                    <a:p>
-                      <a:r>
-                        <a:rPr lang="en-US" dirty="0" smtClean="0"/>
-                        <a:t>Increase</a:t>
-                      </a:r>
-                      <a:r>
-                        <a:rPr lang="en-US" baseline="0" dirty="0" smtClean="0"/>
-                        <a:t> of kinases at the entrance of mitosis (</a:t>
-                      </a:r>
-                      <a:r>
-                        <a:rPr lang="en-US" baseline="0" dirty="0" err="1" smtClean="0"/>
-                        <a:t>more_phosphor</a:t>
-                      </a:r>
-                      <a:r>
-                        <a:rPr lang="en-US" baseline="0" dirty="0" smtClean="0"/>
-                        <a:t>) </a:t>
-                      </a:r>
-                      <a:endParaRPr lang="en-US" dirty="0"/>
-                    </a:p>
-                  </a:txBody>
-                  <a:tcPr/>
-                </a:tc>
-                <a:tc>
-                  <a:txBody>
-                    <a:bodyPr/>
-                    <a:lstStyle/>
-                    <a:p>
-                      <a:r>
-                        <a:rPr lang="en-US" dirty="0" smtClean="0"/>
-                        <a:t>300K</a:t>
-                      </a:r>
-                      <a:endParaRPr lang="en-US" dirty="0"/>
-                    </a:p>
-                  </a:txBody>
-                  <a:tcPr/>
-                </a:tc>
-                <a:tc>
-                  <a:txBody>
-                    <a:bodyPr/>
-                    <a:lstStyle/>
-                    <a:p>
-                      <a:r>
                         <a:rPr lang="en-US" dirty="0" smtClean="0">
                           <a:solidFill>
                             <a:srgbClr val="FF0000"/>
                           </a:solidFill>
+                          <a:sym typeface="Wingdings" panose="05000000000000000000" pitchFamily="2" charset="2"/>
                         </a:rPr>
-                        <a:t>???</a:t>
+                        <a:t>7100K</a:t>
                       </a:r>
                       <a:endParaRPr lang="en-US" dirty="0">
                         <a:solidFill>
@@ -6379,11 +6398,33 @@
                     <a:p>
                       <a:r>
                         <a:rPr lang="en-US" dirty="0" smtClean="0"/>
-                        <a:t>13% of </a:t>
-                      </a:r>
+                        <a:t>http://proteineatlas.org</a:t>
+                      </a:r>
+                      <a:endParaRPr lang="en-US" dirty="0"/>
+                    </a:p>
+                  </a:txBody>
+                  <a:tcPr/>
+                </a:tc>
+                <a:tc>
+                  <a:txBody>
+                    <a:bodyPr/>
+                    <a:lstStyle/>
+                    <a:p>
                       <a:r>
                         <a:rPr lang="en-US" dirty="0" err="1" smtClean="0"/>
-                        <a:t>max_mol</a:t>
+                        <a:t>kinase:KDM</a:t>
+                      </a:r>
+                      <a:r>
+                        <a:rPr lang="en-US" dirty="0" smtClean="0"/>
+                        <a:t> </a:t>
+                      </a:r>
+                      <a:r>
+                        <a:rPr lang="en-US" dirty="0" smtClean="0"/>
+                        <a:t>= </a:t>
+                      </a:r>
+                      <a:r>
+                        <a:rPr lang="en-US" dirty="0" smtClean="0"/>
+                        <a:t>5.9:1</a:t>
                       </a:r>
                       <a:endParaRPr lang="en-US" dirty="0"/>
                     </a:p>
@@ -6399,11 +6440,19 @@
                     <a:p>
                       <a:r>
                         <a:rPr lang="en-US" dirty="0" smtClean="0"/>
-                        <a:t>Threshold to exist</a:t>
+                        <a:t>Increase</a:t>
                       </a:r>
                       <a:r>
                         <a:rPr lang="en-US" baseline="0" dirty="0" smtClean="0"/>
-                        <a:t> mitosis</a:t>
+                        <a:t> of kinases at the entrance of mitosis (</a:t>
+                      </a:r>
+                      <a:r>
+                        <a:rPr lang="en-US" baseline="0" dirty="0" err="1" smtClean="0"/>
+                        <a:t>more_phosphor</a:t>
+                      </a:r>
+                      <a:r>
+                        <a:rPr lang="en-US" baseline="0" dirty="0" smtClean="0"/>
+                        <a:t>) </a:t>
                       </a:r>
                       <a:endParaRPr lang="en-US" dirty="0"/>
                     </a:p>
@@ -6416,20 +6465,113 @@
                     <a:lstStyle/>
                     <a:p>
                       <a:r>
+                        <a:rPr lang="en-US" dirty="0" smtClean="0">
+                          <a:solidFill>
+                            <a:srgbClr val="FF0000"/>
+                          </a:solidFill>
+                          <a:sym typeface="Wingdings" panose="05000000000000000000" pitchFamily="2" charset="2"/>
+                        </a:rPr>
+                        <a:t>1000K</a:t>
+                      </a:r>
+                      <a:endParaRPr lang="en-US" dirty="0">
+                        <a:solidFill>
+                          <a:srgbClr val="FF0000"/>
+                        </a:solidFill>
+                      </a:endParaRPr>
+                    </a:p>
+                  </a:txBody>
+                  <a:tcPr/>
+                </a:tc>
+                <a:tc>
+                  <a:txBody>
+                    <a:bodyPr/>
+                    <a:lstStyle/>
+                    <a:p>
+                      <a:r>
+                        <a:rPr lang="en-US" dirty="0" smtClean="0">
+                          <a:solidFill>
+                            <a:srgbClr val="FF0000"/>
+                          </a:solidFill>
+                        </a:rPr>
+                        <a:t>Dominguez</a:t>
+                      </a:r>
+                      <a:r>
+                        <a:rPr lang="en-US" baseline="0" dirty="0" smtClean="0">
+                          <a:solidFill>
+                            <a:srgbClr val="FF0000"/>
+                          </a:solidFill>
+                        </a:rPr>
+                        <a:t> D Wang Z 2016 </a:t>
+                      </a:r>
+                      <a:r>
+                        <a:rPr lang="en-US" baseline="0" dirty="0" err="1" smtClean="0">
+                          <a:solidFill>
+                            <a:srgbClr val="FF0000"/>
+                          </a:solidFill>
+                        </a:rPr>
+                        <a:t>elife</a:t>
+                      </a:r>
+                      <a:endParaRPr lang="en-US" dirty="0">
+                        <a:solidFill>
+                          <a:srgbClr val="FF0000"/>
+                        </a:solidFill>
+                      </a:endParaRPr>
+                    </a:p>
+                  </a:txBody>
+                  <a:tcPr/>
+                </a:tc>
+                <a:tc>
+                  <a:txBody>
+                    <a:bodyPr/>
+                    <a:lstStyle/>
+                    <a:p>
+                      <a:r>
                         <a:rPr lang="en-US" dirty="0" smtClean="0"/>
-                        <a:t>30 min</a:t>
+                        <a:t>15% </a:t>
+                      </a:r>
+                      <a:r>
+                        <a:rPr lang="en-US" dirty="0" smtClean="0"/>
+                        <a:t>of </a:t>
+                      </a:r>
+                      <a:r>
+                        <a:rPr lang="en-US" dirty="0" err="1" smtClean="0"/>
+                        <a:t>max_phosphor_enzyme</a:t>
+                      </a:r>
+                      <a:r>
+                        <a:rPr lang="en-US" dirty="0" smtClean="0"/>
+                        <a:t>, the</a:t>
                       </a:r>
                       <a:r>
                         <a:rPr lang="en-US" baseline="0" dirty="0" smtClean="0"/>
-                        <a:t> </a:t>
-                      </a:r>
+                        <a:t> expression of </a:t>
+                      </a:r>
+                      <a:r>
+                        <a:rPr lang="en-US" baseline="0" dirty="0" err="1" smtClean="0"/>
+                        <a:t>auroraB</a:t>
+                      </a:r>
+                      <a:r>
+                        <a:rPr lang="en-US" baseline="0" dirty="0" smtClean="0"/>
+                        <a:t> increases at mitosis. </a:t>
+                      </a:r>
+                      <a:endParaRPr lang="en-US" dirty="0"/>
+                    </a:p>
+                  </a:txBody>
+                  <a:tcPr/>
+                </a:tc>
+              </a:tr>
+              <a:tr h="538148">
+                <a:tc>
+                  <a:txBody>
+                    <a:bodyPr/>
+                    <a:lstStyle/>
+                    <a:p>
                       <a:r>
                         <a:rPr lang="en-US" dirty="0" smtClean="0"/>
-                        <a:t>*</a:t>
-                      </a:r>
-                      <a:r>
-                        <a:rPr lang="en-US" dirty="0" err="1" smtClean="0"/>
-                        <a:t>num_histone</a:t>
+                        <a:t>Threshold to exist</a:t>
+                      </a:r>
+                      <a:r>
+                        <a:rPr lang="en-US" baseline="0" dirty="0" smtClean="0"/>
+                        <a:t> mitosis</a:t>
                       </a:r>
                       <a:endParaRPr lang="en-US" dirty="0"/>
                     </a:p>
@@ -6442,20 +6584,20 @@
                     <a:lstStyle/>
                     <a:p>
                       <a:r>
-                        <a:rPr lang="en-US" dirty="0" smtClean="0">
-                          <a:solidFill>
-                            <a:srgbClr val="FF0000"/>
-                          </a:solidFill>
-                        </a:rPr>
-                        <a:t>???</a:t>
-                      </a:r>
-                      <a:r>
                         <a:rPr lang="en-US" dirty="0" smtClean="0"/>
-                        <a:t> [CDK1</a:t>
+                        <a:t>30 min</a:t>
                       </a:r>
                       <a:r>
                         <a:rPr lang="en-US" baseline="0" dirty="0" smtClean="0"/>
-                        <a:t> is the master regulator]</a:t>
+                        <a:t> </a:t>
+                      </a:r>
+                      <a:r>
+                        <a:rPr lang="en-US" dirty="0" smtClean="0"/>
+                        <a:t>*</a:t>
+                      </a:r>
+                      <a:r>
+                        <a:rPr lang="en-US" dirty="0" err="1" smtClean="0"/>
+                        <a:t>num_histone</a:t>
                       </a:r>
                       <a:endParaRPr lang="en-US" dirty="0"/>
                     </a:p>
@@ -6468,29 +6610,27 @@
                     <a:lstStyle/>
                     <a:p>
                       <a:r>
-                        <a:rPr lang="en-US" dirty="0" smtClean="0">
-                          <a:solidFill>
-                            <a:srgbClr val="FF0000"/>
-                          </a:solidFill>
-                        </a:rPr>
-                        <a:t>(Could</a:t>
-                      </a:r>
-                      <a:r>
-                        <a:rPr lang="en-US" baseline="0" dirty="0" smtClean="0">
-                          <a:solidFill>
-                            <a:srgbClr val="FF0000"/>
-                          </a:solidFill>
-                        </a:rPr>
-                        <a:t> </a:t>
-                      </a:r>
-                      <a:r>
-                        <a:rPr lang="en-US" baseline="0" dirty="0" smtClean="0">
-                          <a:solidFill>
-                            <a:srgbClr val="FF0000"/>
-                          </a:solidFill>
-                        </a:rPr>
-                        <a:t>Peter input?)</a:t>
-                      </a:r>
+                        <a:rPr lang="en-US" dirty="0" smtClean="0"/>
+                        <a:t>[</a:t>
+                      </a:r>
+                      <a:r>
+                        <a:rPr lang="en-US" dirty="0" smtClean="0"/>
+                        <a:t>CDK1</a:t>
+                      </a:r>
+                      <a:r>
+                        <a:rPr lang="en-US" baseline="0" dirty="0" smtClean="0"/>
+                        <a:t> is the master regulator]</a:t>
+                      </a:r>
+                      <a:endParaRPr lang="en-US" dirty="0"/>
+                    </a:p>
+                  </a:txBody>
+                  <a:tcPr/>
+                </a:tc>
+                <a:tc>
+                  <a:txBody>
+                    <a:bodyPr/>
+                    <a:lstStyle/>
+                    <a:p>
                       <a:endParaRPr lang="en-US" dirty="0"/>
                     </a:p>
                   </a:txBody>
@@ -6570,14 +6710,14 @@
           <p:nvPr>
             <p:extLst>
               <p:ext uri="{D42A27DB-BD31-4B8C-83A1-F6EECF244321}">
-                <p14:modId xmlns:p14="http://schemas.microsoft.com/office/powerpoint/2010/main" val="1170178110"/>
+                <p14:modId xmlns:p14="http://schemas.microsoft.com/office/powerpoint/2010/main" val="1984075350"/>
               </p:ext>
             </p:extLst>
           </p:nvPr>
         </p:nvGraphicFramePr>
         <p:xfrm>
           <a:off x="882468" y="702249"/>
-          <a:ext cx="10429447" cy="5525380"/>
+          <a:ext cx="10429447" cy="4885300"/>
         </p:xfrm>
         <a:graphic>
           <a:graphicData uri="http://schemas.openxmlformats.org/drawingml/2006/table">
@@ -6745,7 +6885,7 @@
                     <a:p>
                       <a:r>
                         <a:rPr lang="en-US" dirty="0" smtClean="0"/>
-                        <a:t>500K</a:t>
+                        <a:t>1000K</a:t>
                       </a:r>
                       <a:endParaRPr lang="en-US" dirty="0"/>
                     </a:p>
@@ -6757,14 +6897,6 @@
                     <a:bodyPr/>
                     <a:lstStyle/>
                     <a:p>
-                      <a:r>
-                        <a:rPr lang="en-US" dirty="0" smtClean="0">
-                          <a:solidFill>
-                            <a:srgbClr val="FF0000"/>
-                          </a:solidFill>
-                        </a:rPr>
-                        <a:t>???</a:t>
-                      </a:r>
                       <a:endParaRPr lang="en-US" dirty="0">
                         <a:solidFill>
                           <a:srgbClr val="FF0000"/>
@@ -6807,7 +6939,7 @@
                     <a:p>
                       <a:r>
                         <a:rPr lang="en-US" dirty="0" smtClean="0"/>
-                        <a:t>500K</a:t>
+                        <a:t>1000K</a:t>
                       </a:r>
                       <a:endParaRPr lang="en-US" dirty="0"/>
                     </a:p>
@@ -6877,14 +7009,6 @@
                     <a:bodyPr/>
                     <a:lstStyle/>
                     <a:p>
-                      <a:r>
-                        <a:rPr lang="en-US" dirty="0" smtClean="0">
-                          <a:solidFill>
-                            <a:srgbClr val="FF0000"/>
-                          </a:solidFill>
-                        </a:rPr>
-                        <a:t>???</a:t>
-                      </a:r>
                       <a:endParaRPr lang="en-US" dirty="0">
                         <a:solidFill>
                           <a:srgbClr val="FF0000"/>
@@ -6989,7 +7113,7 @@
                     <a:p>
                       <a:r>
                         <a:rPr lang="en-US" dirty="0" smtClean="0"/>
-                        <a:t>0.01</a:t>
+                        <a:t>0.03</a:t>
                       </a:r>
                       <a:endParaRPr lang="en-US" dirty="0"/>
                     </a:p>
@@ -7059,7 +7183,7 @@
                     <a:p>
                       <a:r>
                         <a:rPr lang="en-US" dirty="0" smtClean="0"/>
-                        <a:t>0.01</a:t>
+                        <a:t>0.03</a:t>
                       </a:r>
                       <a:endParaRPr lang="en-US" dirty="0"/>
                     </a:p>
@@ -7168,7 +7292,7 @@
                   <a:tcPr/>
                 </a:tc>
               </a:tr>
-              <a:tr h="121920">
+              <a:tr h="243840">
                 <a:tc>
                   <a:txBody>
                     <a:bodyPr/>
@@ -7176,11 +7300,15 @@
                     <a:p>
                       <a:r>
                         <a:rPr lang="en-US" dirty="0" smtClean="0"/>
-                        <a:t>Time needed for</a:t>
-                      </a:r>
-                      <a:r>
-                        <a:rPr lang="en-US" baseline="0" dirty="0" smtClean="0"/>
-                        <a:t> reaction and recruiting</a:t>
+                        <a:t>Earliest time to exist mitosis (</a:t>
+                      </a:r>
+                      <a:r>
+                        <a:rPr lang="en-US" dirty="0" err="1" smtClean="0"/>
+                        <a:t>dt</a:t>
+                      </a:r>
+                      <a:r>
+                        <a:rPr lang="en-US" dirty="0" smtClean="0"/>
+                        <a:t>(1))</a:t>
                       </a:r>
                       <a:endParaRPr lang="en-US" dirty="0"/>
                     </a:p>
@@ -7194,7 +7322,11 @@
                     <a:p>
                       <a:r>
                         <a:rPr lang="en-US" dirty="0" smtClean="0"/>
-                        <a:t>3s</a:t>
+                        <a:t>40</a:t>
+                      </a:r>
+                      <a:r>
+                        <a:rPr lang="en-US" baseline="0" dirty="0" smtClean="0"/>
+                        <a:t> min</a:t>
                       </a:r>
                       <a:endParaRPr lang="en-US" dirty="0"/>
                     </a:p>
@@ -7206,95 +7338,6 @@
                     <a:bodyPr/>
                     <a:lstStyle/>
                     <a:p>
-                      <a:r>
-                        <a:rPr lang="en-US" dirty="0" smtClean="0">
-                          <a:solidFill>
-                            <a:srgbClr val="FF0000"/>
-                          </a:solidFill>
-                        </a:rPr>
-                        <a:t>???</a:t>
-                      </a:r>
-                      <a:endParaRPr lang="en-US" dirty="0">
-                        <a:solidFill>
-                          <a:srgbClr val="FF0000"/>
-                        </a:solidFill>
-                      </a:endParaRPr>
-                    </a:p>
-                  </a:txBody>
-                  <a:tcPr/>
-                </a:tc>
-                <a:tc>
-                  <a:txBody>
-                    <a:bodyPr/>
-                    <a:lstStyle/>
-                    <a:p>
-                      <a:r>
-                        <a:rPr lang="en-US" baseline="0" dirty="0" smtClean="0">
-                          <a:solidFill>
-                            <a:srgbClr val="FF0000"/>
-                          </a:solidFill>
-                        </a:rPr>
-                        <a:t>Could Qin check?</a:t>
-                      </a:r>
-                    </a:p>
-                  </a:txBody>
-                  <a:tcPr/>
-                </a:tc>
-              </a:tr>
-              <a:tr h="243840">
-                <a:tc>
-                  <a:txBody>
-                    <a:bodyPr/>
-                    <a:lstStyle/>
-                    <a:p>
-                      <a:r>
-                        <a:rPr lang="en-US" dirty="0" smtClean="0"/>
-                        <a:t>Earliest time to exist mitosis (</a:t>
-                      </a:r>
-                      <a:r>
-                        <a:rPr lang="en-US" dirty="0" err="1" smtClean="0"/>
-                        <a:t>dt</a:t>
-                      </a:r>
-                      <a:r>
-                        <a:rPr lang="en-US" dirty="0" smtClean="0"/>
-                        <a:t>(1))</a:t>
-                      </a:r>
-                      <a:endParaRPr lang="en-US" dirty="0"/>
-                    </a:p>
-                  </a:txBody>
-                  <a:tcPr/>
-                </a:tc>
-                <a:tc>
-                  <a:txBody>
-                    <a:bodyPr/>
-                    <a:lstStyle/>
-                    <a:p>
-                      <a:r>
-                        <a:rPr lang="en-US" dirty="0" smtClean="0"/>
-                        <a:t>40</a:t>
-                      </a:r>
-                      <a:r>
-                        <a:rPr lang="en-US" baseline="0" dirty="0" smtClean="0"/>
-                        <a:t> min</a:t>
-                      </a:r>
-                      <a:endParaRPr lang="en-US" dirty="0"/>
-                    </a:p>
-                  </a:txBody>
-                  <a:tcPr/>
-                </a:tc>
-                <a:tc>
-                  <a:txBody>
-                    <a:bodyPr/>
-                    <a:lstStyle/>
-                    <a:p>
-                      <a:r>
-                        <a:rPr lang="en-US" dirty="0" smtClean="0">
-                          <a:solidFill>
-                            <a:srgbClr val="FF0000"/>
-                          </a:solidFill>
-                        </a:rPr>
-                        <a:t>???</a:t>
-                      </a:r>
                       <a:endParaRPr lang="en-US" dirty="0">
                         <a:solidFill>
                           <a:srgbClr val="FF0000"/>
@@ -7357,14 +7400,6 @@
                     <a:bodyPr/>
                     <a:lstStyle/>
                     <a:p>
-                      <a:r>
-                        <a:rPr lang="en-US" dirty="0" smtClean="0">
-                          <a:solidFill>
-                            <a:srgbClr val="FF0000"/>
-                          </a:solidFill>
-                        </a:rPr>
-                        <a:t>???</a:t>
-                      </a:r>
                       <a:endParaRPr lang="en-US" dirty="0">
                         <a:solidFill>
                           <a:srgbClr val="FF0000"/>
@@ -7421,6 +7456,89 @@
       </p:grpSpPr>
       <p:sp>
         <p:nvSpPr>
+          <p:cNvPr id="2" name="TextBox 1"/>
+          <p:cNvSpPr txBox="1"/>
+          <p:nvPr/>
+        </p:nvSpPr>
+        <p:spPr>
+          <a:xfrm>
+            <a:off x="567069" y="411126"/>
+            <a:ext cx="10341935" cy="923330"/>
+          </a:xfrm>
+          <a:prstGeom prst="rect">
+            <a:avLst/>
+          </a:prstGeom>
+          <a:noFill/>
+        </p:spPr>
+        <p:txBody>
+          <a:bodyPr wrap="square" rtlCol="0">
+            <a:spAutoFit/>
+          </a:bodyPr>
+          <a:lstStyle/>
+          <a:p>
+            <a:r>
+              <a:rPr lang="en-US" b="1" dirty="0" smtClean="0"/>
+              <a:t>References:</a:t>
+            </a:r>
+            <a:endParaRPr lang="en-US" dirty="0"/>
+          </a:p>
+          <a:p>
+            <a:pPr marL="342900" indent="-342900">
+              <a:buFont typeface="+mj-lt"/>
+              <a:buAutoNum type="arabicPeriod"/>
+            </a:pPr>
+            <a:r>
+              <a:rPr lang="en-US" dirty="0" err="1" smtClean="0"/>
+              <a:t>Aagaard</a:t>
+            </a:r>
+            <a:r>
+              <a:rPr lang="en-US" dirty="0" smtClean="0"/>
+              <a:t> L </a:t>
+            </a:r>
+            <a:r>
+              <a:rPr lang="en-US" dirty="0" err="1" smtClean="0"/>
+              <a:t>Jenuwein</a:t>
+            </a:r>
+            <a:r>
+              <a:rPr lang="en-US" dirty="0" smtClean="0"/>
+              <a:t> T 2000 JCS, Mitotic phosphorylation of SUV39H1, a novel component of active centromeres, coincides with transient accumulation at mammalian centromeres. </a:t>
+            </a:r>
+            <a:endParaRPr lang="en-US" dirty="0"/>
+          </a:p>
+        </p:txBody>
+      </p:sp>
+    </p:spTree>
+    <p:extLst>
+      <p:ext uri="{BB962C8B-B14F-4D97-AF65-F5344CB8AC3E}">
+        <p14:creationId xmlns:p14="http://schemas.microsoft.com/office/powerpoint/2010/main" val="145726019"/>
+      </p:ext>
+    </p:extLst>
+  </p:cSld>
+  <p:clrMapOvr>
+    <a:masterClrMapping/>
+  </p:clrMapOvr>
+</p:sld>
+</file>
+
+<file path=ppt/slides/slide8.xml><?xml version="1.0" encoding="utf-8"?>
+<p:sld xmlns:a="http://schemas.openxmlformats.org/drawingml/2006/main" xmlns:r="http://schemas.openxmlformats.org/officeDocument/2006/relationships" xmlns:p="http://schemas.openxmlformats.org/presentationml/2006/main">
+  <p:cSld>
+    <p:spTree>
+      <p:nvGrpSpPr>
+        <p:cNvPr id="1" name=""/>
+        <p:cNvGrpSpPr/>
+        <p:nvPr/>
+      </p:nvGrpSpPr>
+      <p:grpSpPr>
+        <a:xfrm>
+          <a:off x="0" y="0"/>
+          <a:ext cx="0" cy="0"/>
+          <a:chOff x="0" y="0"/>
+          <a:chExt cx="0" cy="0"/>
+        </a:xfrm>
+      </p:grpSpPr>
+      <p:sp>
+        <p:nvSpPr>
           <p:cNvPr id="47" name="TextBox 46"/>
           <p:cNvSpPr txBox="1"/>
           <p:nvPr/>
@@ -7443,36 +7561,32 @@
           <a:p>
             <a:r>
               <a:rPr lang="en-US" sz="2400" b="1" dirty="0" smtClean="0"/>
-              <a:t>S10P repelling MT is crucial for fast demethylation at mitotic entrance, while S10P recruiting KDM plays an assisting role</a:t>
+              <a:t>Model3: S10P recruiting KDMs </a:t>
+            </a:r>
+            <a:r>
+              <a:rPr lang="en-US" sz="2400" b="1" dirty="0" smtClean="0"/>
+              <a:t>is crucial for fast demethylation at mitotic entrance, while S10P </a:t>
+            </a:r>
+            <a:r>
+              <a:rPr lang="en-US" sz="2400" b="1" dirty="0" smtClean="0"/>
+              <a:t>repelling </a:t>
+            </a:r>
+            <a:r>
+              <a:rPr lang="en-US" sz="2400" b="1" dirty="0" smtClean="0"/>
+              <a:t>MTs </a:t>
+            </a:r>
+            <a:r>
+              <a:rPr lang="en-US" sz="2400" b="1" dirty="0" smtClean="0"/>
+              <a:t>plays </a:t>
+            </a:r>
+            <a:r>
+              <a:rPr lang="en-US" sz="2400" b="1" dirty="0" smtClean="0"/>
+              <a:t>an assisting role</a:t>
             </a:r>
             <a:endParaRPr lang="en-US" sz="2400" b="1" dirty="0"/>
           </a:p>
         </p:txBody>
       </p:sp>
-      <p:pic>
-        <p:nvPicPr>
-          <p:cNvPr id="48" name="Picture 47"/>
-          <p:cNvPicPr>
-            <a:picLocks noChangeAspect="1"/>
-          </p:cNvPicPr>
-          <p:nvPr/>
-        </p:nvPicPr>
-        <p:blipFill>
-          <a:blip r:embed="rId2"/>
-          <a:stretch>
-            <a:fillRect/>
-          </a:stretch>
-        </p:blipFill>
-        <p:spPr>
-          <a:xfrm>
-            <a:off x="1" y="1658084"/>
-            <a:ext cx="7711744" cy="2996710"/>
-          </a:xfrm>
-          <a:prstGeom prst="rect">
-            <a:avLst/>
-          </a:prstGeom>
-        </p:spPr>
-      </p:pic>
       <p:grpSp>
         <p:nvGrpSpPr>
           <p:cNvPr id="50" name="Group 49"/>
@@ -8488,36 +8602,6 @@
           </a:p>
         </p:txBody>
       </p:sp>
-    </p:spTree>
-    <p:extLst>
-      <p:ext uri="{BB962C8B-B14F-4D97-AF65-F5344CB8AC3E}">
-        <p14:creationId xmlns:p14="http://schemas.microsoft.com/office/powerpoint/2010/main" val="1792781693"/>
-      </p:ext>
-    </p:extLst>
-  </p:cSld>
-  <p:clrMapOvr>
-    <a:masterClrMapping/>
-  </p:clrMapOvr>
-</p:sld>
-</file>
-
-<file path=ppt/slides/slide8.xml><?xml version="1.0" encoding="utf-8"?>
-<p:sld xmlns:a="http://schemas.openxmlformats.org/drawingml/2006/main" xmlns:r="http://schemas.openxmlformats.org/officeDocument/2006/relationships" xmlns:p="http://schemas.openxmlformats.org/presentationml/2006/main">
-  <p:cSld>
-    <p:spTree>
-      <p:nvGrpSpPr>
-        <p:cNvPr id="1" name=""/>
-        <p:cNvGrpSpPr/>
-        <p:nvPr/>
-      </p:nvGrpSpPr>
-      <p:grpSpPr>
-        <a:xfrm>
-          <a:off x="0" y="0"/>
-          <a:ext cx="0" cy="0"/>
-          <a:chOff x="0" y="0"/>
-          <a:chExt cx="0" cy="0"/>
-        </a:xfrm>
-      </p:grpSpPr>
       <p:pic>
         <p:nvPicPr>
           <p:cNvPr id="2" name="Picture 1"/>
@@ -8534,93 +8618,18 @@
         </p:blipFill>
         <p:spPr>
           <a:xfrm>
-            <a:off x="363801" y="1136327"/>
-            <a:ext cx="5895619" cy="3465000"/>
+            <a:off x="634812" y="1600079"/>
+            <a:ext cx="6141807" cy="3482283"/>
           </a:xfrm>
           <a:prstGeom prst="rect">
             <a:avLst/>
           </a:prstGeom>
         </p:spPr>
       </p:pic>
-      <p:sp>
-        <p:nvSpPr>
-          <p:cNvPr id="3" name="TextBox 2"/>
-          <p:cNvSpPr txBox="1"/>
-          <p:nvPr/>
-        </p:nvSpPr>
-        <p:spPr>
-          <a:xfrm>
-            <a:off x="461319" y="313209"/>
-            <a:ext cx="6936822" cy="830997"/>
-          </a:xfrm>
-          <a:prstGeom prst="rect">
-            <a:avLst/>
-          </a:prstGeom>
-          <a:noFill/>
-        </p:spPr>
-        <p:txBody>
-          <a:bodyPr wrap="square" rtlCol="0">
-            <a:spAutoFit/>
-          </a:bodyPr>
-          <a:lstStyle/>
-          <a:p>
-            <a:r>
-              <a:rPr lang="en-US" sz="2400" b="1" dirty="0" smtClean="0"/>
-              <a:t>Model2: MT did not increase </a:t>
-            </a:r>
-            <a:r>
-              <a:rPr lang="en-US" sz="2400" b="1" smtClean="0"/>
-              <a:t>at the entrance </a:t>
-            </a:r>
-            <a:r>
-              <a:rPr lang="en-US" sz="2400" b="1" dirty="0" smtClean="0"/>
-              <a:t>of Mitosis</a:t>
-            </a:r>
-            <a:endParaRPr lang="en-US" sz="2400" b="1" dirty="0"/>
-          </a:p>
-        </p:txBody>
-      </p:sp>
-      <p:sp>
-        <p:nvSpPr>
-          <p:cNvPr id="4" name="Rectangle 3"/>
-          <p:cNvSpPr/>
-          <p:nvPr/>
-        </p:nvSpPr>
-        <p:spPr>
-          <a:xfrm>
-            <a:off x="778009" y="5402647"/>
-            <a:ext cx="2991268" cy="369332"/>
-          </a:xfrm>
-          <a:prstGeom prst="rect">
-            <a:avLst/>
-          </a:prstGeom>
-        </p:spPr>
-        <p:txBody>
-          <a:bodyPr wrap="none">
-            <a:spAutoFit/>
-          </a:bodyPr>
-          <a:lstStyle/>
-          <a:p>
-            <a:r>
-              <a:rPr lang="en-US" b="1" dirty="0" smtClean="0"/>
-              <a:t>&gt;&gt; </a:t>
-            </a:r>
-            <a:r>
-              <a:rPr lang="en-US" b="1" dirty="0" err="1" smtClean="0"/>
-              <a:t>test_pm_model</a:t>
-            </a:r>
-            <a:r>
-              <a:rPr lang="en-US" b="1" dirty="0" smtClean="0"/>
-              <a:t>('model2');</a:t>
-            </a:r>
-            <a:endParaRPr lang="en-US" b="1" dirty="0"/>
-          </a:p>
-        </p:txBody>
-      </p:sp>
     </p:spTree>
     <p:extLst>
       <p:ext uri="{BB962C8B-B14F-4D97-AF65-F5344CB8AC3E}">
-        <p14:creationId xmlns:p14="http://schemas.microsoft.com/office/powerpoint/2010/main" val="3742112732"/>
+        <p14:creationId xmlns:p14="http://schemas.microsoft.com/office/powerpoint/2010/main" val="1792781693"/>
       </p:ext>
     </p:extLst>
   </p:cSld>
@@ -8647,9 +8656,76 @@
           <a:chExt cx="0" cy="0"/>
         </a:xfrm>
       </p:grpSpPr>
+      <p:sp>
+        <p:nvSpPr>
+          <p:cNvPr id="3" name="TextBox 2"/>
+          <p:cNvSpPr txBox="1"/>
+          <p:nvPr/>
+        </p:nvSpPr>
+        <p:spPr>
+          <a:xfrm>
+            <a:off x="461319" y="313209"/>
+            <a:ext cx="8058904" cy="461665"/>
+          </a:xfrm>
+          <a:prstGeom prst="rect">
+            <a:avLst/>
+          </a:prstGeom>
+          <a:noFill/>
+        </p:spPr>
+        <p:txBody>
+          <a:bodyPr wrap="square" rtlCol="0">
+            <a:spAutoFit/>
+          </a:bodyPr>
+          <a:lstStyle/>
+          <a:p>
+            <a:r>
+              <a:rPr lang="en-US" sz="2400" b="1" dirty="0" smtClean="0"/>
+              <a:t>Model2: MT did not increase at the entrance of Mitosis</a:t>
+            </a:r>
+            <a:endParaRPr lang="en-US" sz="2400" b="1" dirty="0"/>
+          </a:p>
+        </p:txBody>
+      </p:sp>
+      <p:sp>
+        <p:nvSpPr>
+          <p:cNvPr id="4" name="Rectangle 3"/>
+          <p:cNvSpPr/>
+          <p:nvPr/>
+        </p:nvSpPr>
+        <p:spPr>
+          <a:xfrm>
+            <a:off x="778009" y="5402647"/>
+            <a:ext cx="2991268" cy="369332"/>
+          </a:xfrm>
+          <a:prstGeom prst="rect">
+            <a:avLst/>
+          </a:prstGeom>
+        </p:spPr>
+        <p:txBody>
+          <a:bodyPr wrap="none">
+            <a:spAutoFit/>
+          </a:bodyPr>
+          <a:lstStyle/>
+          <a:p>
+            <a:r>
+              <a:rPr lang="en-US" b="1" dirty="0" smtClean="0"/>
+              <a:t>&gt;&gt; </a:t>
+            </a:r>
+            <a:r>
+              <a:rPr lang="en-US" b="1" dirty="0" err="1" smtClean="0"/>
+              <a:t>test_pm_model</a:t>
+            </a:r>
+            <a:r>
+              <a:rPr lang="en-US" b="1" dirty="0" smtClean="0"/>
+              <a:t>('model2');</a:t>
+            </a:r>
+            <a:endParaRPr lang="en-US" b="1" dirty="0"/>
+          </a:p>
+        </p:txBody>
+      </p:sp>
       <p:pic>
         <p:nvPicPr>
-          <p:cNvPr id="3" name="Picture 2"/>
+          <p:cNvPr id="5" name="Picture 4"/>
           <p:cNvPicPr>
             <a:picLocks noChangeAspect="1"/>
           </p:cNvPicPr>
@@ -8663,8 +8739,8 @@
         </p:blipFill>
         <p:spPr>
           <a:xfrm>
-            <a:off x="767665" y="777532"/>
-            <a:ext cx="8182555" cy="2863778"/>
+            <a:off x="674653" y="1324364"/>
+            <a:ext cx="6065129" cy="3898125"/>
           </a:xfrm>
           <a:prstGeom prst="rect">
             <a:avLst/>
@@ -8673,14 +8749,14 @@
       </p:pic>
       <p:sp>
         <p:nvSpPr>
-          <p:cNvPr id="4" name="TextBox 3"/>
+          <p:cNvPr id="6" name="TextBox 5"/>
           <p:cNvSpPr txBox="1"/>
           <p:nvPr/>
         </p:nvSpPr>
         <p:spPr>
           <a:xfrm>
-            <a:off x="1017346" y="230114"/>
-            <a:ext cx="6104074" cy="369332"/>
+            <a:off x="7620000" y="1552353"/>
+            <a:ext cx="4004930" cy="923330"/>
           </a:xfrm>
           <a:prstGeom prst="rect">
             <a:avLst/>
@@ -8694,48 +8770,41 @@
           <a:lstStyle/>
           <a:p>
             <a:r>
-              <a:rPr lang="en-US" dirty="0"/>
-              <a:t>&gt;&gt; </a:t>
-            </a:r>
-            <a:r>
-              <a:rPr lang="en-US" dirty="0" err="1"/>
-              <a:t>test_pm_model</a:t>
-            </a:r>
-            <a:r>
-              <a:rPr lang="en-US" dirty="0"/>
-              <a:t>('model4');</a:t>
-            </a:r>
+              <a:rPr lang="en-US" dirty="0" smtClean="0">
+                <a:solidFill>
+                  <a:srgbClr val="FF0000"/>
+                </a:solidFill>
+              </a:rPr>
+              <a:t>Q: In </a:t>
+            </a:r>
+            <a:r>
+              <a:rPr lang="en-US" dirty="0" err="1" smtClean="0">
+                <a:solidFill>
+                  <a:srgbClr val="FF0000"/>
+                </a:solidFill>
+              </a:rPr>
+              <a:t>Sua</a:t>
+            </a:r>
+            <a:r>
+              <a:rPr lang="en-US" dirty="0" smtClean="0">
+                <a:solidFill>
+                  <a:srgbClr val="FF0000"/>
+                </a:solidFill>
+              </a:rPr>
+              <a:t>-/- cells, do we still see that the duration of mitosis is dependent on the inhibitor strength? </a:t>
+            </a:r>
+            <a:endParaRPr lang="en-US" dirty="0">
+              <a:solidFill>
+                <a:srgbClr val="FF0000"/>
+              </a:solidFill>
+            </a:endParaRPr>
           </a:p>
         </p:txBody>
       </p:sp>
-      <p:pic>
-        <p:nvPicPr>
-          <p:cNvPr id="5" name="Picture 4"/>
-          <p:cNvPicPr>
-            <a:picLocks noChangeAspect="1"/>
-          </p:cNvPicPr>
-          <p:nvPr/>
-        </p:nvPicPr>
-        <p:blipFill>
-          <a:blip r:embed="rId3"/>
-          <a:stretch>
-            <a:fillRect/>
-          </a:stretch>
-        </p:blipFill>
-        <p:spPr>
-          <a:xfrm>
-            <a:off x="767665" y="3641310"/>
-            <a:ext cx="7801050" cy="2712014"/>
-          </a:xfrm>
-          <a:prstGeom prst="rect">
-            <a:avLst/>
-          </a:prstGeom>
-        </p:spPr>
-      </p:pic>
     </p:spTree>
     <p:extLst>
       <p:ext uri="{BB962C8B-B14F-4D97-AF65-F5344CB8AC3E}">
-        <p14:creationId xmlns:p14="http://schemas.microsoft.com/office/powerpoint/2010/main" val="678477960"/>
+        <p14:creationId xmlns:p14="http://schemas.microsoft.com/office/powerpoint/2010/main" val="3742112732"/>
       </p:ext>
     </p:extLst>
   </p:cSld>

</xml_diff>

<commit_message>
Updated Sequence analyzer, phospho-methyl model, make_movie etc
</commit_message>
<xml_diff>
--- a/app/model/result_0211_2017.pptx
+++ b/app/model/result_0211_2017.pptx
@@ -11,9 +11,8 @@
     <p:sldId id="267" r:id="rId5"/>
     <p:sldId id="265" r:id="rId6"/>
     <p:sldId id="266" r:id="rId7"/>
-    <p:sldId id="269" r:id="rId8"/>
-    <p:sldId id="259" r:id="rId9"/>
-    <p:sldId id="262" r:id="rId10"/>
+    <p:sldId id="259" r:id="rId8"/>
+    <p:sldId id="262" r:id="rId9"/>
   </p:sldIdLst>
   <p:sldSz cx="12192000" cy="6858000"/>
   <p:notesSz cx="6858000" cy="9144000"/>
@@ -251,7 +250,7 @@
           <a:p>
             <a:fld id="{13FF81DB-72FD-4E0B-96E8-AA8F3653C4D4}" type="datetimeFigureOut">
               <a:rPr lang="en-US" smtClean="0"/>
-              <a:t>3/1/2017</a:t>
+              <a:t>3/9/2017</a:t>
             </a:fld>
             <a:endParaRPr lang="en-US"/>
           </a:p>
@@ -421,7 +420,7 @@
           <a:p>
             <a:fld id="{13FF81DB-72FD-4E0B-96E8-AA8F3653C4D4}" type="datetimeFigureOut">
               <a:rPr lang="en-US" smtClean="0"/>
-              <a:t>3/1/2017</a:t>
+              <a:t>3/9/2017</a:t>
             </a:fld>
             <a:endParaRPr lang="en-US"/>
           </a:p>
@@ -601,7 +600,7 @@
           <a:p>
             <a:fld id="{13FF81DB-72FD-4E0B-96E8-AA8F3653C4D4}" type="datetimeFigureOut">
               <a:rPr lang="en-US" smtClean="0"/>
-              <a:t>3/1/2017</a:t>
+              <a:t>3/9/2017</a:t>
             </a:fld>
             <a:endParaRPr lang="en-US"/>
           </a:p>
@@ -771,7 +770,7 @@
           <a:p>
             <a:fld id="{13FF81DB-72FD-4E0B-96E8-AA8F3653C4D4}" type="datetimeFigureOut">
               <a:rPr lang="en-US" smtClean="0"/>
-              <a:t>3/1/2017</a:t>
+              <a:t>3/9/2017</a:t>
             </a:fld>
             <a:endParaRPr lang="en-US"/>
           </a:p>
@@ -1017,7 +1016,7 @@
           <a:p>
             <a:fld id="{13FF81DB-72FD-4E0B-96E8-AA8F3653C4D4}" type="datetimeFigureOut">
               <a:rPr lang="en-US" smtClean="0"/>
-              <a:t>3/1/2017</a:t>
+              <a:t>3/9/2017</a:t>
             </a:fld>
             <a:endParaRPr lang="en-US"/>
           </a:p>
@@ -1249,7 +1248,7 @@
           <a:p>
             <a:fld id="{13FF81DB-72FD-4E0B-96E8-AA8F3653C4D4}" type="datetimeFigureOut">
               <a:rPr lang="en-US" smtClean="0"/>
-              <a:t>3/1/2017</a:t>
+              <a:t>3/9/2017</a:t>
             </a:fld>
             <a:endParaRPr lang="en-US"/>
           </a:p>
@@ -1616,7 +1615,7 @@
           <a:p>
             <a:fld id="{13FF81DB-72FD-4E0B-96E8-AA8F3653C4D4}" type="datetimeFigureOut">
               <a:rPr lang="en-US" smtClean="0"/>
-              <a:t>3/1/2017</a:t>
+              <a:t>3/9/2017</a:t>
             </a:fld>
             <a:endParaRPr lang="en-US"/>
           </a:p>
@@ -1734,7 +1733,7 @@
           <a:p>
             <a:fld id="{13FF81DB-72FD-4E0B-96E8-AA8F3653C4D4}" type="datetimeFigureOut">
               <a:rPr lang="en-US" smtClean="0"/>
-              <a:t>3/1/2017</a:t>
+              <a:t>3/9/2017</a:t>
             </a:fld>
             <a:endParaRPr lang="en-US"/>
           </a:p>
@@ -1829,7 +1828,7 @@
           <a:p>
             <a:fld id="{13FF81DB-72FD-4E0B-96E8-AA8F3653C4D4}" type="datetimeFigureOut">
               <a:rPr lang="en-US" smtClean="0"/>
-              <a:t>3/1/2017</a:t>
+              <a:t>3/9/2017</a:t>
             </a:fld>
             <a:endParaRPr lang="en-US"/>
           </a:p>
@@ -2106,7 +2105,7 @@
           <a:p>
             <a:fld id="{13FF81DB-72FD-4E0B-96E8-AA8F3653C4D4}" type="datetimeFigureOut">
               <a:rPr lang="en-US" smtClean="0"/>
-              <a:t>3/1/2017</a:t>
+              <a:t>3/9/2017</a:t>
             </a:fld>
             <a:endParaRPr lang="en-US"/>
           </a:p>
@@ -2359,7 +2358,7 @@
           <a:p>
             <a:fld id="{13FF81DB-72FD-4E0B-96E8-AA8F3653C4D4}" type="datetimeFigureOut">
               <a:rPr lang="en-US" smtClean="0"/>
-              <a:t>3/1/2017</a:t>
+              <a:t>3/9/2017</a:t>
             </a:fld>
             <a:endParaRPr lang="en-US"/>
           </a:p>
@@ -2572,7 +2571,7 @@
           <a:p>
             <a:fld id="{13FF81DB-72FD-4E0B-96E8-AA8F3653C4D4}" type="datetimeFigureOut">
               <a:rPr lang="en-US" smtClean="0"/>
-              <a:t>3/1/2017</a:t>
+              <a:t>3/9/2017</a:t>
             </a:fld>
             <a:endParaRPr lang="en-US"/>
           </a:p>
@@ -2977,18 +2976,148 @@
           <a:chExt cx="0" cy="0"/>
         </a:xfrm>
       </p:grpSpPr>
+      <p:sp>
+        <p:nvSpPr>
+          <p:cNvPr id="34" name="TextBox 33"/>
+          <p:cNvSpPr txBox="1"/>
+          <p:nvPr/>
+        </p:nvSpPr>
+        <p:spPr>
+          <a:xfrm>
+            <a:off x="797041" y="156518"/>
+            <a:ext cx="4551528" cy="461665"/>
+          </a:xfrm>
+          <a:prstGeom prst="rect">
+            <a:avLst/>
+          </a:prstGeom>
+          <a:noFill/>
+        </p:spPr>
+        <p:txBody>
+          <a:bodyPr wrap="square" rtlCol="0">
+            <a:spAutoFit/>
+          </a:bodyPr>
+          <a:lstStyle/>
+          <a:p>
+            <a:r>
+              <a:rPr lang="en-US" sz="2400" b="1" dirty="0" smtClean="0"/>
+              <a:t>Network graph</a:t>
+            </a:r>
+            <a:endParaRPr lang="en-US" sz="2400" b="1" dirty="0"/>
+          </a:p>
+        </p:txBody>
+      </p:sp>
+      <p:sp>
+        <p:nvSpPr>
+          <p:cNvPr id="35" name="TextBox 34"/>
+          <p:cNvSpPr txBox="1"/>
+          <p:nvPr/>
+        </p:nvSpPr>
+        <p:spPr>
+          <a:xfrm>
+            <a:off x="6005384" y="2191403"/>
+            <a:ext cx="3896497" cy="646331"/>
+          </a:xfrm>
+          <a:prstGeom prst="rect">
+            <a:avLst/>
+          </a:prstGeom>
+          <a:noFill/>
+        </p:spPr>
+        <p:txBody>
+          <a:bodyPr wrap="square" rtlCol="0">
+            <a:spAutoFit/>
+          </a:bodyPr>
+          <a:lstStyle/>
+          <a:p>
+            <a:r>
+              <a:rPr lang="en-US" b="1" dirty="0" smtClean="0"/>
+              <a:t>&gt;&gt; cd </a:t>
+            </a:r>
+            <a:r>
+              <a:rPr lang="en-US" b="1" dirty="0" err="1" smtClean="0"/>
+              <a:t>fluocell</a:t>
+            </a:r>
+            <a:r>
+              <a:rPr lang="en-US" b="1" dirty="0" smtClean="0"/>
+              <a:t>-current/app/model/</a:t>
+            </a:r>
+          </a:p>
+          <a:p>
+            <a:r>
+              <a:rPr lang="en-US" b="1" dirty="0" smtClean="0"/>
+              <a:t>&gt;&gt; </a:t>
+            </a:r>
+            <a:r>
+              <a:rPr lang="en-US" b="1" dirty="0" err="1" smtClean="0"/>
+              <a:t>test_pm_model</a:t>
+            </a:r>
+            <a:r>
+              <a:rPr lang="en-US" b="1" dirty="0" smtClean="0"/>
+              <a:t>('model4');</a:t>
+            </a:r>
+            <a:endParaRPr lang="en-US" b="1" dirty="0"/>
+          </a:p>
+        </p:txBody>
+      </p:sp>
+      <p:pic>
+        <p:nvPicPr>
+          <p:cNvPr id="5" name="Picture 4"/>
+          <p:cNvPicPr>
+            <a:picLocks noChangeAspect="1"/>
+          </p:cNvPicPr>
+          <p:nvPr/>
+        </p:nvPicPr>
+        <p:blipFill>
+          <a:blip r:embed="rId2"/>
+          <a:stretch>
+            <a:fillRect/>
+          </a:stretch>
+        </p:blipFill>
+        <p:spPr>
+          <a:xfrm>
+            <a:off x="219741" y="3230721"/>
+            <a:ext cx="5146294" cy="3292606"/>
+          </a:xfrm>
+          <a:prstGeom prst="rect">
+            <a:avLst/>
+          </a:prstGeom>
+        </p:spPr>
+      </p:pic>
+      <p:pic>
+        <p:nvPicPr>
+          <p:cNvPr id="6" name="Picture 5"/>
+          <p:cNvPicPr>
+            <a:picLocks noChangeAspect="1"/>
+          </p:cNvPicPr>
+          <p:nvPr/>
+        </p:nvPicPr>
+        <p:blipFill>
+          <a:blip r:embed="rId3"/>
+          <a:stretch>
+            <a:fillRect/>
+          </a:stretch>
+        </p:blipFill>
+        <p:spPr>
+          <a:xfrm>
+            <a:off x="5319641" y="3230721"/>
+            <a:ext cx="5387360" cy="3471303"/>
+          </a:xfrm>
+          <a:prstGeom prst="rect">
+            <a:avLst/>
+          </a:prstGeom>
+        </p:spPr>
+      </p:pic>
       <p:grpSp>
         <p:nvGrpSpPr>
-          <p:cNvPr id="36" name="Group 35"/>
+          <p:cNvPr id="3" name="Group 2"/>
           <p:cNvGrpSpPr/>
           <p:nvPr/>
         </p:nvGrpSpPr>
         <p:grpSpPr>
           <a:xfrm>
-            <a:off x="797041" y="156518"/>
-            <a:ext cx="4551528" cy="2621908"/>
-            <a:chOff x="797041" y="156518"/>
-            <a:chExt cx="4551528" cy="2621908"/>
+            <a:off x="797041" y="1141135"/>
+            <a:ext cx="4225660" cy="1637291"/>
+            <a:chOff x="797041" y="1141135"/>
+            <a:chExt cx="4225660" cy="1637291"/>
           </a:xfrm>
         </p:grpSpPr>
         <p:grpSp>
@@ -3709,276 +3838,132 @@
             </a:fontRef>
           </p:style>
         </p:cxnSp>
-        <p:sp>
-          <p:nvSpPr>
-            <p:cNvPr id="33" name="Freeform 32"/>
-            <p:cNvSpPr/>
-            <p:nvPr/>
-          </p:nvSpPr>
-          <p:spPr>
-            <a:xfrm>
-              <a:off x="1506724" y="796063"/>
-              <a:ext cx="2013524" cy="1256757"/>
-            </a:xfrm>
-            <a:custGeom>
-              <a:avLst/>
-              <a:gdLst>
-                <a:gd name="connsiteX0" fmla="*/ 1951630 w 2013524"/>
-                <a:gd name="connsiteY0" fmla="*/ 1256757 h 1256757"/>
-                <a:gd name="connsiteX1" fmla="*/ 1972102 w 2013524"/>
-                <a:gd name="connsiteY1" fmla="*/ 1161223 h 1256757"/>
-                <a:gd name="connsiteX2" fmla="*/ 1999397 w 2013524"/>
-                <a:gd name="connsiteY2" fmla="*/ 690375 h 1256757"/>
-                <a:gd name="connsiteX3" fmla="*/ 1726442 w 2013524"/>
-                <a:gd name="connsiteY3" fmla="*/ 253647 h 1256757"/>
-                <a:gd name="connsiteX4" fmla="*/ 1112293 w 2013524"/>
-                <a:gd name="connsiteY4" fmla="*/ 14811 h 1256757"/>
-                <a:gd name="connsiteX5" fmla="*/ 573206 w 2013524"/>
-                <a:gd name="connsiteY5" fmla="*/ 42107 h 1256757"/>
-                <a:gd name="connsiteX6" fmla="*/ 313899 w 2013524"/>
-                <a:gd name="connsiteY6" fmla="*/ 178584 h 1256757"/>
-                <a:gd name="connsiteX7" fmla="*/ 0 w 2013524"/>
-                <a:gd name="connsiteY7" fmla="*/ 362829 h 1256757"/>
-              </a:gdLst>
-              <a:ahLst/>
-              <a:cxnLst>
-                <a:cxn ang="0">
-                  <a:pos x="connsiteX0" y="connsiteY0"/>
-                </a:cxn>
-                <a:cxn ang="0">
-                  <a:pos x="connsiteX1" y="connsiteY1"/>
-                </a:cxn>
-                <a:cxn ang="0">
-                  <a:pos x="connsiteX2" y="connsiteY2"/>
-                </a:cxn>
-                <a:cxn ang="0">
-                  <a:pos x="connsiteX3" y="connsiteY3"/>
-                </a:cxn>
-                <a:cxn ang="0">
-                  <a:pos x="connsiteX4" y="connsiteY4"/>
-                </a:cxn>
-                <a:cxn ang="0">
-                  <a:pos x="connsiteX5" y="connsiteY5"/>
-                </a:cxn>
-                <a:cxn ang="0">
-                  <a:pos x="connsiteX6" y="connsiteY6"/>
-                </a:cxn>
-                <a:cxn ang="0">
-                  <a:pos x="connsiteX7" y="connsiteY7"/>
-                </a:cxn>
-              </a:cxnLst>
-              <a:rect l="l" t="t" r="r" b="b"/>
-              <a:pathLst>
-                <a:path w="2013524" h="1256757">
-                  <a:moveTo>
-                    <a:pt x="1951630" y="1256757"/>
-                  </a:moveTo>
-                  <a:cubicBezTo>
-                    <a:pt x="1957885" y="1256188"/>
-                    <a:pt x="1964141" y="1255620"/>
-                    <a:pt x="1972102" y="1161223"/>
-                  </a:cubicBezTo>
-                  <a:cubicBezTo>
-                    <a:pt x="1980063" y="1066826"/>
-                    <a:pt x="2040340" y="841638"/>
-                    <a:pt x="1999397" y="690375"/>
-                  </a:cubicBezTo>
-                  <a:cubicBezTo>
-                    <a:pt x="1958454" y="539112"/>
-                    <a:pt x="1874293" y="366241"/>
-                    <a:pt x="1726442" y="253647"/>
-                  </a:cubicBezTo>
-                  <a:cubicBezTo>
-                    <a:pt x="1578591" y="141053"/>
-                    <a:pt x="1304499" y="50068"/>
-                    <a:pt x="1112293" y="14811"/>
-                  </a:cubicBezTo>
-                  <a:cubicBezTo>
-                    <a:pt x="920087" y="-20446"/>
-                    <a:pt x="706272" y="14812"/>
-                    <a:pt x="573206" y="42107"/>
-                  </a:cubicBezTo>
-                  <a:cubicBezTo>
-                    <a:pt x="440140" y="69402"/>
-                    <a:pt x="409433" y="125130"/>
-                    <a:pt x="313899" y="178584"/>
-                  </a:cubicBezTo>
-                  <a:cubicBezTo>
-                    <a:pt x="218365" y="232038"/>
-                    <a:pt x="109182" y="297433"/>
-                    <a:pt x="0" y="362829"/>
-                  </a:cubicBezTo>
-                </a:path>
-              </a:pathLst>
-            </a:custGeom>
-            <a:noFill/>
-            <a:ln w="19050">
-              <a:solidFill>
-                <a:schemeClr val="tx1"/>
-              </a:solidFill>
-              <a:tailEnd type="diamond" w="lg" len="lg"/>
-            </a:ln>
-          </p:spPr>
-          <p:style>
-            <a:lnRef idx="2">
-              <a:schemeClr val="accent1">
-                <a:shade val="50000"/>
-              </a:schemeClr>
-            </a:lnRef>
-            <a:fillRef idx="1">
-              <a:schemeClr val="accent1"/>
-            </a:fillRef>
-            <a:effectRef idx="0">
-              <a:schemeClr val="accent1"/>
-            </a:effectRef>
-            <a:fontRef idx="minor">
-              <a:schemeClr val="lt1"/>
-            </a:fontRef>
-          </p:style>
-          <p:txBody>
-            <a:bodyPr rtlCol="0" anchor="ctr"/>
-            <a:lstStyle/>
-            <a:p>
-              <a:pPr algn="ctr"/>
-              <a:endParaRPr lang="en-US" b="1"/>
-            </a:p>
-          </p:txBody>
-        </p:sp>
-        <p:sp>
-          <p:nvSpPr>
-            <p:cNvPr id="34" name="TextBox 33"/>
-            <p:cNvSpPr txBox="1"/>
-            <p:nvPr/>
-          </p:nvSpPr>
-          <p:spPr>
-            <a:xfrm>
-              <a:off x="797041" y="156518"/>
-              <a:ext cx="4551528" cy="461665"/>
-            </a:xfrm>
-            <a:prstGeom prst="rect">
-              <a:avLst/>
-            </a:prstGeom>
-            <a:noFill/>
-          </p:spPr>
-          <p:txBody>
-            <a:bodyPr wrap="square" rtlCol="0">
-              <a:spAutoFit/>
-            </a:bodyPr>
-            <a:lstStyle/>
-            <a:p>
-              <a:r>
-                <a:rPr lang="en-US" sz="2400" b="1" dirty="0" smtClean="0"/>
-                <a:t>Network graph</a:t>
-              </a:r>
-              <a:endParaRPr lang="en-US" sz="2400" b="1" dirty="0"/>
-            </a:p>
-          </p:txBody>
-        </p:sp>
       </p:grpSp>
       <p:sp>
         <p:nvSpPr>
-          <p:cNvPr id="35" name="TextBox 34"/>
-          <p:cNvSpPr txBox="1"/>
+          <p:cNvPr id="4" name="Freeform 3"/>
+          <p:cNvSpPr/>
           <p:nvPr/>
         </p:nvSpPr>
         <p:spPr>
           <a:xfrm>
-            <a:off x="6005384" y="2191403"/>
-            <a:ext cx="3896497" cy="646331"/>
+            <a:off x="1492250" y="749604"/>
+            <a:ext cx="1968801" cy="1295096"/>
           </a:xfrm>
-          <a:prstGeom prst="rect">
+          <a:custGeom>
             <a:avLst/>
-          </a:prstGeom>
+            <a:gdLst>
+              <a:gd name="connsiteX0" fmla="*/ 1930400 w 1968801"/>
+              <a:gd name="connsiteY0" fmla="*/ 1295096 h 1295096"/>
+              <a:gd name="connsiteX1" fmla="*/ 1962150 w 1968801"/>
+              <a:gd name="connsiteY1" fmla="*/ 869646 h 1295096"/>
+              <a:gd name="connsiteX2" fmla="*/ 1816100 w 1968801"/>
+              <a:gd name="connsiteY2" fmla="*/ 387046 h 1295096"/>
+              <a:gd name="connsiteX3" fmla="*/ 1352550 w 1968801"/>
+              <a:gd name="connsiteY3" fmla="*/ 44146 h 1295096"/>
+              <a:gd name="connsiteX4" fmla="*/ 603250 w 1968801"/>
+              <a:gd name="connsiteY4" fmla="*/ 25096 h 1295096"/>
+              <a:gd name="connsiteX5" fmla="*/ 146050 w 1968801"/>
+              <a:gd name="connsiteY5" fmla="*/ 234646 h 1295096"/>
+              <a:gd name="connsiteX6" fmla="*/ 0 w 1968801"/>
+              <a:gd name="connsiteY6" fmla="*/ 361646 h 1295096"/>
+            </a:gdLst>
+            <a:ahLst/>
+            <a:cxnLst>
+              <a:cxn ang="0">
+                <a:pos x="connsiteX0" y="connsiteY0"/>
+              </a:cxn>
+              <a:cxn ang="0">
+                <a:pos x="connsiteX1" y="connsiteY1"/>
+              </a:cxn>
+              <a:cxn ang="0">
+                <a:pos x="connsiteX2" y="connsiteY2"/>
+              </a:cxn>
+              <a:cxn ang="0">
+                <a:pos x="connsiteX3" y="connsiteY3"/>
+              </a:cxn>
+              <a:cxn ang="0">
+                <a:pos x="connsiteX4" y="connsiteY4"/>
+              </a:cxn>
+              <a:cxn ang="0">
+                <a:pos x="connsiteX5" y="connsiteY5"/>
+              </a:cxn>
+              <a:cxn ang="0">
+                <a:pos x="connsiteX6" y="connsiteY6"/>
+              </a:cxn>
+            </a:cxnLst>
+            <a:rect l="l" t="t" r="r" b="b"/>
+            <a:pathLst>
+              <a:path w="1968801" h="1295096">
+                <a:moveTo>
+                  <a:pt x="1930400" y="1295096"/>
+                </a:moveTo>
+                <a:cubicBezTo>
+                  <a:pt x="1955800" y="1158042"/>
+                  <a:pt x="1981200" y="1020988"/>
+                  <a:pt x="1962150" y="869646"/>
+                </a:cubicBezTo>
+                <a:cubicBezTo>
+                  <a:pt x="1943100" y="718304"/>
+                  <a:pt x="1917700" y="524629"/>
+                  <a:pt x="1816100" y="387046"/>
+                </a:cubicBezTo>
+                <a:cubicBezTo>
+                  <a:pt x="1714500" y="249463"/>
+                  <a:pt x="1554692" y="104471"/>
+                  <a:pt x="1352550" y="44146"/>
+                </a:cubicBezTo>
+                <a:cubicBezTo>
+                  <a:pt x="1150408" y="-16179"/>
+                  <a:pt x="804333" y="-6654"/>
+                  <a:pt x="603250" y="25096"/>
+                </a:cubicBezTo>
+                <a:cubicBezTo>
+                  <a:pt x="402167" y="56846"/>
+                  <a:pt x="246592" y="178554"/>
+                  <a:pt x="146050" y="234646"/>
+                </a:cubicBezTo>
+                <a:cubicBezTo>
+                  <a:pt x="45508" y="290738"/>
+                  <a:pt x="22754" y="326192"/>
+                  <a:pt x="0" y="361646"/>
+                </a:cubicBezTo>
+              </a:path>
+            </a:pathLst>
+          </a:custGeom>
           <a:noFill/>
+          <a:ln w="19050">
+            <a:solidFill>
+              <a:schemeClr val="tx1"/>
+            </a:solidFill>
+            <a:tailEnd type="diamond" w="lg" len="lg"/>
+          </a:ln>
         </p:spPr>
+        <p:style>
+          <a:lnRef idx="2">
+            <a:schemeClr val="accent1">
+              <a:shade val="50000"/>
+            </a:schemeClr>
+          </a:lnRef>
+          <a:fillRef idx="1">
+            <a:schemeClr val="accent1"/>
+          </a:fillRef>
+          <a:effectRef idx="0">
+            <a:schemeClr val="accent1"/>
+          </a:effectRef>
+          <a:fontRef idx="minor">
+            <a:schemeClr val="lt1"/>
+          </a:fontRef>
+        </p:style>
         <p:txBody>
-          <a:bodyPr wrap="square" rtlCol="0">
-            <a:spAutoFit/>
-          </a:bodyPr>
+          <a:bodyPr rtlCol="0" anchor="ctr"/>
           <a:lstStyle/>
           <a:p>
-            <a:r>
-              <a:rPr lang="en-US" b="1" dirty="0" smtClean="0"/>
-              <a:t>&gt;&gt; cd </a:t>
-            </a:r>
-            <a:r>
-              <a:rPr lang="en-US" b="1" dirty="0" err="1" smtClean="0"/>
-              <a:t>fluocell</a:t>
-            </a:r>
-            <a:r>
-              <a:rPr lang="en-US" b="1" dirty="0" smtClean="0"/>
-              <a:t>-current/app/model/</a:t>
-            </a:r>
-          </a:p>
-          <a:p>
-            <a:r>
-              <a:rPr lang="en-US" b="1" dirty="0" smtClean="0"/>
-              <a:t>&gt;&gt; </a:t>
-            </a:r>
-            <a:r>
-              <a:rPr lang="en-US" b="1" dirty="0" err="1" smtClean="0"/>
-              <a:t>test_pm_model</a:t>
-            </a:r>
-            <a:r>
-              <a:rPr lang="en-US" b="1" dirty="0" smtClean="0"/>
-              <a:t>(</a:t>
-            </a:r>
-            <a:r>
-              <a:rPr lang="en-US" b="1" dirty="0" smtClean="0"/>
-              <a:t>'model4');</a:t>
-            </a:r>
-            <a:endParaRPr lang="en-US" b="1" dirty="0"/>
+            <a:pPr algn="ctr"/>
+            <a:endParaRPr lang="en-US"/>
           </a:p>
         </p:txBody>
       </p:sp>
-      <p:pic>
-        <p:nvPicPr>
-          <p:cNvPr id="5" name="Picture 4"/>
-          <p:cNvPicPr>
-            <a:picLocks noChangeAspect="1"/>
-          </p:cNvPicPr>
-          <p:nvPr/>
-        </p:nvPicPr>
-        <p:blipFill>
-          <a:blip r:embed="rId2"/>
-          <a:stretch>
-            <a:fillRect/>
-          </a:stretch>
-        </p:blipFill>
-        <p:spPr>
-          <a:xfrm>
-            <a:off x="219741" y="3230721"/>
-            <a:ext cx="5146294" cy="3292606"/>
-          </a:xfrm>
-          <a:prstGeom prst="rect">
-            <a:avLst/>
-          </a:prstGeom>
-        </p:spPr>
-      </p:pic>
-      <p:pic>
-        <p:nvPicPr>
-          <p:cNvPr id="6" name="Picture 5"/>
-          <p:cNvPicPr>
-            <a:picLocks noChangeAspect="1"/>
-          </p:cNvPicPr>
-          <p:nvPr/>
-        </p:nvPicPr>
-        <p:blipFill>
-          <a:blip r:embed="rId3"/>
-          <a:stretch>
-            <a:fillRect/>
-          </a:stretch>
-        </p:blipFill>
-        <p:spPr>
-          <a:xfrm>
-            <a:off x="5319641" y="3230721"/>
-            <a:ext cx="5387360" cy="3471303"/>
-          </a:xfrm>
-          <a:prstGeom prst="rect">
-            <a:avLst/>
-          </a:prstGeom>
-        </p:spPr>
-      </p:pic>
     </p:spTree>
     <p:extLst>
       <p:ext uri="{BB962C8B-B14F-4D97-AF65-F5344CB8AC3E}">
@@ -4145,11 +4130,7 @@
           <a:p>
             <a:r>
               <a:rPr lang="en-US" b="1" dirty="0" smtClean="0"/>
-              <a:t>y(:,i+1) = </a:t>
-            </a:r>
-            <a:r>
-              <a:rPr lang="en-US" b="1" dirty="0" smtClean="0"/>
-              <a:t>y(:,</a:t>
+              <a:t>y(:,i+1) = y(:,</a:t>
             </a:r>
             <a:r>
               <a:rPr lang="en-US" b="1" dirty="0" err="1" smtClean="0"/>
@@ -4173,11 +4154,7 @@
             </a:r>
             <a:r>
               <a:rPr lang="en-US" b="1" dirty="0" smtClean="0"/>
-              <a:t>*y</a:t>
-            </a:r>
-            <a:r>
-              <a:rPr lang="en-US" b="1" dirty="0" smtClean="0"/>
-              <a:t>(:,</a:t>
+              <a:t>*y(:,</a:t>
             </a:r>
             <a:r>
               <a:rPr lang="en-US" b="1" dirty="0" err="1" smtClean="0"/>
@@ -5748,7 +5725,7 @@
           <p:nvPr>
             <p:extLst>
               <p:ext uri="{D42A27DB-BD31-4B8C-83A1-F6EECF244321}">
-                <p14:modId xmlns:p14="http://schemas.microsoft.com/office/powerpoint/2010/main" val="2524578294"/>
+                <p14:modId xmlns:p14="http://schemas.microsoft.com/office/powerpoint/2010/main" val="515019031"/>
               </p:ext>
             </p:extLst>
           </p:nvPr>
@@ -5791,7 +5768,7 @@
                     <a:p>
                       <a:r>
                         <a:rPr lang="en-US" dirty="0" smtClean="0"/>
-                        <a:t>Value </a:t>
+                        <a:t>Value/unit </a:t>
                       </a:r>
                       <a:endParaRPr lang="en-US" dirty="0"/>
                     </a:p>
@@ -5875,11 +5852,7 @@
                       </a:r>
                       <a:r>
                         <a:rPr lang="en-US" baseline="0" dirty="0" smtClean="0"/>
-                        <a:t> al. </a:t>
-                      </a:r>
-                      <a:r>
-                        <a:rPr lang="en-US" baseline="0" dirty="0" smtClean="0"/>
-                        <a:t>2002 Molecular Biology …</a:t>
+                        <a:t> al. 2002 Molecular Biology …</a:t>
                       </a:r>
                       <a:endParaRPr lang="en-US" dirty="0"/>
                     </a:p>
@@ -5943,9 +5916,32 @@
                       </a:r>
                       <a:r>
                         <a:rPr lang="en-US" baseline="0" dirty="0" smtClean="0"/>
-                        <a:t> histones</a:t>
-                      </a:r>
-                      <a:endParaRPr lang="en-US" dirty="0"/>
+                        <a:t> </a:t>
+                      </a:r>
+                      <a:r>
+                        <a:rPr lang="en-US" baseline="0" dirty="0" smtClean="0"/>
+                        <a:t>histones </a:t>
+                      </a:r>
+                      <a:r>
+                        <a:rPr lang="en-US" baseline="0" dirty="0" smtClean="0">
+                          <a:sym typeface="Wingdings" panose="05000000000000000000" pitchFamily="2" charset="2"/>
+                        </a:rPr>
+                        <a:t> change to </a:t>
+                      </a:r>
+                      <a:r>
+                        <a:rPr lang="en-US" baseline="0" dirty="0" smtClean="0">
+                          <a:solidFill>
+                            <a:srgbClr val="FF0000"/>
+                          </a:solidFill>
+                          <a:sym typeface="Wingdings" panose="05000000000000000000" pitchFamily="2" charset="2"/>
+                        </a:rPr>
+                        <a:t>50%</a:t>
+                      </a:r>
+                      <a:endParaRPr lang="en-US" dirty="0">
+                        <a:solidFill>
+                          <a:srgbClr val="FF0000"/>
+                        </a:solidFill>
+                      </a:endParaRPr>
                     </a:p>
                   </a:txBody>
                   <a:tcPr/>
@@ -5992,7 +5988,23 @@
                       </a:r>
                       <a:r>
                         <a:rPr lang="en-US" dirty="0" smtClean="0"/>
-                        <a:t> -/- decrease 40%; TCP (inhibitor KDM) increases 30%</a:t>
+                        <a:t> -/- </a:t>
+                      </a:r>
+                      <a:r>
+                        <a:rPr lang="en-US" dirty="0" smtClean="0"/>
+                        <a:t>decreased </a:t>
+                      </a:r>
+                      <a:r>
+                        <a:rPr lang="en-US" dirty="0" smtClean="0"/>
+                        <a:t>40%; TCP (inhibitor KDM) </a:t>
+                      </a:r>
+                      <a:r>
+                        <a:rPr lang="en-US" dirty="0" smtClean="0"/>
+                        <a:t>increased </a:t>
+                      </a:r>
+                      <a:r>
+                        <a:rPr lang="en-US" dirty="0" smtClean="0"/>
+                        <a:t>30%</a:t>
                       </a:r>
                       <a:r>
                         <a:rPr lang="en-US" dirty="0" smtClean="0">
@@ -6010,8 +6022,17 @@
                         <a:rPr lang="en-US" dirty="0" smtClean="0">
                           <a:sym typeface="Wingdings" panose="05000000000000000000" pitchFamily="2" charset="2"/>
                         </a:rPr>
-                        <a:t> 4/7 = 0.57 = 57% </a:t>
-                      </a:r>
+                        <a:t> 4/7 </a:t>
+                      </a:r>
+                      <a:r>
+                        <a:rPr lang="en-US" dirty="0" smtClean="0">
+                          <a:sym typeface="Wingdings" panose="05000000000000000000" pitchFamily="2" charset="2"/>
+                        </a:rPr>
+                        <a:t>is about 50% </a:t>
+                      </a:r>
+                      <a:endParaRPr lang="en-US" dirty="0" smtClean="0">
+                        <a:sym typeface="Wingdings" panose="05000000000000000000" pitchFamily="2" charset="2"/>
+                      </a:endParaRPr>
                     </a:p>
                   </a:txBody>
                   <a:tcPr/>
@@ -6052,7 +6073,7 @@
                       <a:r>
                         <a:rPr lang="en-US" dirty="0" smtClean="0">
                           <a:solidFill>
-                            <a:srgbClr val="FF0000"/>
+                            <a:schemeClr val="tx1"/>
                           </a:solidFill>
                           <a:sym typeface="Wingdings" panose="05000000000000000000" pitchFamily="2" charset="2"/>
                         </a:rPr>
@@ -6060,7 +6081,7 @@
                       </a:r>
                       <a:endParaRPr lang="en-US" dirty="0">
                         <a:solidFill>
-                          <a:srgbClr val="FF0000"/>
+                          <a:schemeClr val="tx1"/>
                         </a:solidFill>
                       </a:endParaRPr>
                     </a:p>
@@ -6094,19 +6115,7 @@
                           <a:ea typeface="+mn-ea"/>
                           <a:cs typeface="+mn-cs"/>
                         </a:rPr>
-                        <a:t> MD 2011 Dev </a:t>
-                      </a:r>
-                      <a:r>
-                        <a:rPr lang="en-US" sz="1800" kern="1200" dirty="0" smtClean="0">
-                          <a:solidFill>
-                            <a:schemeClr val="dk1"/>
-                          </a:solidFill>
-                          <a:effectLst/>
-                          <a:latin typeface="+mn-lt"/>
-                          <a:ea typeface="+mn-ea"/>
-                          <a:cs typeface="+mn-cs"/>
-                        </a:rPr>
-                        <a:t>Cell</a:t>
+                        <a:t> MD 2011 Dev Cell</a:t>
                       </a:r>
                     </a:p>
                     <a:p>
@@ -6143,7 +6152,7 @@
                       <a:r>
                         <a:rPr lang="en-US" dirty="0" smtClean="0">
                           <a:solidFill>
-                            <a:srgbClr val="FF0000"/>
+                            <a:schemeClr val="tx1"/>
                           </a:solidFill>
                         </a:rPr>
                         <a:t>Estimated</a:t>
@@ -6151,7 +6160,7 @@
                       <a:r>
                         <a:rPr lang="en-US" baseline="0" dirty="0" smtClean="0">
                           <a:solidFill>
-                            <a:srgbClr val="FF0000"/>
+                            <a:schemeClr val="tx1"/>
                           </a:solidFill>
                         </a:rPr>
                         <a:t> based on </a:t>
@@ -6159,7 +6168,7 @@
                       <a:r>
                         <a:rPr lang="en-US" baseline="0" dirty="0" err="1" smtClean="0">
                           <a:solidFill>
-                            <a:srgbClr val="FF0000"/>
+                            <a:schemeClr val="tx1"/>
                           </a:solidFill>
                         </a:rPr>
                         <a:t>RNAseq</a:t>
@@ -6167,7 +6176,7 @@
                       <a:r>
                         <a:rPr lang="en-US" baseline="0" dirty="0" smtClean="0">
                           <a:solidFill>
-                            <a:srgbClr val="FF0000"/>
+                            <a:schemeClr val="tx1"/>
                           </a:solidFill>
                         </a:rPr>
                         <a:t> copy number from HeLa cells. </a:t>
@@ -6175,15 +6184,31 @@
                       <a:r>
                         <a:rPr lang="en-US" dirty="0" smtClean="0">
                           <a:solidFill>
-                            <a:srgbClr val="FF0000"/>
+                            <a:schemeClr val="tx1"/>
                           </a:solidFill>
                         </a:rPr>
-                        <a:t>KDM4C (TPM) relative to H3F3A and</a:t>
+                        <a:t>KDM4C </a:t>
+                      </a:r>
+                      <a:r>
+                        <a:rPr lang="en-US" dirty="0" smtClean="0">
+                          <a:solidFill>
+                            <a:schemeClr val="tx1"/>
+                          </a:solidFill>
+                        </a:rPr>
+                        <a:t>relative </a:t>
+                      </a:r>
+                      <a:r>
+                        <a:rPr lang="en-US" dirty="0" smtClean="0">
+                          <a:solidFill>
+                            <a:schemeClr val="tx1"/>
+                          </a:solidFill>
+                        </a:rPr>
+                        <a:t>to H3F3A and</a:t>
                       </a:r>
                       <a:r>
                         <a:rPr lang="en-US" baseline="0" dirty="0" smtClean="0">
                           <a:solidFill>
-                            <a:srgbClr val="FF0000"/>
+                            <a:schemeClr val="tx1"/>
                           </a:solidFill>
                         </a:rPr>
                         <a:t> </a:t>
@@ -6191,14 +6216,14 @@
                       <a:r>
                         <a:rPr lang="en-US" dirty="0" smtClean="0">
                           <a:solidFill>
-                            <a:srgbClr val="FF0000"/>
+                            <a:schemeClr val="tx1"/>
                           </a:solidFill>
                         </a:rPr>
                         <a:t>H3F3B, KDM4D was negligible.</a:t>
                       </a:r>
                       <a:endParaRPr lang="en-US" dirty="0">
                         <a:solidFill>
-                          <a:srgbClr val="FF0000"/>
+                          <a:schemeClr val="tx1"/>
                         </a:solidFill>
                       </a:endParaRPr>
                     </a:p>
@@ -6241,57 +6266,11 @@
                       <a:r>
                         <a:rPr lang="en-US" dirty="0" smtClean="0">
                           <a:solidFill>
-                            <a:srgbClr val="FF0000"/>
+                            <a:schemeClr val="tx1"/>
                           </a:solidFill>
                           <a:sym typeface="Wingdings" panose="05000000000000000000" pitchFamily="2" charset="2"/>
                         </a:rPr>
                         <a:t>600K</a:t>
-                      </a:r>
-                      <a:endParaRPr lang="en-US" dirty="0">
-                        <a:solidFill>
-                          <a:srgbClr val="FF0000"/>
-                        </a:solidFill>
-                      </a:endParaRPr>
-                    </a:p>
-                  </a:txBody>
-                  <a:tcPr/>
-                </a:tc>
-                <a:tc>
-                  <a:txBody>
-                    <a:bodyPr/>
-                    <a:lstStyle/>
-                    <a:p>
-                      <a:r>
-                        <a:rPr lang="en-US" dirty="0" err="1" smtClean="0">
-                          <a:solidFill>
-                            <a:schemeClr val="tx1"/>
-                          </a:solidFill>
-                        </a:rPr>
-                        <a:t>Aagaard</a:t>
-                      </a:r>
-                      <a:r>
-                        <a:rPr lang="en-US" baseline="0" dirty="0" smtClean="0">
-                          <a:solidFill>
-                            <a:schemeClr val="tx1"/>
-                          </a:solidFill>
-                        </a:rPr>
-                        <a:t> L </a:t>
-                      </a:r>
-                      <a:r>
-                        <a:rPr lang="en-US" baseline="0" dirty="0" err="1" smtClean="0">
-                          <a:solidFill>
-                            <a:schemeClr val="tx1"/>
-                          </a:solidFill>
-                        </a:rPr>
-                        <a:t>wt</a:t>
-                      </a:r>
-                      <a:r>
-                        <a:rPr lang="en-US" baseline="0" dirty="0" smtClean="0">
-                          <a:solidFill>
-                            <a:schemeClr val="tx1"/>
-                          </a:solidFill>
-                        </a:rPr>
-                        <a:t> al. 2000 JCS</a:t>
                       </a:r>
                       <a:endParaRPr lang="en-US" dirty="0">
                         <a:solidFill>
@@ -6308,6 +6287,36 @@
                     <a:lstStyle/>
                     <a:p>
                       <a:r>
+                        <a:rPr lang="en-US" dirty="0" err="1" smtClean="0">
+                          <a:solidFill>
+                            <a:schemeClr val="tx1"/>
+                          </a:solidFill>
+                        </a:rPr>
+                        <a:t>Aagaard</a:t>
+                      </a:r>
+                      <a:r>
+                        <a:rPr lang="en-US" baseline="0" dirty="0" smtClean="0">
+                          <a:solidFill>
+                            <a:schemeClr val="tx1"/>
+                          </a:solidFill>
+                        </a:rPr>
+                        <a:t> L et al. 2000 JCS</a:t>
+                      </a:r>
+                      <a:endParaRPr lang="en-US" dirty="0">
+                        <a:solidFill>
+                          <a:schemeClr val="tx1"/>
+                        </a:solidFill>
+                      </a:endParaRPr>
+                    </a:p>
+                  </a:txBody>
+                  <a:tcPr/>
+                </a:tc>
+                <a:tc>
+                  <a:txBody>
+                    <a:bodyPr/>
+                    <a:lstStyle/>
+                    <a:p>
+                      <a:r>
                         <a:rPr lang="en-US" dirty="0" smtClean="0"/>
                         <a:t> 50% of </a:t>
                       </a:r>
@@ -6376,7 +6385,7 @@
                       <a:r>
                         <a:rPr lang="en-US" dirty="0" smtClean="0">
                           <a:solidFill>
-                            <a:srgbClr val="FF0000"/>
+                            <a:schemeClr val="tx1"/>
                           </a:solidFill>
                           <a:sym typeface="Wingdings" panose="05000000000000000000" pitchFamily="2" charset="2"/>
                         </a:rPr>
@@ -6384,7 +6393,7 @@
                       </a:r>
                       <a:endParaRPr lang="en-US" dirty="0">
                         <a:solidFill>
-                          <a:srgbClr val="FF0000"/>
+                          <a:schemeClr val="tx1"/>
                         </a:solidFill>
                       </a:endParaRPr>
                     </a:p>
@@ -6411,20 +6420,32 @@
                     <a:lstStyle/>
                     <a:p>
                       <a:r>
+                        <a:rPr lang="en-US" dirty="0" smtClean="0"/>
+                        <a:t>The </a:t>
+                      </a:r>
+                      <a:r>
                         <a:rPr lang="en-US" dirty="0" err="1" smtClean="0"/>
-                        <a:t>kinase:KDM</a:t>
+                        <a:t>RNAseq</a:t>
                       </a:r>
                       <a:r>
                         <a:rPr lang="en-US" dirty="0" smtClean="0"/>
-                        <a:t> </a:t>
+                        <a:t> copy data shows</a:t>
+                      </a:r>
+                      <a:r>
+                        <a:rPr lang="en-US" baseline="0" dirty="0" smtClean="0"/>
+                        <a:t> that the ratio a</a:t>
                       </a:r>
                       <a:r>
                         <a:rPr lang="en-US" dirty="0" smtClean="0"/>
-                        <a:t>= </a:t>
+                        <a:t>urora kinase B:KDM4C is</a:t>
+                      </a:r>
+                      <a:r>
+                        <a:rPr lang="en-US" baseline="0" dirty="0" smtClean="0"/>
+                        <a:t> approximately </a:t>
                       </a:r>
                       <a:r>
                         <a:rPr lang="en-US" dirty="0" smtClean="0"/>
-                        <a:t>5.9:1</a:t>
+                        <a:t>5.9:1. </a:t>
                       </a:r>
                       <a:endParaRPr lang="en-US" dirty="0"/>
                     </a:p>
@@ -6467,7 +6488,7 @@
                       <a:r>
                         <a:rPr lang="en-US" dirty="0" smtClean="0">
                           <a:solidFill>
-                            <a:srgbClr val="FF0000"/>
+                            <a:schemeClr val="tx1"/>
                           </a:solidFill>
                           <a:sym typeface="Wingdings" panose="05000000000000000000" pitchFamily="2" charset="2"/>
                         </a:rPr>
@@ -6475,7 +6496,7 @@
                       </a:r>
                       <a:endParaRPr lang="en-US" dirty="0">
                         <a:solidFill>
-                          <a:srgbClr val="FF0000"/>
+                          <a:schemeClr val="tx1"/>
                         </a:solidFill>
                       </a:endParaRPr>
                     </a:p>
@@ -6490,7 +6511,7 @@
                       <a:r>
                         <a:rPr lang="en-US" dirty="0" smtClean="0">
                           <a:solidFill>
-                            <a:srgbClr val="FF0000"/>
+                            <a:schemeClr val="tx1"/>
                           </a:solidFill>
                         </a:rPr>
                         <a:t>Dominguez</a:t>
@@ -6498,7 +6519,7 @@
                       <a:r>
                         <a:rPr lang="en-US" baseline="0" dirty="0" smtClean="0">
                           <a:solidFill>
-                            <a:srgbClr val="FF0000"/>
+                            <a:schemeClr val="tx1"/>
                           </a:solidFill>
                         </a:rPr>
                         <a:t> D Wang Z 2016 </a:t>
@@ -6506,14 +6527,14 @@
                       <a:r>
                         <a:rPr lang="en-US" baseline="0" dirty="0" err="1" smtClean="0">
                           <a:solidFill>
-                            <a:srgbClr val="FF0000"/>
+                            <a:schemeClr val="tx1"/>
                           </a:solidFill>
                         </a:rPr>
                         <a:t>elife</a:t>
                       </a:r>
                       <a:endParaRPr lang="en-US" dirty="0">
                         <a:solidFill>
-                          <a:srgbClr val="FF0000"/>
+                          <a:schemeClr val="tx1"/>
                         </a:solidFill>
                       </a:endParaRPr>
                     </a:p>
@@ -6527,11 +6548,7 @@
                     <a:p>
                       <a:r>
                         <a:rPr lang="en-US" dirty="0" smtClean="0"/>
-                        <a:t>15% </a:t>
-                      </a:r>
-                      <a:r>
-                        <a:rPr lang="en-US" dirty="0" smtClean="0"/>
-                        <a:t>of </a:t>
+                        <a:t>15% of </a:t>
                       </a:r>
                       <a:r>
                         <a:rPr lang="en-US" dirty="0" err="1" smtClean="0"/>
@@ -6611,11 +6628,7 @@
                     <a:p>
                       <a:r>
                         <a:rPr lang="en-US" dirty="0" smtClean="0"/>
-                        <a:t>[</a:t>
-                      </a:r>
-                      <a:r>
-                        <a:rPr lang="en-US" dirty="0" smtClean="0"/>
-                        <a:t>CDK1</a:t>
+                        <a:t>[CDK1</a:t>
                       </a:r>
                       <a:r>
                         <a:rPr lang="en-US" baseline="0" dirty="0" smtClean="0"/>
@@ -6710,14 +6723,14 @@
           <p:nvPr>
             <p:extLst>
               <p:ext uri="{D42A27DB-BD31-4B8C-83A1-F6EECF244321}">
-                <p14:modId xmlns:p14="http://schemas.microsoft.com/office/powerpoint/2010/main" val="1984075350"/>
+                <p14:modId xmlns:p14="http://schemas.microsoft.com/office/powerpoint/2010/main" val="1687260168"/>
               </p:ext>
             </p:extLst>
           </p:nvPr>
         </p:nvGraphicFramePr>
         <p:xfrm>
           <a:off x="882468" y="702249"/>
-          <a:ext cx="10429447" cy="4885300"/>
+          <a:ext cx="10429447" cy="4519540"/>
         </p:xfrm>
         <a:graphic>
           <a:graphicData uri="http://schemas.openxmlformats.org/drawingml/2006/table">
@@ -6727,8 +6740,8 @@
               </a:tblPr>
               <a:tblGrid>
                 <a:gridCol w="3622920"/>
-                <a:gridCol w="1065791"/>
-                <a:gridCol w="2494919"/>
+                <a:gridCol w="1279462"/>
+                <a:gridCol w="2281248"/>
                 <a:gridCol w="3245817"/>
               </a:tblGrid>
               <a:tr h="538148">
@@ -6753,7 +6766,7 @@
                     <a:p>
                       <a:r>
                         <a:rPr lang="en-US" dirty="0" smtClean="0"/>
-                        <a:t>Value </a:t>
+                        <a:t>Value/unit</a:t>
                       </a:r>
                       <a:endParaRPr lang="en-US" dirty="0"/>
                     </a:p>
@@ -7125,18 +7138,6 @@
                     <a:bodyPr/>
                     <a:lstStyle/>
                     <a:p>
-                      <a:r>
-                        <a:rPr lang="en-US" sz="1800" kern="1200" dirty="0" smtClean="0">
-                          <a:solidFill>
-                            <a:srgbClr val="FF0000"/>
-                          </a:solidFill>
-                          <a:effectLst/>
-                          <a:latin typeface="+mn-lt"/>
-                          <a:ea typeface="+mn-ea"/>
-                          <a:cs typeface="+mn-cs"/>
-                        </a:rPr>
-                        <a:t>???</a:t>
-                      </a:r>
                       <a:endParaRPr lang="en-US" dirty="0">
                         <a:solidFill>
                           <a:srgbClr val="FF0000"/>
@@ -7151,6 +7152,10 @@
                     <a:bodyPr/>
                     <a:lstStyle/>
                     <a:p>
+                      <a:r>
+                        <a:rPr lang="en-US" dirty="0" smtClean="0"/>
+                        <a:t>Based on kinetics in Fig. 2</a:t>
+                      </a:r>
                       <a:endParaRPr lang="en-US" dirty="0"/>
                     </a:p>
                   </a:txBody>
@@ -7184,76 +7189,6 @@
                       <a:r>
                         <a:rPr lang="en-US" dirty="0" smtClean="0"/>
                         <a:t>0.03</a:t>
-                      </a:r>
-                      <a:endParaRPr lang="en-US" dirty="0"/>
-                    </a:p>
-                  </a:txBody>
-                  <a:tcPr/>
-                </a:tc>
-                <a:tc>
-                  <a:txBody>
-                    <a:bodyPr/>
-                    <a:lstStyle/>
-                    <a:p>
-                      <a:r>
-                        <a:rPr lang="en-US" dirty="0" smtClean="0">
-                          <a:solidFill>
-                            <a:srgbClr val="FF0000"/>
-                          </a:solidFill>
-                        </a:rPr>
-                        <a:t>???</a:t>
-                      </a:r>
-                      <a:endParaRPr lang="en-US" dirty="0">
-                        <a:solidFill>
-                          <a:srgbClr val="FF0000"/>
-                        </a:solidFill>
-                      </a:endParaRPr>
-                    </a:p>
-                  </a:txBody>
-                  <a:tcPr/>
-                </a:tc>
-                <a:tc>
-                  <a:txBody>
-                    <a:bodyPr/>
-                    <a:lstStyle/>
-                    <a:p>
-                      <a:endParaRPr lang="en-US"/>
-                    </a:p>
-                  </a:txBody>
-                  <a:tcPr/>
-                </a:tc>
-              </a:tr>
-              <a:tr h="182880">
-                <a:tc>
-                  <a:txBody>
-                    <a:bodyPr/>
-                    <a:lstStyle/>
-                    <a:p>
-                      <a:r>
-                        <a:rPr lang="en-US" dirty="0" smtClean="0"/>
-                        <a:t>Strength</a:t>
-                      </a:r>
-                      <a:r>
-                        <a:rPr lang="en-US" baseline="0" dirty="0" smtClean="0"/>
-                        <a:t> of kinase</a:t>
-                      </a:r>
-                      <a:endParaRPr lang="en-US" dirty="0"/>
-                    </a:p>
-                  </a:txBody>
-                  <a:tcPr/>
-                </a:tc>
-                <a:tc>
-                  <a:txBody>
-                    <a:bodyPr/>
-                    <a:lstStyle/>
-                    <a:p>
-                      <a:r>
-                        <a:rPr lang="en-US" dirty="0" smtClean="0"/>
-                        <a:t>1</a:t>
-                      </a:r>
-                      <a:r>
-                        <a:rPr lang="en-US" baseline="0" dirty="0" smtClean="0"/>
-                        <a:t> or less</a:t>
                       </a:r>
                       <a:endParaRPr lang="en-US" dirty="0"/>
                     </a:p>
@@ -7281,12 +7216,17 @@
                     <a:p>
                       <a:r>
                         <a:rPr lang="en-US" dirty="0" smtClean="0"/>
-                        <a:t>1</a:t>
+                        <a:t>Based</a:t>
                       </a:r>
                       <a:r>
                         <a:rPr lang="en-US" baseline="0" dirty="0" smtClean="0"/>
-                        <a:t> or 1- strength of inhibitor</a:t>
-                      </a:r>
+                        <a:t> on kinetics in </a:t>
+                      </a:r>
+                      <a:r>
+                        <a:rPr lang="en-US" dirty="0" smtClean="0"/>
+                        <a:t>Fig. 2</a:t>
+                      </a:r>
+                      <a:endParaRPr lang="en-US" dirty="0"/>
                     </a:p>
                   </a:txBody>
                   <a:tcPr/>
@@ -7454,901 +7394,859 @@
           <a:chExt cx="0" cy="0"/>
         </a:xfrm>
       </p:grpSpPr>
-      <p:sp>
-        <p:nvSpPr>
-          <p:cNvPr id="2" name="TextBox 1"/>
-          <p:cNvSpPr txBox="1"/>
-          <p:nvPr/>
-        </p:nvSpPr>
-        <p:spPr>
-          <a:xfrm>
-            <a:off x="567069" y="411126"/>
-            <a:ext cx="10341935" cy="923330"/>
-          </a:xfrm>
-          <a:prstGeom prst="rect">
-            <a:avLst/>
-          </a:prstGeom>
-          <a:noFill/>
-        </p:spPr>
-        <p:txBody>
-          <a:bodyPr wrap="square" rtlCol="0">
-            <a:spAutoFit/>
-          </a:bodyPr>
-          <a:lstStyle/>
-          <a:p>
-            <a:r>
-              <a:rPr lang="en-US" b="1" dirty="0" smtClean="0"/>
-              <a:t>References:</a:t>
-            </a:r>
-            <a:endParaRPr lang="en-US" dirty="0"/>
-          </a:p>
-          <a:p>
-            <a:pPr marL="342900" indent="-342900">
-              <a:buFont typeface="+mj-lt"/>
-              <a:buAutoNum type="arabicPeriod"/>
-            </a:pPr>
-            <a:r>
-              <a:rPr lang="en-US" dirty="0" err="1" smtClean="0"/>
-              <a:t>Aagaard</a:t>
-            </a:r>
-            <a:r>
-              <a:rPr lang="en-US" dirty="0" smtClean="0"/>
-              <a:t> L </a:t>
-            </a:r>
-            <a:r>
-              <a:rPr lang="en-US" dirty="0" err="1" smtClean="0"/>
-              <a:t>Jenuwein</a:t>
-            </a:r>
-            <a:r>
-              <a:rPr lang="en-US" dirty="0" smtClean="0"/>
-              <a:t> T 2000 JCS, Mitotic phosphorylation of SUV39H1, a novel component of active centromeres, coincides with transient accumulation at mammalian centromeres. </a:t>
-            </a:r>
-            <a:endParaRPr lang="en-US" dirty="0"/>
-          </a:p>
-        </p:txBody>
-      </p:sp>
-    </p:spTree>
-    <p:extLst>
-      <p:ext uri="{BB962C8B-B14F-4D97-AF65-F5344CB8AC3E}">
-        <p14:creationId xmlns:p14="http://schemas.microsoft.com/office/powerpoint/2010/main" val="145726019"/>
-      </p:ext>
-    </p:extLst>
-  </p:cSld>
-  <p:clrMapOvr>
-    <a:masterClrMapping/>
-  </p:clrMapOvr>
-</p:sld>
-</file>
-
-<file path=ppt/slides/slide8.xml><?xml version="1.0" encoding="utf-8"?>
-<p:sld xmlns:a="http://schemas.openxmlformats.org/drawingml/2006/main" xmlns:r="http://schemas.openxmlformats.org/officeDocument/2006/relationships" xmlns:p="http://schemas.openxmlformats.org/presentationml/2006/main">
-  <p:cSld>
-    <p:spTree>
-      <p:nvGrpSpPr>
-        <p:cNvPr id="1" name=""/>
-        <p:cNvGrpSpPr/>
-        <p:nvPr/>
-      </p:nvGrpSpPr>
-      <p:grpSpPr>
-        <a:xfrm>
-          <a:off x="0" y="0"/>
-          <a:ext cx="0" cy="0"/>
-          <a:chOff x="0" y="0"/>
-          <a:chExt cx="0" cy="0"/>
-        </a:xfrm>
-      </p:grpSpPr>
-      <p:sp>
-        <p:nvSpPr>
-          <p:cNvPr id="47" name="TextBox 46"/>
-          <p:cNvSpPr txBox="1"/>
-          <p:nvPr/>
-        </p:nvSpPr>
-        <p:spPr>
-          <a:xfrm>
-            <a:off x="286992" y="149971"/>
-            <a:ext cx="6936822" cy="1200329"/>
-          </a:xfrm>
-          <a:prstGeom prst="rect">
-            <a:avLst/>
-          </a:prstGeom>
-          <a:noFill/>
-        </p:spPr>
-        <p:txBody>
-          <a:bodyPr wrap="square" rtlCol="0">
-            <a:spAutoFit/>
-          </a:bodyPr>
-          <a:lstStyle/>
-          <a:p>
-            <a:r>
-              <a:rPr lang="en-US" sz="2400" b="1" dirty="0" smtClean="0"/>
-              <a:t>Model3: S10P recruiting KDMs </a:t>
-            </a:r>
-            <a:r>
-              <a:rPr lang="en-US" sz="2400" b="1" dirty="0" smtClean="0"/>
-              <a:t>is crucial for fast demethylation at mitotic entrance, while S10P </a:t>
-            </a:r>
-            <a:r>
-              <a:rPr lang="en-US" sz="2400" b="1" dirty="0" smtClean="0"/>
-              <a:t>repelling </a:t>
-            </a:r>
-            <a:r>
-              <a:rPr lang="en-US" sz="2400" b="1" dirty="0" smtClean="0"/>
-              <a:t>MTs </a:t>
-            </a:r>
-            <a:r>
-              <a:rPr lang="en-US" sz="2400" b="1" dirty="0" smtClean="0"/>
-              <a:t>plays </a:t>
-            </a:r>
-            <a:r>
-              <a:rPr lang="en-US" sz="2400" b="1" dirty="0" smtClean="0"/>
-              <a:t>an assisting role</a:t>
-            </a:r>
-            <a:endParaRPr lang="en-US" sz="2400" b="1" dirty="0"/>
-          </a:p>
-        </p:txBody>
-      </p:sp>
       <p:grpSp>
         <p:nvGrpSpPr>
-          <p:cNvPr id="50" name="Group 49"/>
+          <p:cNvPr id="3" name="Group 2"/>
           <p:cNvGrpSpPr/>
           <p:nvPr/>
         </p:nvGrpSpPr>
         <p:grpSpPr>
           <a:xfrm>
-            <a:off x="7840392" y="82377"/>
-            <a:ext cx="4551528" cy="2621908"/>
-            <a:chOff x="797041" y="156518"/>
-            <a:chExt cx="4551528" cy="2621908"/>
+            <a:off x="7840392" y="544042"/>
+            <a:ext cx="4225660" cy="2344072"/>
+            <a:chOff x="7840392" y="544042"/>
+            <a:chExt cx="4225660" cy="2344072"/>
           </a:xfrm>
         </p:grpSpPr>
+        <p:sp>
+          <p:nvSpPr>
+            <p:cNvPr id="76" name="TextBox 75"/>
+            <p:cNvSpPr txBox="1"/>
+            <p:nvPr/>
+          </p:nvSpPr>
+          <p:spPr>
+            <a:xfrm>
+              <a:off x="9549181" y="544042"/>
+              <a:ext cx="527221" cy="584775"/>
+            </a:xfrm>
+            <a:prstGeom prst="rect">
+              <a:avLst/>
+            </a:prstGeom>
+            <a:noFill/>
+          </p:spPr>
+          <p:txBody>
+            <a:bodyPr wrap="square" rtlCol="0">
+              <a:spAutoFit/>
+            </a:bodyPr>
+            <a:lstStyle/>
+            <a:p>
+              <a:r>
+                <a:rPr lang="en-US" sz="3200" b="1" dirty="0" smtClean="0">
+                  <a:solidFill>
+                    <a:schemeClr val="accent2">
+                      <a:lumMod val="75000"/>
+                    </a:schemeClr>
+                  </a:solidFill>
+                </a:rPr>
+                <a:t>x</a:t>
+              </a:r>
+              <a:endParaRPr lang="en-US" sz="3200" b="1" dirty="0">
+                <a:solidFill>
+                  <a:schemeClr val="accent2">
+                    <a:lumMod val="75000"/>
+                  </a:schemeClr>
+                </a:solidFill>
+              </a:endParaRPr>
+            </a:p>
+          </p:txBody>
+        </p:sp>
+        <p:sp>
+          <p:nvSpPr>
+            <p:cNvPr id="77" name="TextBox 76"/>
+            <p:cNvSpPr txBox="1"/>
+            <p:nvPr/>
+          </p:nvSpPr>
+          <p:spPr>
+            <a:xfrm>
+              <a:off x="9853730" y="1727224"/>
+              <a:ext cx="527221" cy="584775"/>
+            </a:xfrm>
+            <a:prstGeom prst="rect">
+              <a:avLst/>
+            </a:prstGeom>
+            <a:noFill/>
+          </p:spPr>
+          <p:txBody>
+            <a:bodyPr wrap="square" rtlCol="0">
+              <a:spAutoFit/>
+            </a:bodyPr>
+            <a:lstStyle/>
+            <a:p>
+              <a:r>
+                <a:rPr lang="en-US" sz="3200" b="1" dirty="0" smtClean="0">
+                  <a:solidFill>
+                    <a:schemeClr val="accent4"/>
+                  </a:solidFill>
+                </a:rPr>
+                <a:t>x</a:t>
+              </a:r>
+              <a:endParaRPr lang="en-US" sz="3200" b="1" dirty="0">
+                <a:solidFill>
+                  <a:schemeClr val="accent4"/>
+                </a:solidFill>
+              </a:endParaRPr>
+            </a:p>
+          </p:txBody>
+        </p:sp>
         <p:grpSp>
           <p:nvGrpSpPr>
-            <p:cNvPr id="51" name="Group 50"/>
+            <p:cNvPr id="33" name="Group 32"/>
             <p:cNvGrpSpPr/>
             <p:nvPr/>
           </p:nvGrpSpPr>
           <p:grpSpPr>
             <a:xfrm>
-              <a:off x="797041" y="1172540"/>
-              <a:ext cx="818865" cy="655092"/>
-              <a:chOff x="2586251" y="1153236"/>
-              <a:chExt cx="818865" cy="655092"/>
+              <a:off x="7840392" y="1250823"/>
+              <a:ext cx="4225660" cy="1637291"/>
+              <a:chOff x="797041" y="1141135"/>
+              <a:chExt cx="4225660" cy="1637291"/>
             </a:xfrm>
           </p:grpSpPr>
-          <p:sp>
-            <p:nvSpPr>
-              <p:cNvPr id="74" name="Oval 73"/>
-              <p:cNvSpPr/>
+          <p:grpSp>
+            <p:nvGrpSpPr>
+              <p:cNvPr id="34" name="Group 33"/>
+              <p:cNvGrpSpPr/>
               <p:nvPr/>
-            </p:nvSpPr>
+            </p:nvGrpSpPr>
+            <p:grpSpPr>
+              <a:xfrm>
+                <a:off x="797041" y="1172540"/>
+                <a:ext cx="818865" cy="655092"/>
+                <a:chOff x="2586251" y="1153236"/>
+                <a:chExt cx="818865" cy="655092"/>
+              </a:xfrm>
+            </p:grpSpPr>
+            <p:sp>
+              <p:nvSpPr>
+                <p:cNvPr id="85" name="Oval 84"/>
+                <p:cNvSpPr/>
+                <p:nvPr/>
+              </p:nvSpPr>
+              <p:spPr>
+                <a:xfrm>
+                  <a:off x="2586251" y="1153236"/>
+                  <a:ext cx="818865" cy="655092"/>
+                </a:xfrm>
+                <a:prstGeom prst="ellipse">
+                  <a:avLst/>
+                </a:prstGeom>
+                <a:noFill/>
+                <a:ln w="19050"/>
+              </p:spPr>
+              <p:style>
+                <a:lnRef idx="2">
+                  <a:schemeClr val="accent1">
+                    <a:shade val="50000"/>
+                  </a:schemeClr>
+                </a:lnRef>
+                <a:fillRef idx="1">
+                  <a:schemeClr val="accent1"/>
+                </a:fillRef>
+                <a:effectRef idx="0">
+                  <a:schemeClr val="accent1"/>
+                </a:effectRef>
+                <a:fontRef idx="minor">
+                  <a:schemeClr val="lt1"/>
+                </a:fontRef>
+              </p:style>
+              <p:txBody>
+                <a:bodyPr rtlCol="0" anchor="ctr"/>
+                <a:lstStyle/>
+                <a:p>
+                  <a:pPr algn="ctr"/>
+                  <a:endParaRPr lang="en-US" b="1"/>
+                </a:p>
+              </p:txBody>
+            </p:sp>
+            <p:sp>
+              <p:nvSpPr>
+                <p:cNvPr id="86" name="TextBox 85"/>
+                <p:cNvSpPr txBox="1"/>
+                <p:nvPr/>
+              </p:nvSpPr>
+              <p:spPr>
+                <a:xfrm>
+                  <a:off x="2715904" y="1289713"/>
+                  <a:ext cx="559559" cy="369332"/>
+                </a:xfrm>
+                <a:prstGeom prst="rect">
+                  <a:avLst/>
+                </a:prstGeom>
+                <a:noFill/>
+              </p:spPr>
+              <p:txBody>
+                <a:bodyPr wrap="square" rtlCol="0">
+                  <a:spAutoFit/>
+                </a:bodyPr>
+                <a:lstStyle/>
+                <a:p>
+                  <a:pPr algn="ctr"/>
+                  <a:r>
+                    <a:rPr lang="en-US" b="1" dirty="0" smtClean="0"/>
+                    <a:t>MT</a:t>
+                  </a:r>
+                  <a:endParaRPr lang="en-US" b="1" dirty="0"/>
+                </a:p>
+              </p:txBody>
+            </p:sp>
+          </p:grpSp>
+          <p:grpSp>
+            <p:nvGrpSpPr>
+              <p:cNvPr id="35" name="Group 34"/>
+              <p:cNvGrpSpPr/>
+              <p:nvPr/>
+            </p:nvGrpSpPr>
+            <p:grpSpPr>
+              <a:xfrm>
+                <a:off x="1486253" y="2123334"/>
+                <a:ext cx="818865" cy="655092"/>
+                <a:chOff x="3275463" y="2104030"/>
+                <a:chExt cx="818865" cy="655092"/>
+              </a:xfrm>
+            </p:grpSpPr>
+            <p:sp>
+              <p:nvSpPr>
+                <p:cNvPr id="83" name="Oval 82"/>
+                <p:cNvSpPr/>
+                <p:nvPr/>
+              </p:nvSpPr>
+              <p:spPr>
+                <a:xfrm>
+                  <a:off x="3275463" y="2104030"/>
+                  <a:ext cx="818865" cy="655092"/>
+                </a:xfrm>
+                <a:prstGeom prst="ellipse">
+                  <a:avLst/>
+                </a:prstGeom>
+                <a:noFill/>
+                <a:ln w="19050"/>
+              </p:spPr>
+              <p:style>
+                <a:lnRef idx="2">
+                  <a:schemeClr val="accent1">
+                    <a:shade val="50000"/>
+                  </a:schemeClr>
+                </a:lnRef>
+                <a:fillRef idx="1">
+                  <a:schemeClr val="accent1"/>
+                </a:fillRef>
+                <a:effectRef idx="0">
+                  <a:schemeClr val="accent1"/>
+                </a:effectRef>
+                <a:fontRef idx="minor">
+                  <a:schemeClr val="lt1"/>
+                </a:fontRef>
+              </p:style>
+              <p:txBody>
+                <a:bodyPr rtlCol="0" anchor="ctr"/>
+                <a:lstStyle/>
+                <a:p>
+                  <a:pPr algn="ctr"/>
+                  <a:endParaRPr lang="en-US" b="1"/>
+                </a:p>
+              </p:txBody>
+            </p:sp>
+            <p:sp>
+              <p:nvSpPr>
+                <p:cNvPr id="84" name="TextBox 83"/>
+                <p:cNvSpPr txBox="1"/>
+                <p:nvPr/>
+              </p:nvSpPr>
+              <p:spPr>
+                <a:xfrm>
+                  <a:off x="3295934" y="2240507"/>
+                  <a:ext cx="798394" cy="295466"/>
+                </a:xfrm>
+                <a:prstGeom prst="rect">
+                  <a:avLst/>
+                </a:prstGeom>
+                <a:noFill/>
+              </p:spPr>
+              <p:txBody>
+                <a:bodyPr wrap="square" lIns="9144" tIns="9144" rIns="9144" bIns="9144" rtlCol="0">
+                  <a:spAutoFit/>
+                </a:bodyPr>
+                <a:lstStyle/>
+                <a:p>
+                  <a:pPr algn="ctr"/>
+                  <a:r>
+                    <a:rPr lang="en-US" b="1" dirty="0" smtClean="0"/>
+                    <a:t>H3K9M</a:t>
+                  </a:r>
+                  <a:endParaRPr lang="en-US" b="1" dirty="0"/>
+                </a:p>
+              </p:txBody>
+            </p:sp>
+          </p:grpSp>
+          <p:grpSp>
+            <p:nvGrpSpPr>
+              <p:cNvPr id="36" name="Group 35"/>
+              <p:cNvGrpSpPr/>
+              <p:nvPr/>
+            </p:nvGrpSpPr>
+            <p:grpSpPr>
+              <a:xfrm>
+                <a:off x="2102789" y="1168412"/>
+                <a:ext cx="818865" cy="655092"/>
+                <a:chOff x="3275463" y="2104030"/>
+                <a:chExt cx="818865" cy="655092"/>
+              </a:xfrm>
+            </p:grpSpPr>
+            <p:sp>
+              <p:nvSpPr>
+                <p:cNvPr id="81" name="Oval 80"/>
+                <p:cNvSpPr/>
+                <p:nvPr/>
+              </p:nvSpPr>
+              <p:spPr>
+                <a:xfrm>
+                  <a:off x="3275463" y="2104030"/>
+                  <a:ext cx="818865" cy="655092"/>
+                </a:xfrm>
+                <a:prstGeom prst="ellipse">
+                  <a:avLst/>
+                </a:prstGeom>
+                <a:noFill/>
+                <a:ln w="19050"/>
+              </p:spPr>
+              <p:style>
+                <a:lnRef idx="2">
+                  <a:schemeClr val="accent1">
+                    <a:shade val="50000"/>
+                  </a:schemeClr>
+                </a:lnRef>
+                <a:fillRef idx="1">
+                  <a:schemeClr val="accent1"/>
+                </a:fillRef>
+                <a:effectRef idx="0">
+                  <a:schemeClr val="accent1"/>
+                </a:effectRef>
+                <a:fontRef idx="minor">
+                  <a:schemeClr val="lt1"/>
+                </a:fontRef>
+              </p:style>
+              <p:txBody>
+                <a:bodyPr rtlCol="0" anchor="ctr"/>
+                <a:lstStyle/>
+                <a:p>
+                  <a:pPr algn="ctr"/>
+                  <a:endParaRPr lang="en-US" b="1"/>
+                </a:p>
+              </p:txBody>
+            </p:sp>
+            <p:sp>
+              <p:nvSpPr>
+                <p:cNvPr id="82" name="TextBox 81"/>
+                <p:cNvSpPr txBox="1"/>
+                <p:nvPr/>
+              </p:nvSpPr>
+              <p:spPr>
+                <a:xfrm>
+                  <a:off x="3275464" y="2240507"/>
+                  <a:ext cx="757450" cy="369332"/>
+                </a:xfrm>
+                <a:prstGeom prst="rect">
+                  <a:avLst/>
+                </a:prstGeom>
+                <a:noFill/>
+              </p:spPr>
+              <p:txBody>
+                <a:bodyPr wrap="square" rtlCol="0">
+                  <a:spAutoFit/>
+                </a:bodyPr>
+                <a:lstStyle/>
+                <a:p>
+                  <a:pPr algn="ctr"/>
+                  <a:r>
+                    <a:rPr lang="en-US" b="1" dirty="0" smtClean="0"/>
+                    <a:t>KDM</a:t>
+                  </a:r>
+                  <a:endParaRPr lang="en-US" b="1" dirty="0"/>
+                </a:p>
+              </p:txBody>
+            </p:sp>
+          </p:grpSp>
+          <p:grpSp>
+            <p:nvGrpSpPr>
+              <p:cNvPr id="37" name="Group 36"/>
+              <p:cNvGrpSpPr/>
+              <p:nvPr/>
+            </p:nvGrpSpPr>
+            <p:grpSpPr>
+              <a:xfrm>
+                <a:off x="2860240" y="2123334"/>
+                <a:ext cx="851413" cy="655092"/>
+                <a:chOff x="3242915" y="2104030"/>
+                <a:chExt cx="851413" cy="655092"/>
+              </a:xfrm>
+            </p:grpSpPr>
+            <p:sp>
+              <p:nvSpPr>
+                <p:cNvPr id="79" name="Oval 78"/>
+                <p:cNvSpPr/>
+                <p:nvPr/>
+              </p:nvSpPr>
+              <p:spPr>
+                <a:xfrm>
+                  <a:off x="3275463" y="2104030"/>
+                  <a:ext cx="818865" cy="655092"/>
+                </a:xfrm>
+                <a:prstGeom prst="ellipse">
+                  <a:avLst/>
+                </a:prstGeom>
+                <a:noFill/>
+                <a:ln w="19050"/>
+              </p:spPr>
+              <p:style>
+                <a:lnRef idx="2">
+                  <a:schemeClr val="accent1">
+                    <a:shade val="50000"/>
+                  </a:schemeClr>
+                </a:lnRef>
+                <a:fillRef idx="1">
+                  <a:schemeClr val="accent1"/>
+                </a:fillRef>
+                <a:effectRef idx="0">
+                  <a:schemeClr val="accent1"/>
+                </a:effectRef>
+                <a:fontRef idx="minor">
+                  <a:schemeClr val="lt1"/>
+                </a:fontRef>
+              </p:style>
+              <p:txBody>
+                <a:bodyPr rtlCol="0" anchor="ctr"/>
+                <a:lstStyle/>
+                <a:p>
+                  <a:pPr algn="ctr"/>
+                  <a:endParaRPr lang="en-US" b="1"/>
+                </a:p>
+              </p:txBody>
+            </p:sp>
+            <p:sp>
+              <p:nvSpPr>
+                <p:cNvPr id="80" name="TextBox 79"/>
+                <p:cNvSpPr txBox="1"/>
+                <p:nvPr/>
+              </p:nvSpPr>
+              <p:spPr>
+                <a:xfrm>
+                  <a:off x="3242915" y="2240507"/>
+                  <a:ext cx="851413" cy="295466"/>
+                </a:xfrm>
+                <a:prstGeom prst="rect">
+                  <a:avLst/>
+                </a:prstGeom>
+                <a:noFill/>
+              </p:spPr>
+              <p:txBody>
+                <a:bodyPr wrap="square" lIns="9144" tIns="9144" rIns="9144" bIns="9144" rtlCol="0">
+                  <a:spAutoFit/>
+                </a:bodyPr>
+                <a:lstStyle/>
+                <a:p>
+                  <a:pPr algn="ctr"/>
+                  <a:r>
+                    <a:rPr lang="en-US" b="1" dirty="0" smtClean="0"/>
+                    <a:t>H3S10P</a:t>
+                  </a:r>
+                  <a:endParaRPr lang="en-US" b="1" dirty="0"/>
+                </a:p>
+              </p:txBody>
+            </p:sp>
+          </p:grpSp>
+          <p:cxnSp>
+            <p:nvCxnSpPr>
+              <p:cNvPr id="38" name="Straight Arrow Connector 37"/>
+              <p:cNvCxnSpPr/>
+              <p:nvPr/>
+            </p:nvCxnSpPr>
             <p:spPr>
               <a:xfrm>
-                <a:off x="2586251" y="1153236"/>
-                <a:ext cx="818865" cy="655092"/>
+                <a:off x="1480724" y="1720744"/>
+                <a:ext cx="263830" cy="402590"/>
               </a:xfrm>
-              <a:prstGeom prst="ellipse">
+              <a:prstGeom prst="straightConnector1">
                 <a:avLst/>
               </a:prstGeom>
-              <a:noFill/>
-              <a:ln w="19050"/>
+              <a:ln w="19050">
+                <a:solidFill>
+                  <a:schemeClr val="tx1"/>
+                </a:solidFill>
+                <a:headEnd type="none"/>
+                <a:tailEnd type="arrow"/>
+              </a:ln>
             </p:spPr>
             <p:style>
-              <a:lnRef idx="2">
-                <a:schemeClr val="accent1">
-                  <a:shade val="50000"/>
-                </a:schemeClr>
+              <a:lnRef idx="1">
+                <a:schemeClr val="accent1"/>
               </a:lnRef>
-              <a:fillRef idx="1">
+              <a:fillRef idx="0">
                 <a:schemeClr val="accent1"/>
               </a:fillRef>
               <a:effectRef idx="0">
                 <a:schemeClr val="accent1"/>
               </a:effectRef>
               <a:fontRef idx="minor">
-                <a:schemeClr val="lt1"/>
+                <a:schemeClr val="tx1"/>
               </a:fontRef>
             </p:style>
-            <p:txBody>
-              <a:bodyPr rtlCol="0" anchor="ctr"/>
-              <a:lstStyle/>
-              <a:p>
-                <a:pPr algn="ctr"/>
-                <a:endParaRPr lang="en-US" b="1"/>
-              </a:p>
-            </p:txBody>
-          </p:sp>
-          <p:sp>
-            <p:nvSpPr>
-              <p:cNvPr id="75" name="TextBox 74"/>
-              <p:cNvSpPr txBox="1"/>
+          </p:cxnSp>
+          <p:cxnSp>
+            <p:nvCxnSpPr>
+              <p:cNvPr id="39" name="Straight Arrow Connector 38"/>
+              <p:cNvCxnSpPr/>
               <p:nvPr/>
-            </p:nvSpPr>
+            </p:nvCxnSpPr>
             <p:spPr>
-              <a:xfrm>
-                <a:off x="2715904" y="1289713"/>
-                <a:ext cx="559559" cy="369332"/>
+              <a:xfrm flipH="1" flipV="1">
+                <a:off x="2792001" y="1710707"/>
+                <a:ext cx="360279" cy="425444"/>
               </a:xfrm>
-              <a:prstGeom prst="rect">
+              <a:prstGeom prst="straightConnector1">
                 <a:avLst/>
               </a:prstGeom>
-              <a:noFill/>
-            </p:spPr>
-            <p:txBody>
-              <a:bodyPr wrap="square" rtlCol="0">
-                <a:spAutoFit/>
-              </a:bodyPr>
-              <a:lstStyle/>
-              <a:p>
-                <a:pPr algn="ctr"/>
-                <a:r>
-                  <a:rPr lang="en-US" b="1" dirty="0" smtClean="0"/>
-                  <a:t>MT</a:t>
-                </a:r>
-                <a:endParaRPr lang="en-US" b="1" dirty="0"/>
-              </a:p>
-            </p:txBody>
-          </p:sp>
-        </p:grpSp>
-        <p:grpSp>
-          <p:nvGrpSpPr>
-            <p:cNvPr id="52" name="Group 51"/>
-            <p:cNvGrpSpPr/>
-            <p:nvPr/>
-          </p:nvGrpSpPr>
-          <p:grpSpPr>
-            <a:xfrm>
-              <a:off x="1486253" y="2123334"/>
-              <a:ext cx="818865" cy="655092"/>
-              <a:chOff x="3275463" y="2104030"/>
-              <a:chExt cx="818865" cy="655092"/>
-            </a:xfrm>
-          </p:grpSpPr>
-          <p:sp>
-            <p:nvSpPr>
-              <p:cNvPr id="72" name="Oval 71"/>
-              <p:cNvSpPr/>
-              <p:nvPr/>
-            </p:nvSpPr>
-            <p:spPr>
-              <a:xfrm>
-                <a:off x="3275463" y="2104030"/>
-                <a:ext cx="818865" cy="655092"/>
-              </a:xfrm>
-              <a:prstGeom prst="ellipse">
-                <a:avLst/>
-              </a:prstGeom>
-              <a:noFill/>
-              <a:ln w="19050"/>
+              <a:ln w="19050">
+                <a:solidFill>
+                  <a:schemeClr val="tx1"/>
+                </a:solidFill>
+                <a:headEnd type="none"/>
+                <a:tailEnd type="arrow"/>
+              </a:ln>
             </p:spPr>
             <p:style>
-              <a:lnRef idx="2">
-                <a:schemeClr val="accent1">
-                  <a:shade val="50000"/>
-                </a:schemeClr>
+              <a:lnRef idx="1">
+                <a:schemeClr val="accent1"/>
               </a:lnRef>
-              <a:fillRef idx="1">
+              <a:fillRef idx="0">
                 <a:schemeClr val="accent1"/>
               </a:fillRef>
               <a:effectRef idx="0">
                 <a:schemeClr val="accent1"/>
               </a:effectRef>
               <a:fontRef idx="minor">
-                <a:schemeClr val="lt1"/>
+                <a:schemeClr val="tx1"/>
               </a:fontRef>
             </p:style>
-            <p:txBody>
-              <a:bodyPr rtlCol="0" anchor="ctr"/>
-              <a:lstStyle/>
-              <a:p>
-                <a:pPr algn="ctr"/>
-                <a:endParaRPr lang="en-US" b="1"/>
-              </a:p>
-            </p:txBody>
-          </p:sp>
-          <p:sp>
-            <p:nvSpPr>
-              <p:cNvPr id="73" name="TextBox 72"/>
-              <p:cNvSpPr txBox="1"/>
+          </p:cxnSp>
+          <p:grpSp>
+            <p:nvGrpSpPr>
+              <p:cNvPr id="40" name="Group 39"/>
+              <p:cNvGrpSpPr/>
               <p:nvPr/>
-            </p:nvSpPr>
+            </p:nvGrpSpPr>
+            <p:grpSpPr>
+              <a:xfrm>
+                <a:off x="4092152" y="1141135"/>
+                <a:ext cx="908212" cy="655092"/>
+                <a:chOff x="3230789" y="2104030"/>
+                <a:chExt cx="908212" cy="655092"/>
+              </a:xfrm>
+            </p:grpSpPr>
+            <p:sp>
+              <p:nvSpPr>
+                <p:cNvPr id="48" name="Oval 47"/>
+                <p:cNvSpPr/>
+                <p:nvPr/>
+              </p:nvSpPr>
+              <p:spPr>
+                <a:xfrm>
+                  <a:off x="3275463" y="2104030"/>
+                  <a:ext cx="818865" cy="655092"/>
+                </a:xfrm>
+                <a:prstGeom prst="ellipse">
+                  <a:avLst/>
+                </a:prstGeom>
+                <a:noFill/>
+                <a:ln w="19050"/>
+              </p:spPr>
+              <p:style>
+                <a:lnRef idx="2">
+                  <a:schemeClr val="accent1">
+                    <a:shade val="50000"/>
+                  </a:schemeClr>
+                </a:lnRef>
+                <a:fillRef idx="1">
+                  <a:schemeClr val="accent1"/>
+                </a:fillRef>
+                <a:effectRef idx="0">
+                  <a:schemeClr val="accent1"/>
+                </a:effectRef>
+                <a:fontRef idx="minor">
+                  <a:schemeClr val="lt1"/>
+                </a:fontRef>
+              </p:style>
+              <p:txBody>
+                <a:bodyPr rtlCol="0" anchor="ctr"/>
+                <a:lstStyle/>
+                <a:p>
+                  <a:pPr algn="ctr"/>
+                  <a:endParaRPr lang="en-US" b="1"/>
+                </a:p>
+              </p:txBody>
+            </p:sp>
+            <p:sp>
+              <p:nvSpPr>
+                <p:cNvPr id="49" name="TextBox 48"/>
+                <p:cNvSpPr txBox="1"/>
+                <p:nvPr/>
+              </p:nvSpPr>
+              <p:spPr>
+                <a:xfrm>
+                  <a:off x="3230789" y="2246910"/>
+                  <a:ext cx="908212" cy="369332"/>
+                </a:xfrm>
+                <a:prstGeom prst="rect">
+                  <a:avLst/>
+                </a:prstGeom>
+                <a:noFill/>
+              </p:spPr>
+              <p:txBody>
+                <a:bodyPr wrap="square" rtlCol="0">
+                  <a:spAutoFit/>
+                </a:bodyPr>
+                <a:lstStyle/>
+                <a:p>
+                  <a:pPr algn="ctr"/>
+                  <a:r>
+                    <a:rPr lang="en-US" b="1" dirty="0" smtClean="0"/>
+                    <a:t>Kinase</a:t>
+                  </a:r>
+                  <a:endParaRPr lang="en-US" b="1" dirty="0"/>
+                </a:p>
+              </p:txBody>
+            </p:sp>
+          </p:grpSp>
+          <p:grpSp>
+            <p:nvGrpSpPr>
+              <p:cNvPr id="41" name="Group 40"/>
+              <p:cNvGrpSpPr/>
+              <p:nvPr/>
+            </p:nvGrpSpPr>
+            <p:grpSpPr>
+              <a:xfrm>
+                <a:off x="4114489" y="2123334"/>
+                <a:ext cx="908212" cy="655092"/>
+                <a:chOff x="3230789" y="2104030"/>
+                <a:chExt cx="908212" cy="655092"/>
+              </a:xfrm>
+            </p:grpSpPr>
+            <p:sp>
+              <p:nvSpPr>
+                <p:cNvPr id="45" name="Oval 44"/>
+                <p:cNvSpPr/>
+                <p:nvPr/>
+              </p:nvSpPr>
+              <p:spPr>
+                <a:xfrm>
+                  <a:off x="3275463" y="2104030"/>
+                  <a:ext cx="818865" cy="655092"/>
+                </a:xfrm>
+                <a:prstGeom prst="ellipse">
+                  <a:avLst/>
+                </a:prstGeom>
+                <a:noFill/>
+                <a:ln w="19050"/>
+              </p:spPr>
+              <p:style>
+                <a:lnRef idx="2">
+                  <a:schemeClr val="accent1">
+                    <a:shade val="50000"/>
+                  </a:schemeClr>
+                </a:lnRef>
+                <a:fillRef idx="1">
+                  <a:schemeClr val="accent1"/>
+                </a:fillRef>
+                <a:effectRef idx="0">
+                  <a:schemeClr val="accent1"/>
+                </a:effectRef>
+                <a:fontRef idx="minor">
+                  <a:schemeClr val="lt1"/>
+                </a:fontRef>
+              </p:style>
+              <p:txBody>
+                <a:bodyPr rtlCol="0" anchor="ctr"/>
+                <a:lstStyle/>
+                <a:p>
+                  <a:pPr algn="ctr"/>
+                  <a:endParaRPr lang="en-US" b="1"/>
+                </a:p>
+              </p:txBody>
+            </p:sp>
+            <p:sp>
+              <p:nvSpPr>
+                <p:cNvPr id="46" name="TextBox 45"/>
+                <p:cNvSpPr txBox="1"/>
+                <p:nvPr/>
+              </p:nvSpPr>
+              <p:spPr>
+                <a:xfrm>
+                  <a:off x="3230789" y="2246910"/>
+                  <a:ext cx="908212" cy="369332"/>
+                </a:xfrm>
+                <a:prstGeom prst="rect">
+                  <a:avLst/>
+                </a:prstGeom>
+                <a:noFill/>
+              </p:spPr>
+              <p:txBody>
+                <a:bodyPr wrap="square" rtlCol="0">
+                  <a:spAutoFit/>
+                </a:bodyPr>
+                <a:lstStyle/>
+                <a:p>
+                  <a:pPr algn="ctr"/>
+                  <a:r>
+                    <a:rPr lang="en-US" b="1" dirty="0" smtClean="0"/>
+                    <a:t>PTP</a:t>
+                  </a:r>
+                  <a:endParaRPr lang="en-US" b="1" dirty="0"/>
+                </a:p>
+              </p:txBody>
+            </p:sp>
+          </p:grpSp>
+          <p:cxnSp>
+            <p:nvCxnSpPr>
+              <p:cNvPr id="42" name="Straight Arrow Connector 41"/>
+              <p:cNvCxnSpPr/>
+              <p:nvPr/>
+            </p:nvCxnSpPr>
             <p:spPr>
-              <a:xfrm>
-                <a:off x="3405116" y="2240507"/>
-                <a:ext cx="627797" cy="369332"/>
+              <a:xfrm flipH="1">
+                <a:off x="3688087" y="1732538"/>
+                <a:ext cx="524844" cy="469773"/>
               </a:xfrm>
-              <a:prstGeom prst="rect">
+              <a:prstGeom prst="straightConnector1">
                 <a:avLst/>
               </a:prstGeom>
-              <a:noFill/>
-            </p:spPr>
-            <p:txBody>
-              <a:bodyPr wrap="square" rtlCol="0">
-                <a:spAutoFit/>
-              </a:bodyPr>
-              <a:lstStyle/>
-              <a:p>
-                <a:pPr algn="ctr"/>
-                <a:r>
-                  <a:rPr lang="en-US" b="1" dirty="0" smtClean="0"/>
-                  <a:t>K9M</a:t>
-                </a:r>
-                <a:endParaRPr lang="en-US" b="1" dirty="0"/>
-              </a:p>
-            </p:txBody>
-          </p:sp>
-        </p:grpSp>
-        <p:grpSp>
-          <p:nvGrpSpPr>
-            <p:cNvPr id="53" name="Group 52"/>
-            <p:cNvGrpSpPr/>
-            <p:nvPr/>
-          </p:nvGrpSpPr>
-          <p:grpSpPr>
-            <a:xfrm>
-              <a:off x="2102789" y="1168412"/>
-              <a:ext cx="818865" cy="655092"/>
-              <a:chOff x="3275463" y="2104030"/>
-              <a:chExt cx="818865" cy="655092"/>
-            </a:xfrm>
-          </p:grpSpPr>
-          <p:sp>
-            <p:nvSpPr>
-              <p:cNvPr id="70" name="Oval 69"/>
-              <p:cNvSpPr/>
-              <p:nvPr/>
-            </p:nvSpPr>
-            <p:spPr>
-              <a:xfrm>
-                <a:off x="3275463" y="2104030"/>
-                <a:ext cx="818865" cy="655092"/>
-              </a:xfrm>
-              <a:prstGeom prst="ellipse">
-                <a:avLst/>
-              </a:prstGeom>
-              <a:noFill/>
-              <a:ln w="19050"/>
+              <a:ln w="19050">
+                <a:solidFill>
+                  <a:schemeClr val="tx1"/>
+                </a:solidFill>
+                <a:headEnd type="none"/>
+                <a:tailEnd type="arrow"/>
+              </a:ln>
             </p:spPr>
             <p:style>
-              <a:lnRef idx="2">
-                <a:schemeClr val="accent1">
-                  <a:shade val="50000"/>
-                </a:schemeClr>
+              <a:lnRef idx="1">
+                <a:schemeClr val="accent1"/>
               </a:lnRef>
-              <a:fillRef idx="1">
+              <a:fillRef idx="0">
                 <a:schemeClr val="accent1"/>
               </a:fillRef>
               <a:effectRef idx="0">
                 <a:schemeClr val="accent1"/>
               </a:effectRef>
               <a:fontRef idx="minor">
-                <a:schemeClr val="lt1"/>
+                <a:schemeClr val="tx1"/>
               </a:fontRef>
             </p:style>
-            <p:txBody>
-              <a:bodyPr rtlCol="0" anchor="ctr"/>
-              <a:lstStyle/>
-              <a:p>
-                <a:pPr algn="ctr"/>
-                <a:endParaRPr lang="en-US" b="1"/>
-              </a:p>
-            </p:txBody>
-          </p:sp>
-          <p:sp>
-            <p:nvSpPr>
-              <p:cNvPr id="71" name="TextBox 70"/>
-              <p:cNvSpPr txBox="1"/>
+          </p:cxnSp>
+          <p:cxnSp>
+            <p:nvCxnSpPr>
+              <p:cNvPr id="43" name="Straight Arrow Connector 42"/>
+              <p:cNvCxnSpPr/>
               <p:nvPr/>
-            </p:nvSpPr>
+            </p:nvCxnSpPr>
             <p:spPr>
-              <a:xfrm>
-                <a:off x="3275464" y="2240507"/>
-                <a:ext cx="757450" cy="369332"/>
+              <a:xfrm flipH="1" flipV="1">
+                <a:off x="3766881" y="2450880"/>
+                <a:ext cx="387096" cy="127379"/>
               </a:xfrm>
-              <a:prstGeom prst="rect">
+              <a:prstGeom prst="straightConnector1">
                 <a:avLst/>
               </a:prstGeom>
-              <a:noFill/>
-            </p:spPr>
-            <p:txBody>
-              <a:bodyPr wrap="square" rtlCol="0">
-                <a:spAutoFit/>
-              </a:bodyPr>
-              <a:lstStyle/>
-              <a:p>
-                <a:pPr algn="ctr"/>
-                <a:r>
-                  <a:rPr lang="en-US" b="1" dirty="0" smtClean="0"/>
-                  <a:t>KDM</a:t>
-                </a:r>
-                <a:endParaRPr lang="en-US" b="1" dirty="0"/>
-              </a:p>
-            </p:txBody>
-          </p:sp>
-        </p:grpSp>
-        <p:grpSp>
-          <p:nvGrpSpPr>
-            <p:cNvPr id="54" name="Group 53"/>
-            <p:cNvGrpSpPr/>
-            <p:nvPr/>
-          </p:nvGrpSpPr>
-          <p:grpSpPr>
-            <a:xfrm>
-              <a:off x="2892788" y="2123334"/>
-              <a:ext cx="818865" cy="655092"/>
-              <a:chOff x="3275463" y="2104030"/>
-              <a:chExt cx="818865" cy="655092"/>
-            </a:xfrm>
-          </p:grpSpPr>
-          <p:sp>
-            <p:nvSpPr>
-              <p:cNvPr id="68" name="Oval 67"/>
-              <p:cNvSpPr/>
-              <p:nvPr/>
-            </p:nvSpPr>
-            <p:spPr>
-              <a:xfrm>
-                <a:off x="3275463" y="2104030"/>
-                <a:ext cx="818865" cy="655092"/>
-              </a:xfrm>
-              <a:prstGeom prst="ellipse">
-                <a:avLst/>
-              </a:prstGeom>
-              <a:noFill/>
-              <a:ln w="19050"/>
+              <a:ln w="19050">
+                <a:solidFill>
+                  <a:schemeClr val="tx1"/>
+                </a:solidFill>
+                <a:headEnd type="none"/>
+                <a:tailEnd type="diamond" w="lg" len="lg"/>
+              </a:ln>
             </p:spPr>
             <p:style>
-              <a:lnRef idx="2">
-                <a:schemeClr val="accent1">
-                  <a:shade val="50000"/>
-                </a:schemeClr>
+              <a:lnRef idx="1">
+                <a:schemeClr val="accent1"/>
               </a:lnRef>
-              <a:fillRef idx="1">
+              <a:fillRef idx="0">
                 <a:schemeClr val="accent1"/>
               </a:fillRef>
               <a:effectRef idx="0">
                 <a:schemeClr val="accent1"/>
               </a:effectRef>
               <a:fontRef idx="minor">
-                <a:schemeClr val="lt1"/>
+                <a:schemeClr val="tx1"/>
               </a:fontRef>
             </p:style>
-            <p:txBody>
-              <a:bodyPr rtlCol="0" anchor="ctr"/>
-              <a:lstStyle/>
-              <a:p>
-                <a:pPr algn="ctr"/>
-                <a:endParaRPr lang="en-US" b="1"/>
-              </a:p>
-            </p:txBody>
-          </p:sp>
-          <p:sp>
-            <p:nvSpPr>
-              <p:cNvPr id="69" name="TextBox 68"/>
-              <p:cNvSpPr txBox="1"/>
+          </p:cxnSp>
+          <p:cxnSp>
+            <p:nvCxnSpPr>
+              <p:cNvPr id="44" name="Straight Arrow Connector 43"/>
+              <p:cNvCxnSpPr>
+                <a:stCxn id="81" idx="3"/>
+                <a:endCxn id="83" idx="0"/>
+              </p:cNvCxnSpPr>
               <p:nvPr/>
-            </p:nvSpPr>
+            </p:nvCxnSpPr>
             <p:spPr>
-              <a:xfrm>
-                <a:off x="3275464" y="2240507"/>
-                <a:ext cx="757450" cy="369332"/>
+              <a:xfrm flipH="1">
+                <a:off x="1895686" y="1727568"/>
+                <a:ext cx="327023" cy="395766"/>
               </a:xfrm>
-              <a:prstGeom prst="rect">
+              <a:prstGeom prst="straightConnector1">
                 <a:avLst/>
               </a:prstGeom>
-              <a:noFill/>
-            </p:spPr>
-            <p:txBody>
-              <a:bodyPr wrap="square" rtlCol="0">
-                <a:spAutoFit/>
-              </a:bodyPr>
-              <a:lstStyle/>
-              <a:p>
-                <a:pPr algn="ctr"/>
-                <a:r>
-                  <a:rPr lang="en-US" b="1" dirty="0" smtClean="0"/>
-                  <a:t>S10P</a:t>
-                </a:r>
-                <a:endParaRPr lang="en-US" b="1" dirty="0"/>
-              </a:p>
-            </p:txBody>
-          </p:sp>
-        </p:grpSp>
-        <p:cxnSp>
-          <p:nvCxnSpPr>
-            <p:cNvPr id="55" name="Straight Arrow Connector 54"/>
-            <p:cNvCxnSpPr/>
-            <p:nvPr/>
-          </p:nvCxnSpPr>
-          <p:spPr>
-            <a:xfrm>
-              <a:off x="1480724" y="1720744"/>
-              <a:ext cx="263830" cy="402590"/>
-            </a:xfrm>
-            <a:prstGeom prst="straightConnector1">
-              <a:avLst/>
-            </a:prstGeom>
-            <a:ln w="19050">
-              <a:solidFill>
-                <a:schemeClr val="tx1"/>
-              </a:solidFill>
-              <a:headEnd type="none"/>
-              <a:tailEnd type="arrow"/>
-            </a:ln>
-          </p:spPr>
-          <p:style>
-            <a:lnRef idx="1">
-              <a:schemeClr val="accent1"/>
-            </a:lnRef>
-            <a:fillRef idx="0">
-              <a:schemeClr val="accent1"/>
-            </a:fillRef>
-            <a:effectRef idx="0">
-              <a:schemeClr val="accent1"/>
-            </a:effectRef>
-            <a:fontRef idx="minor">
-              <a:schemeClr val="tx1"/>
-            </a:fontRef>
-          </p:style>
-        </p:cxnSp>
-        <p:cxnSp>
-          <p:nvCxnSpPr>
-            <p:cNvPr id="56" name="Straight Arrow Connector 55"/>
-            <p:cNvCxnSpPr>
-              <a:endCxn id="70" idx="5"/>
-            </p:cNvCxnSpPr>
-            <p:nvPr/>
-          </p:nvCxnSpPr>
-          <p:spPr>
-            <a:xfrm flipH="1" flipV="1">
-              <a:off x="2801734" y="1727568"/>
-              <a:ext cx="360279" cy="425444"/>
-            </a:xfrm>
-            <a:prstGeom prst="straightConnector1">
-              <a:avLst/>
-            </a:prstGeom>
-            <a:ln w="19050">
-              <a:solidFill>
-                <a:schemeClr val="tx1"/>
-              </a:solidFill>
-              <a:headEnd type="none"/>
-              <a:tailEnd type="arrow"/>
-            </a:ln>
-          </p:spPr>
-          <p:style>
-            <a:lnRef idx="1">
-              <a:schemeClr val="accent1"/>
-            </a:lnRef>
-            <a:fillRef idx="0">
-              <a:schemeClr val="accent1"/>
-            </a:fillRef>
-            <a:effectRef idx="0">
-              <a:schemeClr val="accent1"/>
-            </a:effectRef>
-            <a:fontRef idx="minor">
-              <a:schemeClr val="tx1"/>
-            </a:fontRef>
-          </p:style>
-        </p:cxnSp>
-        <p:grpSp>
-          <p:nvGrpSpPr>
-            <p:cNvPr id="57" name="Group 56"/>
-            <p:cNvGrpSpPr/>
-            <p:nvPr/>
-          </p:nvGrpSpPr>
-          <p:grpSpPr>
-            <a:xfrm>
-              <a:off x="4092152" y="1141135"/>
-              <a:ext cx="908212" cy="655092"/>
-              <a:chOff x="3230789" y="2104030"/>
-              <a:chExt cx="908212" cy="655092"/>
-            </a:xfrm>
-          </p:grpSpPr>
-          <p:sp>
-            <p:nvSpPr>
-              <p:cNvPr id="66" name="Oval 65"/>
-              <p:cNvSpPr/>
-              <p:nvPr/>
-            </p:nvSpPr>
-            <p:spPr>
-              <a:xfrm>
-                <a:off x="3275463" y="2104030"/>
-                <a:ext cx="818865" cy="655092"/>
-              </a:xfrm>
-              <a:prstGeom prst="ellipse">
-                <a:avLst/>
-              </a:prstGeom>
-              <a:noFill/>
-              <a:ln w="19050"/>
+              <a:ln w="19050">
+                <a:solidFill>
+                  <a:schemeClr val="tx1"/>
+                </a:solidFill>
+                <a:headEnd type="none"/>
+                <a:tailEnd type="diamond" w="lg" len="lg"/>
+              </a:ln>
             </p:spPr>
             <p:style>
-              <a:lnRef idx="2">
-                <a:schemeClr val="accent1">
-                  <a:shade val="50000"/>
-                </a:schemeClr>
+              <a:lnRef idx="1">
+                <a:schemeClr val="accent1"/>
               </a:lnRef>
-              <a:fillRef idx="1">
+              <a:fillRef idx="0">
                 <a:schemeClr val="accent1"/>
               </a:fillRef>
               <a:effectRef idx="0">
                 <a:schemeClr val="accent1"/>
               </a:effectRef>
               <a:fontRef idx="minor">
-                <a:schemeClr val="lt1"/>
+                <a:schemeClr val="tx1"/>
               </a:fontRef>
             </p:style>
-            <p:txBody>
-              <a:bodyPr rtlCol="0" anchor="ctr"/>
-              <a:lstStyle/>
-              <a:p>
-                <a:pPr algn="ctr"/>
-                <a:endParaRPr lang="en-US" b="1"/>
-              </a:p>
-            </p:txBody>
-          </p:sp>
-          <p:sp>
-            <p:nvSpPr>
-              <p:cNvPr id="67" name="TextBox 66"/>
-              <p:cNvSpPr txBox="1"/>
-              <p:nvPr/>
-            </p:nvSpPr>
-            <p:spPr>
-              <a:xfrm>
-                <a:off x="3230789" y="2246910"/>
-                <a:ext cx="908212" cy="369332"/>
-              </a:xfrm>
-              <a:prstGeom prst="rect">
-                <a:avLst/>
-              </a:prstGeom>
-              <a:noFill/>
-            </p:spPr>
-            <p:txBody>
-              <a:bodyPr wrap="square" rtlCol="0">
-                <a:spAutoFit/>
-              </a:bodyPr>
-              <a:lstStyle/>
-              <a:p>
-                <a:pPr algn="ctr"/>
-                <a:r>
-                  <a:rPr lang="en-US" b="1" dirty="0" smtClean="0"/>
-                  <a:t>Kinase</a:t>
-                </a:r>
-                <a:endParaRPr lang="en-US" b="1" dirty="0"/>
-              </a:p>
-            </p:txBody>
-          </p:sp>
+          </p:cxnSp>
         </p:grpSp>
-        <p:grpSp>
-          <p:nvGrpSpPr>
-            <p:cNvPr id="58" name="Group 57"/>
-            <p:cNvGrpSpPr/>
-            <p:nvPr/>
-          </p:nvGrpSpPr>
-          <p:grpSpPr>
-            <a:xfrm>
-              <a:off x="4114489" y="2123334"/>
-              <a:ext cx="908212" cy="655092"/>
-              <a:chOff x="3230789" y="2104030"/>
-              <a:chExt cx="908212" cy="655092"/>
-            </a:xfrm>
-          </p:grpSpPr>
-          <p:sp>
-            <p:nvSpPr>
-              <p:cNvPr id="64" name="Oval 63"/>
-              <p:cNvSpPr/>
-              <p:nvPr/>
-            </p:nvSpPr>
-            <p:spPr>
-              <a:xfrm>
-                <a:off x="3275463" y="2104030"/>
-                <a:ext cx="818865" cy="655092"/>
-              </a:xfrm>
-              <a:prstGeom prst="ellipse">
-                <a:avLst/>
-              </a:prstGeom>
-              <a:noFill/>
-              <a:ln w="19050"/>
-            </p:spPr>
-            <p:style>
-              <a:lnRef idx="2">
-                <a:schemeClr val="accent1">
-                  <a:shade val="50000"/>
-                </a:schemeClr>
-              </a:lnRef>
-              <a:fillRef idx="1">
-                <a:schemeClr val="accent1"/>
-              </a:fillRef>
-              <a:effectRef idx="0">
-                <a:schemeClr val="accent1"/>
-              </a:effectRef>
-              <a:fontRef idx="minor">
-                <a:schemeClr val="lt1"/>
-              </a:fontRef>
-            </p:style>
-            <p:txBody>
-              <a:bodyPr rtlCol="0" anchor="ctr"/>
-              <a:lstStyle/>
-              <a:p>
-                <a:pPr algn="ctr"/>
-                <a:endParaRPr lang="en-US" b="1"/>
-              </a:p>
-            </p:txBody>
-          </p:sp>
-          <p:sp>
-            <p:nvSpPr>
-              <p:cNvPr id="65" name="TextBox 64"/>
-              <p:cNvSpPr txBox="1"/>
-              <p:nvPr/>
-            </p:nvSpPr>
-            <p:spPr>
-              <a:xfrm>
-                <a:off x="3230789" y="2246910"/>
-                <a:ext cx="908212" cy="369332"/>
-              </a:xfrm>
-              <a:prstGeom prst="rect">
-                <a:avLst/>
-              </a:prstGeom>
-              <a:noFill/>
-            </p:spPr>
-            <p:txBody>
-              <a:bodyPr wrap="square" rtlCol="0">
-                <a:spAutoFit/>
-              </a:bodyPr>
-              <a:lstStyle/>
-              <a:p>
-                <a:pPr algn="ctr"/>
-                <a:r>
-                  <a:rPr lang="en-US" b="1" dirty="0" smtClean="0"/>
-                  <a:t>PTP</a:t>
-                </a:r>
-                <a:endParaRPr lang="en-US" b="1" dirty="0"/>
-              </a:p>
-            </p:txBody>
-          </p:sp>
-        </p:grpSp>
-        <p:cxnSp>
-          <p:nvCxnSpPr>
-            <p:cNvPr id="59" name="Straight Arrow Connector 58"/>
-            <p:cNvCxnSpPr/>
-            <p:nvPr/>
-          </p:nvCxnSpPr>
-          <p:spPr>
-            <a:xfrm flipH="1">
-              <a:off x="3688087" y="1732538"/>
-              <a:ext cx="524844" cy="469773"/>
-            </a:xfrm>
-            <a:prstGeom prst="straightConnector1">
-              <a:avLst/>
-            </a:prstGeom>
-            <a:ln w="19050">
-              <a:solidFill>
-                <a:schemeClr val="tx1"/>
-              </a:solidFill>
-              <a:headEnd type="none"/>
-              <a:tailEnd type="arrow"/>
-            </a:ln>
-          </p:spPr>
-          <p:style>
-            <a:lnRef idx="1">
-              <a:schemeClr val="accent1"/>
-            </a:lnRef>
-            <a:fillRef idx="0">
-              <a:schemeClr val="accent1"/>
-            </a:fillRef>
-            <a:effectRef idx="0">
-              <a:schemeClr val="accent1"/>
-            </a:effectRef>
-            <a:fontRef idx="minor">
-              <a:schemeClr val="tx1"/>
-            </a:fontRef>
-          </p:style>
-        </p:cxnSp>
-        <p:cxnSp>
-          <p:nvCxnSpPr>
-            <p:cNvPr id="60" name="Straight Arrow Connector 59"/>
-            <p:cNvCxnSpPr/>
-            <p:nvPr/>
-          </p:nvCxnSpPr>
-          <p:spPr>
-            <a:xfrm flipH="1" flipV="1">
-              <a:off x="3766881" y="2450880"/>
-              <a:ext cx="387096" cy="127379"/>
-            </a:xfrm>
-            <a:prstGeom prst="straightConnector1">
-              <a:avLst/>
-            </a:prstGeom>
-            <a:ln w="19050">
-              <a:solidFill>
-                <a:schemeClr val="tx1"/>
-              </a:solidFill>
-              <a:headEnd type="none"/>
-              <a:tailEnd type="diamond" w="lg" len="lg"/>
-            </a:ln>
-          </p:spPr>
-          <p:style>
-            <a:lnRef idx="1">
-              <a:schemeClr val="accent1"/>
-            </a:lnRef>
-            <a:fillRef idx="0">
-              <a:schemeClr val="accent1"/>
-            </a:fillRef>
-            <a:effectRef idx="0">
-              <a:schemeClr val="accent1"/>
-            </a:effectRef>
-            <a:fontRef idx="minor">
-              <a:schemeClr val="tx1"/>
-            </a:fontRef>
-          </p:style>
-        </p:cxnSp>
-        <p:cxnSp>
-          <p:nvCxnSpPr>
-            <p:cNvPr id="61" name="Straight Arrow Connector 60"/>
-            <p:cNvCxnSpPr>
-              <a:stCxn id="70" idx="3"/>
-              <a:endCxn id="72" idx="0"/>
-            </p:cNvCxnSpPr>
-            <p:nvPr/>
-          </p:nvCxnSpPr>
-          <p:spPr>
-            <a:xfrm flipH="1">
-              <a:off x="1895686" y="1727568"/>
-              <a:ext cx="327023" cy="395766"/>
-            </a:xfrm>
-            <a:prstGeom prst="straightConnector1">
-              <a:avLst/>
-            </a:prstGeom>
-            <a:ln w="19050">
-              <a:solidFill>
-                <a:schemeClr val="tx1"/>
-              </a:solidFill>
-              <a:headEnd type="none"/>
-              <a:tailEnd type="diamond" w="lg" len="lg"/>
-            </a:ln>
-          </p:spPr>
-          <p:style>
-            <a:lnRef idx="1">
-              <a:schemeClr val="accent1"/>
-            </a:lnRef>
-            <a:fillRef idx="0">
-              <a:schemeClr val="accent1"/>
-            </a:fillRef>
-            <a:effectRef idx="0">
-              <a:schemeClr val="accent1"/>
-            </a:effectRef>
-            <a:fontRef idx="minor">
-              <a:schemeClr val="tx1"/>
-            </a:fontRef>
-          </p:style>
-        </p:cxnSp>
         <p:sp>
           <p:nvSpPr>
-            <p:cNvPr id="62" name="Freeform 61"/>
+            <p:cNvPr id="87" name="Freeform 86"/>
             <p:cNvSpPr/>
             <p:nvPr/>
           </p:nvSpPr>
           <p:spPr>
             <a:xfrm>
-              <a:off x="1506724" y="796063"/>
-              <a:ext cx="2013524" cy="1256757"/>
+              <a:off x="8535601" y="859292"/>
+              <a:ext cx="1968801" cy="1295096"/>
             </a:xfrm>
             <a:custGeom>
               <a:avLst/>
               <a:gdLst>
-                <a:gd name="connsiteX0" fmla="*/ 1951630 w 2013524"/>
-                <a:gd name="connsiteY0" fmla="*/ 1256757 h 1256757"/>
-                <a:gd name="connsiteX1" fmla="*/ 1972102 w 2013524"/>
-                <a:gd name="connsiteY1" fmla="*/ 1161223 h 1256757"/>
-                <a:gd name="connsiteX2" fmla="*/ 1999397 w 2013524"/>
-                <a:gd name="connsiteY2" fmla="*/ 690375 h 1256757"/>
-                <a:gd name="connsiteX3" fmla="*/ 1726442 w 2013524"/>
-                <a:gd name="connsiteY3" fmla="*/ 253647 h 1256757"/>
-                <a:gd name="connsiteX4" fmla="*/ 1112293 w 2013524"/>
-                <a:gd name="connsiteY4" fmla="*/ 14811 h 1256757"/>
-                <a:gd name="connsiteX5" fmla="*/ 573206 w 2013524"/>
-                <a:gd name="connsiteY5" fmla="*/ 42107 h 1256757"/>
-                <a:gd name="connsiteX6" fmla="*/ 313899 w 2013524"/>
-                <a:gd name="connsiteY6" fmla="*/ 178584 h 1256757"/>
-                <a:gd name="connsiteX7" fmla="*/ 0 w 2013524"/>
-                <a:gd name="connsiteY7" fmla="*/ 362829 h 1256757"/>
+                <a:gd name="connsiteX0" fmla="*/ 1930400 w 1968801"/>
+                <a:gd name="connsiteY0" fmla="*/ 1295096 h 1295096"/>
+                <a:gd name="connsiteX1" fmla="*/ 1962150 w 1968801"/>
+                <a:gd name="connsiteY1" fmla="*/ 869646 h 1295096"/>
+                <a:gd name="connsiteX2" fmla="*/ 1816100 w 1968801"/>
+                <a:gd name="connsiteY2" fmla="*/ 387046 h 1295096"/>
+                <a:gd name="connsiteX3" fmla="*/ 1352550 w 1968801"/>
+                <a:gd name="connsiteY3" fmla="*/ 44146 h 1295096"/>
+                <a:gd name="connsiteX4" fmla="*/ 603250 w 1968801"/>
+                <a:gd name="connsiteY4" fmla="*/ 25096 h 1295096"/>
+                <a:gd name="connsiteX5" fmla="*/ 146050 w 1968801"/>
+                <a:gd name="connsiteY5" fmla="*/ 234646 h 1295096"/>
+                <a:gd name="connsiteX6" fmla="*/ 0 w 1968801"/>
+                <a:gd name="connsiteY6" fmla="*/ 361646 h 1295096"/>
               </a:gdLst>
               <a:ahLst/>
               <a:cxnLst>
@@ -8373,50 +8271,42 @@
                 <a:cxn ang="0">
                   <a:pos x="connsiteX6" y="connsiteY6"/>
                 </a:cxn>
-                <a:cxn ang="0">
-                  <a:pos x="connsiteX7" y="connsiteY7"/>
-                </a:cxn>
               </a:cxnLst>
               <a:rect l="l" t="t" r="r" b="b"/>
               <a:pathLst>
-                <a:path w="2013524" h="1256757">
+                <a:path w="1968801" h="1295096">
                   <a:moveTo>
-                    <a:pt x="1951630" y="1256757"/>
+                    <a:pt x="1930400" y="1295096"/>
                   </a:moveTo>
                   <a:cubicBezTo>
-                    <a:pt x="1957885" y="1256188"/>
-                    <a:pt x="1964141" y="1255620"/>
-                    <a:pt x="1972102" y="1161223"/>
+                    <a:pt x="1955800" y="1158042"/>
+                    <a:pt x="1981200" y="1020988"/>
+                    <a:pt x="1962150" y="869646"/>
                   </a:cubicBezTo>
                   <a:cubicBezTo>
-                    <a:pt x="1980063" y="1066826"/>
-                    <a:pt x="2040340" y="841638"/>
-                    <a:pt x="1999397" y="690375"/>
+                    <a:pt x="1943100" y="718304"/>
+                    <a:pt x="1917700" y="524629"/>
+                    <a:pt x="1816100" y="387046"/>
                   </a:cubicBezTo>
                   <a:cubicBezTo>
-                    <a:pt x="1958454" y="539112"/>
-                    <a:pt x="1874293" y="366241"/>
-                    <a:pt x="1726442" y="253647"/>
+                    <a:pt x="1714500" y="249463"/>
+                    <a:pt x="1554692" y="104471"/>
+                    <a:pt x="1352550" y="44146"/>
                   </a:cubicBezTo>
                   <a:cubicBezTo>
-                    <a:pt x="1578591" y="141053"/>
-                    <a:pt x="1304499" y="50068"/>
-                    <a:pt x="1112293" y="14811"/>
+                    <a:pt x="1150408" y="-16179"/>
+                    <a:pt x="804333" y="-6654"/>
+                    <a:pt x="603250" y="25096"/>
                   </a:cubicBezTo>
                   <a:cubicBezTo>
-                    <a:pt x="920087" y="-20446"/>
-                    <a:pt x="706272" y="14812"/>
-                    <a:pt x="573206" y="42107"/>
+                    <a:pt x="402167" y="56846"/>
+                    <a:pt x="246592" y="178554"/>
+                    <a:pt x="146050" y="234646"/>
                   </a:cubicBezTo>
                   <a:cubicBezTo>
-                    <a:pt x="440140" y="69402"/>
-                    <a:pt x="409433" y="125130"/>
-                    <a:pt x="313899" y="178584"/>
-                  </a:cubicBezTo>
-                  <a:cubicBezTo>
-                    <a:pt x="218365" y="232038"/>
-                    <a:pt x="109182" y="297433"/>
-                    <a:pt x="0" y="362829"/>
+                    <a:pt x="45508" y="290738"/>
+                    <a:pt x="22754" y="326192"/>
+                    <a:pt x="0" y="361646"/>
                   </a:cubicBezTo>
                 </a:path>
               </a:pathLst>
@@ -8450,51 +8340,21 @@
             <a:lstStyle/>
             <a:p>
               <a:pPr algn="ctr"/>
-              <a:endParaRPr lang="en-US" b="1"/>
-            </a:p>
-          </p:txBody>
-        </p:sp>
-        <p:sp>
-          <p:nvSpPr>
-            <p:cNvPr id="63" name="TextBox 62"/>
-            <p:cNvSpPr txBox="1"/>
-            <p:nvPr/>
-          </p:nvSpPr>
-          <p:spPr>
-            <a:xfrm>
-              <a:off x="797041" y="156518"/>
-              <a:ext cx="4551528" cy="461665"/>
-            </a:xfrm>
-            <a:prstGeom prst="rect">
-              <a:avLst/>
-            </a:prstGeom>
-            <a:noFill/>
-          </p:spPr>
-          <p:txBody>
-            <a:bodyPr wrap="square" rtlCol="0">
-              <a:spAutoFit/>
-            </a:bodyPr>
-            <a:lstStyle/>
-            <a:p>
-              <a:r>
-                <a:rPr lang="en-US" sz="2400" b="1" dirty="0" smtClean="0"/>
-                <a:t>Network graph</a:t>
-              </a:r>
-              <a:endParaRPr lang="en-US" sz="2400" b="1" dirty="0"/>
+              <a:endParaRPr lang="en-US"/>
             </a:p>
           </p:txBody>
         </p:sp>
       </p:grpSp>
       <p:sp>
         <p:nvSpPr>
-          <p:cNvPr id="76" name="TextBox 75"/>
+          <p:cNvPr id="47" name="TextBox 46"/>
           <p:cNvSpPr txBox="1"/>
           <p:nvPr/>
         </p:nvSpPr>
         <p:spPr>
           <a:xfrm>
-            <a:off x="9701394" y="503093"/>
-            <a:ext cx="527221" cy="584775"/>
+            <a:off x="286992" y="149971"/>
+            <a:ext cx="6936822" cy="1200329"/>
           </a:xfrm>
           <a:prstGeom prst="rect">
             <a:avLst/>
@@ -8508,35 +8368,23 @@
           <a:lstStyle/>
           <a:p>
             <a:r>
-              <a:rPr lang="en-US" sz="3200" b="1" dirty="0" smtClean="0">
-                <a:solidFill>
-                  <a:schemeClr val="accent2">
-                    <a:lumMod val="75000"/>
-                  </a:schemeClr>
-                </a:solidFill>
-              </a:rPr>
-              <a:t>x</a:t>
-            </a:r>
-            <a:endParaRPr lang="en-US" sz="3200" b="1" dirty="0">
-              <a:solidFill>
-                <a:schemeClr val="accent2">
-                  <a:lumMod val="75000"/>
-                </a:schemeClr>
-              </a:solidFill>
-            </a:endParaRPr>
+              <a:rPr lang="en-US" sz="2400" b="1" dirty="0" smtClean="0"/>
+              <a:t>Model3: S10P recruiting KDMs is crucial for fast demethylation at mitotic entrance, while S10P repelling MTs plays an assisting role</a:t>
+            </a:r>
+            <a:endParaRPr lang="en-US" sz="2400" b="1" dirty="0"/>
           </a:p>
         </p:txBody>
       </p:sp>
       <p:sp>
         <p:nvSpPr>
-          <p:cNvPr id="77" name="TextBox 76"/>
+          <p:cNvPr id="63" name="TextBox 62"/>
           <p:cNvSpPr txBox="1"/>
           <p:nvPr/>
         </p:nvSpPr>
         <p:spPr>
           <a:xfrm>
-            <a:off x="9934400" y="1571634"/>
-            <a:ext cx="527221" cy="584775"/>
+            <a:off x="7840392" y="82377"/>
+            <a:ext cx="4551528" cy="461665"/>
           </a:xfrm>
           <a:prstGeom prst="rect">
             <a:avLst/>
@@ -8550,18 +8398,10 @@
           <a:lstStyle/>
           <a:p>
             <a:r>
-              <a:rPr lang="en-US" sz="3200" b="1" dirty="0" smtClean="0">
-                <a:solidFill>
-                  <a:schemeClr val="accent4"/>
-                </a:solidFill>
-              </a:rPr>
-              <a:t>x</a:t>
-            </a:r>
-            <a:endParaRPr lang="en-US" sz="3200" b="1" dirty="0">
-              <a:solidFill>
-                <a:schemeClr val="accent4"/>
-              </a:solidFill>
-            </a:endParaRPr>
+              <a:rPr lang="en-US" sz="2400" b="1" dirty="0" smtClean="0"/>
+              <a:t>Network graph</a:t>
+            </a:r>
+            <a:endParaRPr lang="en-US" sz="2400" b="1" dirty="0"/>
           </a:p>
         </p:txBody>
       </p:sp>
@@ -8639,7 +8479,7 @@
 </p:sld>
 </file>
 
-<file path=ppt/slides/slide9.xml><?xml version="1.0" encoding="utf-8"?>
+<file path=ppt/slides/slide8.xml><?xml version="1.0" encoding="utf-8"?>
 <p:sld xmlns:a="http://schemas.openxmlformats.org/drawingml/2006/main" xmlns:r="http://schemas.openxmlformats.org/officeDocument/2006/relationships" xmlns:p="http://schemas.openxmlformats.org/presentationml/2006/main">
   <p:cSld>
     <p:spTree>
@@ -8756,7 +8596,7 @@
         <p:spPr>
           <a:xfrm>
             <a:off x="7620000" y="1552353"/>
-            <a:ext cx="4004930" cy="923330"/>
+            <a:ext cx="4004930" cy="1477328"/>
           </a:xfrm>
           <a:prstGeom prst="rect">
             <a:avLst/>
@@ -8792,6 +8632,28 @@
                 </a:solidFill>
               </a:rPr>
               <a:t>-/- cells, do we still see that the duration of mitosis is dependent on the inhibitor strength? </a:t>
+            </a:r>
+            <a:endParaRPr lang="en-US" dirty="0" smtClean="0">
+              <a:solidFill>
+                <a:srgbClr val="FF0000"/>
+              </a:solidFill>
+            </a:endParaRPr>
+          </a:p>
+          <a:p>
+            <a:endParaRPr lang="en-US" dirty="0">
+              <a:solidFill>
+                <a:srgbClr val="FF0000"/>
+              </a:solidFill>
+            </a:endParaRPr>
+          </a:p>
+          <a:p>
+            <a:r>
+              <a:rPr lang="en-US" dirty="0" smtClean="0">
+                <a:solidFill>
+                  <a:srgbClr val="FF0000"/>
+                </a:solidFill>
+              </a:rPr>
+              <a:t>Take a look at Fig 4D. </a:t>
             </a:r>
             <a:endParaRPr lang="en-US" dirty="0">
               <a:solidFill>

</xml_diff>